<commit_message>
update docs and add children props
</commit_message>
<xml_diff>
--- a/docs/Sharing Common Logic Between Components.pptx
+++ b/docs/Sharing Common Logic Between Components.pptx
@@ -25,16 +25,18 @@
     <p:sldId id="270" r:id="rId20"/>
     <p:sldId id="271" r:id="rId21"/>
     <p:sldId id="272" r:id="rId22"/>
+    <p:sldId id="273" r:id="rId23"/>
+    <p:sldId id="274" r:id="rId24"/>
   </p:sldIdLst>
   <p:sldSz cy="5143500" cx="9144000"/>
   <p:notesSz cx="6858000" cy="9144000"/>
   <p:embeddedFontLst>
     <p:embeddedFont>
       <p:font typeface="Roboto"/>
-      <p:regular r:id="rId23"/>
-      <p:bold r:id="rId24"/>
-      <p:italic r:id="rId25"/>
-      <p:boldItalic r:id="rId26"/>
+      <p:regular r:id="rId25"/>
+      <p:bold r:id="rId26"/>
+      <p:italic r:id="rId27"/>
+      <p:boldItalic r:id="rId28"/>
     </p:embeddedFont>
   </p:embeddedFontLst>
   <p:defaultTextStyle>
@@ -815,7 +817,7 @@
   <p:cSld>
     <p:spTree>
       <p:nvGrpSpPr>
-        <p:cNvPr id="109" name="Shape 109"/>
+        <p:cNvPr id="116" name="Shape 116"/>
         <p:cNvGrpSpPr/>
         <p:nvPr/>
       </p:nvGrpSpPr>
@@ -829,7 +831,7 @@
       </p:grpSpPr>
       <p:sp>
         <p:nvSpPr>
-          <p:cNvPr id="110" name="Google Shape;110;g872a63e31e_0_16:notes"/>
+          <p:cNvPr id="117" name="Google Shape;117;g8085a3dc9c_0_6:notes"/>
           <p:cNvSpPr/>
           <p:nvPr>
             <p:ph idx="2" type="sldImg"/>
@@ -864,7 +866,7 @@
       </p:sp>
       <p:sp>
         <p:nvSpPr>
-          <p:cNvPr id="111" name="Google Shape;111;g872a63e31e_0_16:notes"/>
+          <p:cNvPr id="118" name="Google Shape;118;g8085a3dc9c_0_6:notes"/>
           <p:cNvSpPr txBox="1"/>
           <p:nvPr>
             <p:ph idx="1" type="body"/>
@@ -914,7 +916,7 @@
   <p:cSld>
     <p:spTree>
       <p:nvGrpSpPr>
-        <p:cNvPr id="115" name="Shape 115"/>
+        <p:cNvPr id="125" name="Shape 125"/>
         <p:cNvGrpSpPr/>
         <p:nvPr/>
       </p:nvGrpSpPr>
@@ -928,7 +930,7 @@
       </p:grpSpPr>
       <p:sp>
         <p:nvSpPr>
-          <p:cNvPr id="116" name="Google Shape;116;g8085a3dc9c_0_25:notes"/>
+          <p:cNvPr id="126" name="Google Shape;126;g872a63e31e_0_11:notes"/>
           <p:cNvSpPr/>
           <p:nvPr>
             <p:ph idx="2" type="sldImg"/>
@@ -963,7 +965,7 @@
       </p:sp>
       <p:sp>
         <p:nvSpPr>
-          <p:cNvPr id="117" name="Google Shape;117;g8085a3dc9c_0_25:notes"/>
+          <p:cNvPr id="127" name="Google Shape;127;g872a63e31e_0_11:notes"/>
           <p:cNvSpPr txBox="1"/>
           <p:nvPr>
             <p:ph idx="1" type="body"/>
@@ -1013,7 +1015,7 @@
   <p:cSld>
     <p:spTree>
       <p:nvGrpSpPr>
-        <p:cNvPr id="121" name="Shape 121"/>
+        <p:cNvPr id="131" name="Shape 131"/>
         <p:cNvGrpSpPr/>
         <p:nvPr/>
       </p:nvGrpSpPr>
@@ -1027,7 +1029,7 @@
       </p:grpSpPr>
       <p:sp>
         <p:nvSpPr>
-          <p:cNvPr id="122" name="Google Shape;122;g8085a3dc9c_0_29:notes"/>
+          <p:cNvPr id="132" name="Google Shape;132;g872a63e31e_0_16:notes"/>
           <p:cNvSpPr/>
           <p:nvPr>
             <p:ph idx="2" type="sldImg"/>
@@ -1062,7 +1064,7 @@
       </p:sp>
       <p:sp>
         <p:nvSpPr>
-          <p:cNvPr id="123" name="Google Shape;123;g8085a3dc9c_0_29:notes"/>
+          <p:cNvPr id="133" name="Google Shape;133;g872a63e31e_0_16:notes"/>
           <p:cNvSpPr txBox="1"/>
           <p:nvPr>
             <p:ph idx="1" type="body"/>
@@ -1112,7 +1114,7 @@
   <p:cSld>
     <p:spTree>
       <p:nvGrpSpPr>
-        <p:cNvPr id="127" name="Shape 127"/>
+        <p:cNvPr id="137" name="Shape 137"/>
         <p:cNvGrpSpPr/>
         <p:nvPr/>
       </p:nvGrpSpPr>
@@ -1126,7 +1128,7 @@
       </p:grpSpPr>
       <p:sp>
         <p:nvSpPr>
-          <p:cNvPr id="128" name="Google Shape;128;g872a63e31e_0_21:notes"/>
+          <p:cNvPr id="138" name="Google Shape;138;g8085a3dc9c_0_25:notes"/>
           <p:cNvSpPr/>
           <p:nvPr>
             <p:ph idx="2" type="sldImg"/>
@@ -1161,7 +1163,7 @@
       </p:sp>
       <p:sp>
         <p:nvSpPr>
-          <p:cNvPr id="129" name="Google Shape;129;g872a63e31e_0_21:notes"/>
+          <p:cNvPr id="139" name="Google Shape;139;g8085a3dc9c_0_25:notes"/>
           <p:cNvSpPr txBox="1"/>
           <p:nvPr>
             <p:ph idx="1" type="body"/>
@@ -1211,7 +1213,7 @@
   <p:cSld>
     <p:spTree>
       <p:nvGrpSpPr>
-        <p:cNvPr id="133" name="Shape 133"/>
+        <p:cNvPr id="143" name="Shape 143"/>
         <p:cNvGrpSpPr/>
         <p:nvPr/>
       </p:nvGrpSpPr>
@@ -1225,7 +1227,7 @@
       </p:grpSpPr>
       <p:sp>
         <p:nvSpPr>
-          <p:cNvPr id="134" name="Google Shape;134;g872a63e31e_0_26:notes"/>
+          <p:cNvPr id="144" name="Google Shape;144;g8085a3dc9c_0_29:notes"/>
           <p:cNvSpPr/>
           <p:nvPr>
             <p:ph idx="2" type="sldImg"/>
@@ -1260,7 +1262,7 @@
       </p:sp>
       <p:sp>
         <p:nvSpPr>
-          <p:cNvPr id="135" name="Google Shape;135;g872a63e31e_0_26:notes"/>
+          <p:cNvPr id="145" name="Google Shape;145;g8085a3dc9c_0_29:notes"/>
           <p:cNvSpPr txBox="1"/>
           <p:nvPr>
             <p:ph idx="1" type="body"/>
@@ -1310,7 +1312,7 @@
   <p:cSld>
     <p:spTree>
       <p:nvGrpSpPr>
-        <p:cNvPr id="139" name="Shape 139"/>
+        <p:cNvPr id="149" name="Shape 149"/>
         <p:cNvGrpSpPr/>
         <p:nvPr/>
       </p:nvGrpSpPr>
@@ -1324,7 +1326,7 @@
       </p:grpSpPr>
       <p:sp>
         <p:nvSpPr>
-          <p:cNvPr id="140" name="Google Shape;140;g8085a3dc9c_0_41:notes"/>
+          <p:cNvPr id="150" name="Google Shape;150;g872a63e31e_0_21:notes"/>
           <p:cNvSpPr/>
           <p:nvPr>
             <p:ph idx="2" type="sldImg"/>
@@ -1359,7 +1361,7 @@
       </p:sp>
       <p:sp>
         <p:nvSpPr>
-          <p:cNvPr id="141" name="Google Shape;141;g8085a3dc9c_0_41:notes"/>
+          <p:cNvPr id="151" name="Google Shape;151;g872a63e31e_0_21:notes"/>
           <p:cNvSpPr txBox="1"/>
           <p:nvPr>
             <p:ph idx="1" type="body"/>
@@ -1409,7 +1411,7 @@
   <p:cSld>
     <p:spTree>
       <p:nvGrpSpPr>
-        <p:cNvPr id="145" name="Shape 145"/>
+        <p:cNvPr id="155" name="Shape 155"/>
         <p:cNvGrpSpPr/>
         <p:nvPr/>
       </p:nvGrpSpPr>
@@ -1423,7 +1425,7 @@
       </p:grpSpPr>
       <p:sp>
         <p:nvSpPr>
-          <p:cNvPr id="146" name="Google Shape;146;g8085a3dc9c_0_45:notes"/>
+          <p:cNvPr id="156" name="Google Shape;156;g872a63e31e_0_26:notes"/>
           <p:cNvSpPr/>
           <p:nvPr>
             <p:ph idx="2" type="sldImg"/>
@@ -1458,7 +1460,7 @@
       </p:sp>
       <p:sp>
         <p:nvSpPr>
-          <p:cNvPr id="147" name="Google Shape;147;g8085a3dc9c_0_45:notes"/>
+          <p:cNvPr id="157" name="Google Shape;157;g872a63e31e_0_26:notes"/>
           <p:cNvSpPr txBox="1"/>
           <p:nvPr>
             <p:ph idx="1" type="body"/>
@@ -1508,7 +1510,7 @@
   <p:cSld>
     <p:spTree>
       <p:nvGrpSpPr>
-        <p:cNvPr id="151" name="Shape 151"/>
+        <p:cNvPr id="161" name="Shape 161"/>
         <p:cNvGrpSpPr/>
         <p:nvPr/>
       </p:nvGrpSpPr>
@@ -1522,7 +1524,7 @@
       </p:grpSpPr>
       <p:sp>
         <p:nvSpPr>
-          <p:cNvPr id="152" name="Google Shape;152;g872a63e31e_0_44:notes"/>
+          <p:cNvPr id="162" name="Google Shape;162;g8085a3dc9c_0_41:notes"/>
           <p:cNvSpPr/>
           <p:nvPr>
             <p:ph idx="2" type="sldImg"/>
@@ -1557,7 +1559,205 @@
       </p:sp>
       <p:sp>
         <p:nvSpPr>
-          <p:cNvPr id="153" name="Google Shape;153;g872a63e31e_0_44:notes"/>
+          <p:cNvPr id="163" name="Google Shape;163;g8085a3dc9c_0_41:notes"/>
+          <p:cNvSpPr txBox="1"/>
+          <p:nvPr>
+            <p:ph idx="1" type="body"/>
+          </p:nvPr>
+        </p:nvSpPr>
+        <p:spPr>
+          <a:xfrm>
+            <a:off x="685800" y="4343400"/>
+            <a:ext cx="5486400" cy="4114800"/>
+          </a:xfrm>
+          <a:prstGeom prst="rect">
+            <a:avLst/>
+          </a:prstGeom>
+        </p:spPr>
+        <p:txBody>
+          <a:bodyPr anchorCtr="0" anchor="t" bIns="91425" lIns="91425" spcFirstLastPara="1" rIns="91425" wrap="square" tIns="91425">
+            <a:noAutofit/>
+          </a:bodyPr>
+          <a:lstStyle/>
+          <a:p>
+            <a:pPr indent="0" lvl="0" marL="0" rtl="0" algn="l">
+              <a:spcBef>
+                <a:spcPts val="0"/>
+              </a:spcBef>
+              <a:spcAft>
+                <a:spcPts val="0"/>
+              </a:spcAft>
+              <a:buNone/>
+            </a:pPr>
+            <a:r>
+              <a:t/>
+            </a:r>
+            <a:endParaRPr/>
+          </a:p>
+        </p:txBody>
+      </p:sp>
+    </p:spTree>
+  </p:cSld>
+  <p:clrMapOvr>
+    <a:masterClrMapping/>
+  </p:clrMapOvr>
+</p:notes>
+</file>
+
+<file path=ppt/notesSlides/notesSlide18.xml><?xml version="1.0" encoding="utf-8"?>
+<p:notes xmlns:a="http://schemas.openxmlformats.org/drawingml/2006/main" xmlns:r="http://schemas.openxmlformats.org/officeDocument/2006/relationships" xmlns:mc="http://schemas.openxmlformats.org/markup-compatibility/2006" xmlns:mv="urn:schemas-microsoft-com:mac:vml" xmlns:p="http://schemas.openxmlformats.org/presentationml/2006/main" xmlns:c="http://schemas.openxmlformats.org/drawingml/2006/chart" xmlns:dgm="http://schemas.openxmlformats.org/drawingml/2006/diagram" xmlns:o="urn:schemas-microsoft-com:office:office" xmlns:v="urn:schemas-microsoft-com:vml" xmlns:pvml="urn:schemas-microsoft-com:office:powerpoint" xmlns:com="http://schemas.openxmlformats.org/drawingml/2006/compatibility" xmlns:p14="http://schemas.microsoft.com/office/powerpoint/2010/main" xmlns:p15="http://schemas.microsoft.com/office/powerpoint/2012/main" showMasterPhAnim="0" showMasterSp="0">
+  <p:cSld>
+    <p:spTree>
+      <p:nvGrpSpPr>
+        <p:cNvPr id="167" name="Shape 167"/>
+        <p:cNvGrpSpPr/>
+        <p:nvPr/>
+      </p:nvGrpSpPr>
+      <p:grpSpPr>
+        <a:xfrm>
+          <a:off x="0" y="0"/>
+          <a:ext cx="0" cy="0"/>
+          <a:chOff x="0" y="0"/>
+          <a:chExt cx="0" cy="0"/>
+        </a:xfrm>
+      </p:grpSpPr>
+      <p:sp>
+        <p:nvSpPr>
+          <p:cNvPr id="168" name="Google Shape;168;g8085a3dc9c_0_45:notes"/>
+          <p:cNvSpPr/>
+          <p:nvPr>
+            <p:ph idx="2" type="sldImg"/>
+          </p:nvPr>
+        </p:nvSpPr>
+        <p:spPr>
+          <a:xfrm>
+            <a:off x="381300" y="685800"/>
+            <a:ext cx="6096000" cy="3429000"/>
+          </a:xfrm>
+          <a:custGeom>
+            <a:rect b="b" l="l" r="r" t="t"/>
+            <a:pathLst>
+              <a:path extrusionOk="0" h="120000" w="120000">
+                <a:moveTo>
+                  <a:pt x="0" y="0"/>
+                </a:moveTo>
+                <a:lnTo>
+                  <a:pt x="120000" y="0"/>
+                </a:lnTo>
+                <a:lnTo>
+                  <a:pt x="120000" y="120000"/>
+                </a:lnTo>
+                <a:lnTo>
+                  <a:pt x="0" y="120000"/>
+                </a:lnTo>
+                <a:close/>
+              </a:path>
+            </a:pathLst>
+          </a:custGeom>
+        </p:spPr>
+      </p:sp>
+      <p:sp>
+        <p:nvSpPr>
+          <p:cNvPr id="169" name="Google Shape;169;g8085a3dc9c_0_45:notes"/>
+          <p:cNvSpPr txBox="1"/>
+          <p:nvPr>
+            <p:ph idx="1" type="body"/>
+          </p:nvPr>
+        </p:nvSpPr>
+        <p:spPr>
+          <a:xfrm>
+            <a:off x="685800" y="4343400"/>
+            <a:ext cx="5486400" cy="4114800"/>
+          </a:xfrm>
+          <a:prstGeom prst="rect">
+            <a:avLst/>
+          </a:prstGeom>
+        </p:spPr>
+        <p:txBody>
+          <a:bodyPr anchorCtr="0" anchor="t" bIns="91425" lIns="91425" spcFirstLastPara="1" rIns="91425" wrap="square" tIns="91425">
+            <a:noAutofit/>
+          </a:bodyPr>
+          <a:lstStyle/>
+          <a:p>
+            <a:pPr indent="0" lvl="0" marL="0" rtl="0" algn="l">
+              <a:spcBef>
+                <a:spcPts val="0"/>
+              </a:spcBef>
+              <a:spcAft>
+                <a:spcPts val="0"/>
+              </a:spcAft>
+              <a:buNone/>
+            </a:pPr>
+            <a:r>
+              <a:t/>
+            </a:r>
+            <a:endParaRPr/>
+          </a:p>
+        </p:txBody>
+      </p:sp>
+    </p:spTree>
+  </p:cSld>
+  <p:clrMapOvr>
+    <a:masterClrMapping/>
+  </p:clrMapOvr>
+</p:notes>
+</file>
+
+<file path=ppt/notesSlides/notesSlide19.xml><?xml version="1.0" encoding="utf-8"?>
+<p:notes xmlns:a="http://schemas.openxmlformats.org/drawingml/2006/main" xmlns:r="http://schemas.openxmlformats.org/officeDocument/2006/relationships" xmlns:mc="http://schemas.openxmlformats.org/markup-compatibility/2006" xmlns:mv="urn:schemas-microsoft-com:mac:vml" xmlns:p="http://schemas.openxmlformats.org/presentationml/2006/main" xmlns:c="http://schemas.openxmlformats.org/drawingml/2006/chart" xmlns:dgm="http://schemas.openxmlformats.org/drawingml/2006/diagram" xmlns:o="urn:schemas-microsoft-com:office:office" xmlns:v="urn:schemas-microsoft-com:vml" xmlns:pvml="urn:schemas-microsoft-com:office:powerpoint" xmlns:com="http://schemas.openxmlformats.org/drawingml/2006/compatibility" xmlns:p14="http://schemas.microsoft.com/office/powerpoint/2010/main" xmlns:p15="http://schemas.microsoft.com/office/powerpoint/2012/main" showMasterPhAnim="0" showMasterSp="0">
+  <p:cSld>
+    <p:spTree>
+      <p:nvGrpSpPr>
+        <p:cNvPr id="173" name="Shape 173"/>
+        <p:cNvGrpSpPr/>
+        <p:nvPr/>
+      </p:nvGrpSpPr>
+      <p:grpSpPr>
+        <a:xfrm>
+          <a:off x="0" y="0"/>
+          <a:ext cx="0" cy="0"/>
+          <a:chOff x="0" y="0"/>
+          <a:chExt cx="0" cy="0"/>
+        </a:xfrm>
+      </p:grpSpPr>
+      <p:sp>
+        <p:nvSpPr>
+          <p:cNvPr id="174" name="Google Shape;174;g872a63e31e_0_44:notes"/>
+          <p:cNvSpPr/>
+          <p:nvPr>
+            <p:ph idx="2" type="sldImg"/>
+          </p:nvPr>
+        </p:nvSpPr>
+        <p:spPr>
+          <a:xfrm>
+            <a:off x="381300" y="685800"/>
+            <a:ext cx="6096000" cy="3429000"/>
+          </a:xfrm>
+          <a:custGeom>
+            <a:rect b="b" l="l" r="r" t="t"/>
+            <a:pathLst>
+              <a:path extrusionOk="0" h="120000" w="120000">
+                <a:moveTo>
+                  <a:pt x="0" y="0"/>
+                </a:moveTo>
+                <a:lnTo>
+                  <a:pt x="120000" y="0"/>
+                </a:lnTo>
+                <a:lnTo>
+                  <a:pt x="120000" y="120000"/>
+                </a:lnTo>
+                <a:lnTo>
+                  <a:pt x="0" y="120000"/>
+                </a:lnTo>
+                <a:close/>
+              </a:path>
+            </a:pathLst>
+          </a:custGeom>
+        </p:spPr>
+      </p:sp>
+      <p:sp>
+        <p:nvSpPr>
+          <p:cNvPr id="175" name="Google Shape;175;g872a63e31e_0_44:notes"/>
           <p:cNvSpPr txBox="1"/>
           <p:nvPr>
             <p:ph idx="1" type="body"/>
@@ -1720,7 +1920,7 @@
       </p:grpSpPr>
       <p:sp>
         <p:nvSpPr>
-          <p:cNvPr id="67" name="Google Shape;67;g8085a3dc9c_0_63:notes"/>
+          <p:cNvPr id="67" name="Google Shape;67;g8085a3dc9c_0_18:notes"/>
           <p:cNvSpPr/>
           <p:nvPr>
             <p:ph idx="2" type="sldImg"/>
@@ -1755,7 +1955,7 @@
       </p:sp>
       <p:sp>
         <p:nvSpPr>
-          <p:cNvPr id="68" name="Google Shape;68;g8085a3dc9c_0_63:notes"/>
+          <p:cNvPr id="68" name="Google Shape;68;g8085a3dc9c_0_18:notes"/>
           <p:cNvSpPr txBox="1"/>
           <p:nvPr>
             <p:ph idx="1" type="body"/>
@@ -1805,7 +2005,7 @@
   <p:cSld>
     <p:spTree>
       <p:nvGrpSpPr>
-        <p:cNvPr id="72" name="Shape 72"/>
+        <p:cNvPr id="73" name="Shape 73"/>
         <p:cNvGrpSpPr/>
         <p:nvPr/>
       </p:nvGrpSpPr>
@@ -1819,7 +2019,7 @@
       </p:grpSpPr>
       <p:sp>
         <p:nvSpPr>
-          <p:cNvPr id="73" name="Google Shape;73;g8085a3dc9c_0_58:notes"/>
+          <p:cNvPr id="74" name="Google Shape;74;g8085a3dc9c_0_63:notes"/>
           <p:cNvSpPr/>
           <p:nvPr>
             <p:ph idx="2" type="sldImg"/>
@@ -1854,7 +2054,7 @@
       </p:sp>
       <p:sp>
         <p:nvSpPr>
-          <p:cNvPr id="74" name="Google Shape;74;g8085a3dc9c_0_58:notes"/>
+          <p:cNvPr id="75" name="Google Shape;75;g8085a3dc9c_0_63:notes"/>
           <p:cNvSpPr txBox="1"/>
           <p:nvPr>
             <p:ph idx="1" type="body"/>
@@ -1904,7 +2104,7 @@
   <p:cSld>
     <p:spTree>
       <p:nvGrpSpPr>
-        <p:cNvPr id="78" name="Shape 78"/>
+        <p:cNvPr id="79" name="Shape 79"/>
         <p:cNvGrpSpPr/>
         <p:nvPr/>
       </p:nvGrpSpPr>
@@ -1918,7 +2118,7 @@
       </p:grpSpPr>
       <p:sp>
         <p:nvSpPr>
-          <p:cNvPr id="79" name="Google Shape;79;g872a63e31e_0_6:notes"/>
+          <p:cNvPr id="80" name="Google Shape;80;g87a0a61c1b_0_14:notes"/>
           <p:cNvSpPr/>
           <p:nvPr>
             <p:ph idx="2" type="sldImg"/>
@@ -1953,7 +2153,7 @@
       </p:sp>
       <p:sp>
         <p:nvSpPr>
-          <p:cNvPr id="80" name="Google Shape;80;g872a63e31e_0_6:notes"/>
+          <p:cNvPr id="81" name="Google Shape;81;g87a0a61c1b_0_14:notes"/>
           <p:cNvSpPr txBox="1"/>
           <p:nvPr>
             <p:ph idx="1" type="body"/>
@@ -2003,7 +2203,7 @@
   <p:cSld>
     <p:spTree>
       <p:nvGrpSpPr>
-        <p:cNvPr id="84" name="Shape 84"/>
+        <p:cNvPr id="85" name="Shape 85"/>
         <p:cNvGrpSpPr/>
         <p:nvPr/>
       </p:nvGrpSpPr>
@@ -2017,7 +2217,7 @@
       </p:grpSpPr>
       <p:sp>
         <p:nvSpPr>
-          <p:cNvPr id="85" name="Google Shape;85;g8085a3dc9c_0_1:notes"/>
+          <p:cNvPr id="86" name="Google Shape;86;g87a0a61c1b_0_22:notes"/>
           <p:cNvSpPr/>
           <p:nvPr>
             <p:ph idx="2" type="sldImg"/>
@@ -2052,7 +2252,7 @@
       </p:sp>
       <p:sp>
         <p:nvSpPr>
-          <p:cNvPr id="86" name="Google Shape;86;g8085a3dc9c_0_1:notes"/>
+          <p:cNvPr id="87" name="Google Shape;87;g87a0a61c1b_0_22:notes"/>
           <p:cNvSpPr txBox="1"/>
           <p:nvPr>
             <p:ph idx="1" type="body"/>
@@ -2102,7 +2302,7 @@
   <p:cSld>
     <p:spTree>
       <p:nvGrpSpPr>
-        <p:cNvPr id="90" name="Shape 90"/>
+        <p:cNvPr id="91" name="Shape 91"/>
         <p:cNvGrpSpPr/>
         <p:nvPr/>
       </p:nvGrpSpPr>
@@ -2116,7 +2316,7 @@
       </p:grpSpPr>
       <p:sp>
         <p:nvSpPr>
-          <p:cNvPr id="91" name="Google Shape;91;g8085a3dc9c_0_6:notes"/>
+          <p:cNvPr id="92" name="Google Shape;92;g8085a3dc9c_0_58:notes"/>
           <p:cNvSpPr/>
           <p:nvPr>
             <p:ph idx="2" type="sldImg"/>
@@ -2151,7 +2351,7 @@
       </p:sp>
       <p:sp>
         <p:nvSpPr>
-          <p:cNvPr id="92" name="Google Shape;92;g8085a3dc9c_0_6:notes"/>
+          <p:cNvPr id="93" name="Google Shape;93;g8085a3dc9c_0_58:notes"/>
           <p:cNvSpPr txBox="1"/>
           <p:nvPr>
             <p:ph idx="1" type="body"/>
@@ -2201,7 +2401,7 @@
   <p:cSld>
     <p:spTree>
       <p:nvGrpSpPr>
-        <p:cNvPr id="96" name="Shape 96"/>
+        <p:cNvPr id="97" name="Shape 97"/>
         <p:cNvGrpSpPr/>
         <p:nvPr/>
       </p:nvGrpSpPr>
@@ -2215,7 +2415,7 @@
       </p:grpSpPr>
       <p:sp>
         <p:nvSpPr>
-          <p:cNvPr id="97" name="Google Shape;97;g8085a3dc9c_0_18:notes"/>
+          <p:cNvPr id="98" name="Google Shape;98;g872a63e31e_0_6:notes"/>
           <p:cNvSpPr/>
           <p:nvPr>
             <p:ph idx="2" type="sldImg"/>
@@ -2250,7 +2450,7 @@
       </p:sp>
       <p:sp>
         <p:nvSpPr>
-          <p:cNvPr id="98" name="Google Shape;98;g8085a3dc9c_0_18:notes"/>
+          <p:cNvPr id="99" name="Google Shape;99;g872a63e31e_0_6:notes"/>
           <p:cNvSpPr txBox="1"/>
           <p:nvPr>
             <p:ph idx="1" type="body"/>
@@ -2300,7 +2500,7 @@
   <p:cSld>
     <p:spTree>
       <p:nvGrpSpPr>
-        <p:cNvPr id="103" name="Shape 103"/>
+        <p:cNvPr id="107" name="Shape 107"/>
         <p:cNvGrpSpPr/>
         <p:nvPr/>
       </p:nvGrpSpPr>
@@ -2314,7 +2514,7 @@
       </p:grpSpPr>
       <p:sp>
         <p:nvSpPr>
-          <p:cNvPr id="104" name="Google Shape;104;g872a63e31e_0_11:notes"/>
+          <p:cNvPr id="108" name="Google Shape;108;g8085a3dc9c_0_1:notes"/>
           <p:cNvSpPr/>
           <p:nvPr>
             <p:ph idx="2" type="sldImg"/>
@@ -2349,7 +2549,7 @@
       </p:sp>
       <p:sp>
         <p:nvSpPr>
-          <p:cNvPr id="105" name="Google Shape;105;g872a63e31e_0_11:notes"/>
+          <p:cNvPr id="109" name="Google Shape;109;g8085a3dc9c_0_1:notes"/>
           <p:cNvSpPr txBox="1"/>
           <p:nvPr>
             <p:ph idx="1" type="body"/>
@@ -7465,7 +7665,7 @@
   <p:cSld>
     <p:spTree>
       <p:nvGrpSpPr>
-        <p:cNvPr id="112" name="Shape 112"/>
+        <p:cNvPr id="119" name="Shape 119"/>
         <p:cNvGrpSpPr/>
         <p:nvPr/>
       </p:nvGrpSpPr>
@@ -7479,7 +7679,7 @@
       </p:grpSpPr>
       <p:sp>
         <p:nvSpPr>
-          <p:cNvPr id="113" name="Google Shape;113;p22"/>
+          <p:cNvPr id="120" name="Google Shape;120;p22"/>
           <p:cNvSpPr txBox="1"/>
           <p:nvPr>
             <p:ph type="title"/>
@@ -7487,7 +7687,7 @@
         </p:nvSpPr>
         <p:spPr>
           <a:xfrm>
-            <a:off x="311700" y="445025"/>
+            <a:off x="311700" y="310850"/>
             <a:ext cx="8520600" cy="572700"/>
           </a:xfrm>
           <a:prstGeom prst="rect">
@@ -7511,7 +7711,325 @@
             </a:pPr>
             <a:r>
               <a:rPr lang="id"/>
-              <a:t>Parent Component - </a:t>
+              <a:t>Component - </a:t>
+            </a:r>
+            <a:r>
+              <a:rPr i="1" lang="id"/>
+              <a:t>Profile</a:t>
+            </a:r>
+            <a:endParaRPr i="1"/>
+          </a:p>
+        </p:txBody>
+      </p:sp>
+      <p:pic>
+        <p:nvPicPr>
+          <p:cNvPr id="121" name="Google Shape;121;p22"/>
+          <p:cNvPicPr preferRelativeResize="0"/>
+          <p:nvPr/>
+        </p:nvPicPr>
+        <p:blipFill>
+          <a:blip r:embed="rId3">
+            <a:alphaModFix/>
+          </a:blip>
+          <a:stretch>
+            <a:fillRect/>
+          </a:stretch>
+        </p:blipFill>
+        <p:spPr>
+          <a:xfrm>
+            <a:off x="-175600" y="1262900"/>
+            <a:ext cx="4359504" cy="3820977"/>
+          </a:xfrm>
+          <a:prstGeom prst="rect">
+            <a:avLst/>
+          </a:prstGeom>
+          <a:noFill/>
+          <a:ln>
+            <a:noFill/>
+          </a:ln>
+        </p:spPr>
+      </p:pic>
+      <p:pic>
+        <p:nvPicPr>
+          <p:cNvPr id="122" name="Google Shape;122;p22"/>
+          <p:cNvPicPr preferRelativeResize="0"/>
+          <p:nvPr/>
+        </p:nvPicPr>
+        <p:blipFill>
+          <a:blip r:embed="rId4">
+            <a:alphaModFix/>
+          </a:blip>
+          <a:stretch>
+            <a:fillRect/>
+          </a:stretch>
+        </p:blipFill>
+        <p:spPr>
+          <a:xfrm>
+            <a:off x="4572000" y="1262900"/>
+            <a:ext cx="4495276" cy="3820976"/>
+          </a:xfrm>
+          <a:prstGeom prst="rect">
+            <a:avLst/>
+          </a:prstGeom>
+          <a:noFill/>
+          <a:ln>
+            <a:noFill/>
+          </a:ln>
+        </p:spPr>
+      </p:pic>
+      <p:sp>
+        <p:nvSpPr>
+          <p:cNvPr id="123" name="Google Shape;123;p22"/>
+          <p:cNvSpPr txBox="1"/>
+          <p:nvPr>
+            <p:ph type="title"/>
+          </p:nvPr>
+        </p:nvSpPr>
+        <p:spPr>
+          <a:xfrm>
+            <a:off x="1455525" y="883550"/>
+            <a:ext cx="795600" cy="572700"/>
+          </a:xfrm>
+          <a:prstGeom prst="rect">
+            <a:avLst/>
+          </a:prstGeom>
+        </p:spPr>
+        <p:txBody>
+          <a:bodyPr anchorCtr="0" anchor="t" bIns="91425" lIns="91425" spcFirstLastPara="1" rIns="91425" wrap="square" tIns="91425">
+            <a:noAutofit/>
+          </a:bodyPr>
+          <a:lstStyle/>
+          <a:p>
+            <a:pPr indent="0" lvl="0" marL="0" rtl="0" algn="l">
+              <a:spcBef>
+                <a:spcPts val="0"/>
+              </a:spcBef>
+              <a:spcAft>
+                <a:spcPts val="0"/>
+              </a:spcAft>
+              <a:buNone/>
+            </a:pPr>
+            <a:r>
+              <a:rPr b="1" lang="id" sz="1400"/>
+              <a:t>render </a:t>
+            </a:r>
+            <a:endParaRPr b="1" i="1" sz="1400"/>
+          </a:p>
+        </p:txBody>
+      </p:sp>
+      <p:sp>
+        <p:nvSpPr>
+          <p:cNvPr id="124" name="Google Shape;124;p22"/>
+          <p:cNvSpPr txBox="1"/>
+          <p:nvPr>
+            <p:ph type="title"/>
+          </p:nvPr>
+        </p:nvSpPr>
+        <p:spPr>
+          <a:xfrm>
+            <a:off x="6743725" y="883550"/>
+            <a:ext cx="1202700" cy="572700"/>
+          </a:xfrm>
+          <a:prstGeom prst="rect">
+            <a:avLst/>
+          </a:prstGeom>
+        </p:spPr>
+        <p:txBody>
+          <a:bodyPr anchorCtr="0" anchor="t" bIns="91425" lIns="91425" spcFirstLastPara="1" rIns="91425" wrap="square" tIns="91425">
+            <a:noAutofit/>
+          </a:bodyPr>
+          <a:lstStyle/>
+          <a:p>
+            <a:pPr indent="0" lvl="0" marL="0" rtl="0" algn="l">
+              <a:spcBef>
+                <a:spcPts val="0"/>
+              </a:spcBef>
+              <a:spcAft>
+                <a:spcPts val="0"/>
+              </a:spcAft>
+              <a:buNone/>
+            </a:pPr>
+            <a:r>
+              <a:rPr b="1" lang="id" sz="1400"/>
+              <a:t>children </a:t>
+            </a:r>
+            <a:endParaRPr b="1" i="1" sz="1400"/>
+          </a:p>
+        </p:txBody>
+      </p:sp>
+    </p:spTree>
+  </p:cSld>
+  <p:clrMapOvr>
+    <a:masterClrMapping/>
+  </p:clrMapOvr>
+</p:sld>
+</file>
+
+<file path=ppt/slides/slide11.xml><?xml version="1.0" encoding="utf-8"?>
+<p:sld xmlns:a="http://schemas.openxmlformats.org/drawingml/2006/main" xmlns:r="http://schemas.openxmlformats.org/officeDocument/2006/relationships" xmlns:mc="http://schemas.openxmlformats.org/markup-compatibility/2006" xmlns:mv="urn:schemas-microsoft-com:mac:vml" xmlns:p="http://schemas.openxmlformats.org/presentationml/2006/main" xmlns:c="http://schemas.openxmlformats.org/drawingml/2006/chart" xmlns:dgm="http://schemas.openxmlformats.org/drawingml/2006/diagram" xmlns:o="urn:schemas-microsoft-com:office:office" xmlns:v="urn:schemas-microsoft-com:vml" xmlns:pvml="urn:schemas-microsoft-com:office:powerpoint" xmlns:com="http://schemas.openxmlformats.org/drawingml/2006/compatibility" xmlns:p14="http://schemas.microsoft.com/office/powerpoint/2010/main" xmlns:p15="http://schemas.microsoft.com/office/powerpoint/2012/main">
+  <p:cSld>
+    <p:spTree>
+      <p:nvGrpSpPr>
+        <p:cNvPr id="128" name="Shape 128"/>
+        <p:cNvGrpSpPr/>
+        <p:nvPr/>
+      </p:nvGrpSpPr>
+      <p:grpSpPr>
+        <a:xfrm>
+          <a:off x="0" y="0"/>
+          <a:ext cx="0" cy="0"/>
+          <a:chOff x="0" y="0"/>
+          <a:chExt cx="0" cy="0"/>
+        </a:xfrm>
+      </p:grpSpPr>
+      <p:sp>
+        <p:nvSpPr>
+          <p:cNvPr id="129" name="Google Shape;129;p23"/>
+          <p:cNvSpPr txBox="1"/>
+          <p:nvPr>
+            <p:ph type="title"/>
+          </p:nvPr>
+        </p:nvSpPr>
+        <p:spPr>
+          <a:xfrm>
+            <a:off x="311700" y="445025"/>
+            <a:ext cx="8520600" cy="572700"/>
+          </a:xfrm>
+          <a:prstGeom prst="rect">
+            <a:avLst/>
+          </a:prstGeom>
+        </p:spPr>
+        <p:txBody>
+          <a:bodyPr anchorCtr="0" anchor="t" bIns="91425" lIns="91425" spcFirstLastPara="1" rIns="91425" wrap="square" tIns="91425">
+            <a:noAutofit/>
+          </a:bodyPr>
+          <a:lstStyle/>
+          <a:p>
+            <a:pPr indent="0" lvl="0" marL="0" rtl="0" algn="l">
+              <a:spcBef>
+                <a:spcPts val="0"/>
+              </a:spcBef>
+              <a:spcAft>
+                <a:spcPts val="0"/>
+              </a:spcAft>
+              <a:buNone/>
+            </a:pPr>
+            <a:r>
+              <a:rPr lang="id"/>
+              <a:t>Higher-Order Components (HOC)</a:t>
+            </a:r>
+            <a:endParaRPr/>
+          </a:p>
+        </p:txBody>
+      </p:sp>
+      <p:sp>
+        <p:nvSpPr>
+          <p:cNvPr id="130" name="Google Shape;130;p23"/>
+          <p:cNvSpPr txBox="1"/>
+          <p:nvPr>
+            <p:ph idx="1" type="body"/>
+          </p:nvPr>
+        </p:nvSpPr>
+        <p:spPr>
+          <a:xfrm>
+            <a:off x="1013800" y="1721975"/>
+            <a:ext cx="7401000" cy="2697900"/>
+          </a:xfrm>
+          <a:prstGeom prst="rect">
+            <a:avLst/>
+          </a:prstGeom>
+        </p:spPr>
+        <p:txBody>
+          <a:bodyPr anchorCtr="0" anchor="t" bIns="91425" lIns="91425" spcFirstLastPara="1" rIns="91425" wrap="square" tIns="91425">
+            <a:noAutofit/>
+          </a:bodyPr>
+          <a:lstStyle/>
+          <a:p>
+            <a:pPr indent="0" lvl="0" marL="0" rtl="0" algn="l">
+              <a:spcBef>
+                <a:spcPts val="0"/>
+              </a:spcBef>
+              <a:spcAft>
+                <a:spcPts val="1600"/>
+              </a:spcAft>
+              <a:buNone/>
+            </a:pPr>
+            <a:r>
+              <a:rPr lang="id">
+                <a:solidFill>
+                  <a:srgbClr val="6D6D6D"/>
+                </a:solidFill>
+                <a:latin typeface="Roboto"/>
+                <a:ea typeface="Roboto"/>
+                <a:cs typeface="Roboto"/>
+                <a:sym typeface="Roboto"/>
+              </a:rPr>
+              <a:t>A higher-order component (HOC) is an advanced technique in React for reusing component logic.</a:t>
+            </a:r>
+            <a:endParaRPr/>
+          </a:p>
+        </p:txBody>
+      </p:sp>
+    </p:spTree>
+  </p:cSld>
+  <p:clrMapOvr>
+    <a:masterClrMapping/>
+  </p:clrMapOvr>
+</p:sld>
+</file>
+
+<file path=ppt/slides/slide12.xml><?xml version="1.0" encoding="utf-8"?>
+<p:sld xmlns:a="http://schemas.openxmlformats.org/drawingml/2006/main" xmlns:r="http://schemas.openxmlformats.org/officeDocument/2006/relationships" xmlns:mc="http://schemas.openxmlformats.org/markup-compatibility/2006" xmlns:mv="urn:schemas-microsoft-com:mac:vml" xmlns:p="http://schemas.openxmlformats.org/presentationml/2006/main" xmlns:c="http://schemas.openxmlformats.org/drawingml/2006/chart" xmlns:dgm="http://schemas.openxmlformats.org/drawingml/2006/diagram" xmlns:o="urn:schemas-microsoft-com:office:office" xmlns:v="urn:schemas-microsoft-com:vml" xmlns:pvml="urn:schemas-microsoft-com:office:powerpoint" xmlns:com="http://schemas.openxmlformats.org/drawingml/2006/compatibility" xmlns:p14="http://schemas.microsoft.com/office/powerpoint/2010/main" xmlns:p15="http://schemas.microsoft.com/office/powerpoint/2012/main">
+  <p:cSld>
+    <p:spTree>
+      <p:nvGrpSpPr>
+        <p:cNvPr id="134" name="Shape 134"/>
+        <p:cNvGrpSpPr/>
+        <p:nvPr/>
+      </p:nvGrpSpPr>
+      <p:grpSpPr>
+        <a:xfrm>
+          <a:off x="0" y="0"/>
+          <a:ext cx="0" cy="0"/>
+          <a:chOff x="0" y="0"/>
+          <a:chExt cx="0" cy="0"/>
+        </a:xfrm>
+      </p:grpSpPr>
+      <p:sp>
+        <p:nvSpPr>
+          <p:cNvPr id="135" name="Google Shape;135;p24"/>
+          <p:cNvSpPr txBox="1"/>
+          <p:nvPr>
+            <p:ph type="title"/>
+          </p:nvPr>
+        </p:nvSpPr>
+        <p:spPr>
+          <a:xfrm>
+            <a:off x="311700" y="445025"/>
+            <a:ext cx="8520600" cy="572700"/>
+          </a:xfrm>
+          <a:prstGeom prst="rect">
+            <a:avLst/>
+          </a:prstGeom>
+        </p:spPr>
+        <p:txBody>
+          <a:bodyPr anchorCtr="0" anchor="t" bIns="91425" lIns="91425" spcFirstLastPara="1" rIns="91425" wrap="square" tIns="91425">
+            <a:noAutofit/>
+          </a:bodyPr>
+          <a:lstStyle/>
+          <a:p>
+            <a:pPr indent="0" lvl="0" marL="0" rtl="0" algn="l">
+              <a:spcBef>
+                <a:spcPts val="0"/>
+              </a:spcBef>
+              <a:spcAft>
+                <a:spcPts val="0"/>
+              </a:spcAft>
+              <a:buNone/>
+            </a:pPr>
+            <a:r>
+              <a:rPr lang="id"/>
+              <a:t>HO-Component - </a:t>
             </a:r>
             <a:r>
               <a:rPr i="1" lang="id">
@@ -7531,7 +8049,7 @@
       </p:sp>
       <p:pic>
         <p:nvPicPr>
-          <p:cNvPr id="114" name="Google Shape;114;p22"/>
+          <p:cNvPr id="136" name="Google Shape;136;p24"/>
           <p:cNvPicPr preferRelativeResize="0"/>
           <p:nvPr/>
         </p:nvPicPr>
@@ -7547,205 +8065,6 @@
           <a:xfrm>
             <a:off x="390950" y="1185025"/>
             <a:ext cx="4639756" cy="3820975"/>
-          </a:xfrm>
-          <a:prstGeom prst="rect">
-            <a:avLst/>
-          </a:prstGeom>
-          <a:noFill/>
-          <a:ln>
-            <a:noFill/>
-          </a:ln>
-        </p:spPr>
-      </p:pic>
-    </p:spTree>
-  </p:cSld>
-  <p:clrMapOvr>
-    <a:masterClrMapping/>
-  </p:clrMapOvr>
-</p:sld>
-</file>
-
-<file path=ppt/slides/slide11.xml><?xml version="1.0" encoding="utf-8"?>
-<p:sld xmlns:a="http://schemas.openxmlformats.org/drawingml/2006/main" xmlns:r="http://schemas.openxmlformats.org/officeDocument/2006/relationships" xmlns:mc="http://schemas.openxmlformats.org/markup-compatibility/2006" xmlns:mv="urn:schemas-microsoft-com:mac:vml" xmlns:p="http://schemas.openxmlformats.org/presentationml/2006/main" xmlns:c="http://schemas.openxmlformats.org/drawingml/2006/chart" xmlns:dgm="http://schemas.openxmlformats.org/drawingml/2006/diagram" xmlns:o="urn:schemas-microsoft-com:office:office" xmlns:v="urn:schemas-microsoft-com:vml" xmlns:pvml="urn:schemas-microsoft-com:office:powerpoint" xmlns:com="http://schemas.openxmlformats.org/drawingml/2006/compatibility" xmlns:p14="http://schemas.microsoft.com/office/powerpoint/2010/main" xmlns:p15="http://schemas.microsoft.com/office/powerpoint/2012/main">
-  <p:cSld>
-    <p:spTree>
-      <p:nvGrpSpPr>
-        <p:cNvPr id="118" name="Shape 118"/>
-        <p:cNvGrpSpPr/>
-        <p:nvPr/>
-      </p:nvGrpSpPr>
-      <p:grpSpPr>
-        <a:xfrm>
-          <a:off x="0" y="0"/>
-          <a:ext cx="0" cy="0"/>
-          <a:chOff x="0" y="0"/>
-          <a:chExt cx="0" cy="0"/>
-        </a:xfrm>
-      </p:grpSpPr>
-      <p:sp>
-        <p:nvSpPr>
-          <p:cNvPr id="119" name="Google Shape;119;p23"/>
-          <p:cNvSpPr txBox="1"/>
-          <p:nvPr>
-            <p:ph type="title"/>
-          </p:nvPr>
-        </p:nvSpPr>
-        <p:spPr>
-          <a:xfrm>
-            <a:off x="311700" y="445025"/>
-            <a:ext cx="8520600" cy="572700"/>
-          </a:xfrm>
-          <a:prstGeom prst="rect">
-            <a:avLst/>
-          </a:prstGeom>
-        </p:spPr>
-        <p:txBody>
-          <a:bodyPr anchorCtr="0" anchor="t" bIns="91425" lIns="91425" spcFirstLastPara="1" rIns="91425" wrap="square" tIns="91425">
-            <a:noAutofit/>
-          </a:bodyPr>
-          <a:lstStyle/>
-          <a:p>
-            <a:pPr indent="0" lvl="0" marL="0" rtl="0" algn="l">
-              <a:spcBef>
-                <a:spcPts val="0"/>
-              </a:spcBef>
-              <a:spcAft>
-                <a:spcPts val="0"/>
-              </a:spcAft>
-              <a:buNone/>
-            </a:pPr>
-            <a:r>
-              <a:rPr lang="id"/>
-              <a:t>Child Component - </a:t>
-            </a:r>
-            <a:r>
-              <a:rPr i="1" lang="id"/>
-              <a:t>Home</a:t>
-            </a:r>
-            <a:endParaRPr i="1"/>
-          </a:p>
-        </p:txBody>
-      </p:sp>
-      <p:pic>
-        <p:nvPicPr>
-          <p:cNvPr id="120" name="Google Shape;120;p23"/>
-          <p:cNvPicPr preferRelativeResize="0"/>
-          <p:nvPr/>
-        </p:nvPicPr>
-        <p:blipFill>
-          <a:blip r:embed="rId3">
-            <a:alphaModFix/>
-          </a:blip>
-          <a:stretch>
-            <a:fillRect/>
-          </a:stretch>
-        </p:blipFill>
-        <p:spPr>
-          <a:xfrm>
-            <a:off x="435675" y="1170125"/>
-            <a:ext cx="5986781" cy="3820975"/>
-          </a:xfrm>
-          <a:prstGeom prst="rect">
-            <a:avLst/>
-          </a:prstGeom>
-          <a:noFill/>
-          <a:ln>
-            <a:noFill/>
-          </a:ln>
-        </p:spPr>
-      </p:pic>
-    </p:spTree>
-  </p:cSld>
-  <p:clrMapOvr>
-    <a:masterClrMapping/>
-  </p:clrMapOvr>
-</p:sld>
-</file>
-
-<file path=ppt/slides/slide12.xml><?xml version="1.0" encoding="utf-8"?>
-<p:sld xmlns:a="http://schemas.openxmlformats.org/drawingml/2006/main" xmlns:r="http://schemas.openxmlformats.org/officeDocument/2006/relationships" xmlns:mc="http://schemas.openxmlformats.org/markup-compatibility/2006" xmlns:mv="urn:schemas-microsoft-com:mac:vml" xmlns:p="http://schemas.openxmlformats.org/presentationml/2006/main" xmlns:c="http://schemas.openxmlformats.org/drawingml/2006/chart" xmlns:dgm="http://schemas.openxmlformats.org/drawingml/2006/diagram" xmlns:o="urn:schemas-microsoft-com:office:office" xmlns:v="urn:schemas-microsoft-com:vml" xmlns:pvml="urn:schemas-microsoft-com:office:powerpoint" xmlns:com="http://schemas.openxmlformats.org/drawingml/2006/compatibility" xmlns:p14="http://schemas.microsoft.com/office/powerpoint/2010/main" xmlns:p15="http://schemas.microsoft.com/office/powerpoint/2012/main">
-  <p:cSld>
-    <p:spTree>
-      <p:nvGrpSpPr>
-        <p:cNvPr id="124" name="Shape 124"/>
-        <p:cNvGrpSpPr/>
-        <p:nvPr/>
-      </p:nvGrpSpPr>
-      <p:grpSpPr>
-        <a:xfrm>
-          <a:off x="0" y="0"/>
-          <a:ext cx="0" cy="0"/>
-          <a:chOff x="0" y="0"/>
-          <a:chExt cx="0" cy="0"/>
-        </a:xfrm>
-      </p:grpSpPr>
-      <p:sp>
-        <p:nvSpPr>
-          <p:cNvPr id="125" name="Google Shape;125;p24"/>
-          <p:cNvSpPr txBox="1"/>
-          <p:nvPr>
-            <p:ph type="title"/>
-          </p:nvPr>
-        </p:nvSpPr>
-        <p:spPr>
-          <a:xfrm>
-            <a:off x="311700" y="445025"/>
-            <a:ext cx="8520600" cy="572700"/>
-          </a:xfrm>
-          <a:prstGeom prst="rect">
-            <a:avLst/>
-          </a:prstGeom>
-        </p:spPr>
-        <p:txBody>
-          <a:bodyPr anchorCtr="0" anchor="t" bIns="91425" lIns="91425" spcFirstLastPara="1" rIns="91425" wrap="square" tIns="91425">
-            <a:noAutofit/>
-          </a:bodyPr>
-          <a:lstStyle/>
-          <a:p>
-            <a:pPr indent="0" lvl="0" marL="0" rtl="0" algn="l">
-              <a:spcBef>
-                <a:spcPts val="0"/>
-              </a:spcBef>
-              <a:spcAft>
-                <a:spcPts val="0"/>
-              </a:spcAft>
-              <a:buClr>
-                <a:schemeClr val="dk1"/>
-              </a:buClr>
-              <a:buSzPts val="1100"/>
-              <a:buFont typeface="Arial"/>
-              <a:buNone/>
-            </a:pPr>
-            <a:r>
-              <a:rPr lang="id"/>
-              <a:t>Child Component - </a:t>
-            </a:r>
-            <a:r>
-              <a:rPr i="1" lang="id"/>
-              <a:t>Profile</a:t>
-            </a:r>
-            <a:endParaRPr i="1"/>
-          </a:p>
-        </p:txBody>
-      </p:sp>
-      <p:pic>
-        <p:nvPicPr>
-          <p:cNvPr id="126" name="Google Shape;126;p24"/>
-          <p:cNvPicPr preferRelativeResize="0"/>
-          <p:nvPr/>
-        </p:nvPicPr>
-        <p:blipFill>
-          <a:blip r:embed="rId3">
-            <a:alphaModFix/>
-          </a:blip>
-          <a:stretch>
-            <a:fillRect/>
-          </a:stretch>
-        </p:blipFill>
-        <p:spPr>
-          <a:xfrm>
-            <a:off x="424225" y="1140325"/>
-            <a:ext cx="5134908" cy="3820976"/>
           </a:xfrm>
           <a:prstGeom prst="rect">
             <a:avLst/>
@@ -7769,7 +8088,7 @@
   <p:cSld>
     <p:spTree>
       <p:nvGrpSpPr>
-        <p:cNvPr id="130" name="Shape 130"/>
+        <p:cNvPr id="140" name="Shape 140"/>
         <p:cNvGrpSpPr/>
         <p:nvPr/>
       </p:nvGrpSpPr>
@@ -7783,7 +8102,210 @@
       </p:grpSpPr>
       <p:sp>
         <p:nvSpPr>
-          <p:cNvPr id="131" name="Google Shape;131;p25"/>
+          <p:cNvPr id="141" name="Google Shape;141;p25"/>
+          <p:cNvSpPr txBox="1"/>
+          <p:nvPr>
+            <p:ph type="title"/>
+          </p:nvPr>
+        </p:nvSpPr>
+        <p:spPr>
+          <a:xfrm>
+            <a:off x="311700" y="445025"/>
+            <a:ext cx="8520600" cy="572700"/>
+          </a:xfrm>
+          <a:prstGeom prst="rect">
+            <a:avLst/>
+          </a:prstGeom>
+        </p:spPr>
+        <p:txBody>
+          <a:bodyPr anchorCtr="0" anchor="t" bIns="91425" lIns="91425" spcFirstLastPara="1" rIns="91425" wrap="square" tIns="91425">
+            <a:noAutofit/>
+          </a:bodyPr>
+          <a:lstStyle/>
+          <a:p>
+            <a:pPr indent="0" lvl="0" marL="0" rtl="0" algn="l">
+              <a:spcBef>
+                <a:spcPts val="0"/>
+              </a:spcBef>
+              <a:spcAft>
+                <a:spcPts val="0"/>
+              </a:spcAft>
+              <a:buNone/>
+            </a:pPr>
+            <a:r>
+              <a:rPr lang="id"/>
+              <a:t>Passed Component - </a:t>
+            </a:r>
+            <a:r>
+              <a:rPr i="1" lang="id"/>
+              <a:t>Home</a:t>
+            </a:r>
+            <a:endParaRPr i="1"/>
+          </a:p>
+        </p:txBody>
+      </p:sp>
+      <p:pic>
+        <p:nvPicPr>
+          <p:cNvPr id="142" name="Google Shape;142;p25"/>
+          <p:cNvPicPr preferRelativeResize="0"/>
+          <p:nvPr/>
+        </p:nvPicPr>
+        <p:blipFill>
+          <a:blip r:embed="rId3">
+            <a:alphaModFix/>
+          </a:blip>
+          <a:stretch>
+            <a:fillRect/>
+          </a:stretch>
+        </p:blipFill>
+        <p:spPr>
+          <a:xfrm>
+            <a:off x="435675" y="1170125"/>
+            <a:ext cx="5986781" cy="3820975"/>
+          </a:xfrm>
+          <a:prstGeom prst="rect">
+            <a:avLst/>
+          </a:prstGeom>
+          <a:noFill/>
+          <a:ln>
+            <a:noFill/>
+          </a:ln>
+        </p:spPr>
+      </p:pic>
+    </p:spTree>
+  </p:cSld>
+  <p:clrMapOvr>
+    <a:masterClrMapping/>
+  </p:clrMapOvr>
+</p:sld>
+</file>
+
+<file path=ppt/slides/slide14.xml><?xml version="1.0" encoding="utf-8"?>
+<p:sld xmlns:a="http://schemas.openxmlformats.org/drawingml/2006/main" xmlns:r="http://schemas.openxmlformats.org/officeDocument/2006/relationships" xmlns:mc="http://schemas.openxmlformats.org/markup-compatibility/2006" xmlns:mv="urn:schemas-microsoft-com:mac:vml" xmlns:p="http://schemas.openxmlformats.org/presentationml/2006/main" xmlns:c="http://schemas.openxmlformats.org/drawingml/2006/chart" xmlns:dgm="http://schemas.openxmlformats.org/drawingml/2006/diagram" xmlns:o="urn:schemas-microsoft-com:office:office" xmlns:v="urn:schemas-microsoft-com:vml" xmlns:pvml="urn:schemas-microsoft-com:office:powerpoint" xmlns:com="http://schemas.openxmlformats.org/drawingml/2006/compatibility" xmlns:p14="http://schemas.microsoft.com/office/powerpoint/2010/main" xmlns:p15="http://schemas.microsoft.com/office/powerpoint/2012/main">
+  <p:cSld>
+    <p:spTree>
+      <p:nvGrpSpPr>
+        <p:cNvPr id="146" name="Shape 146"/>
+        <p:cNvGrpSpPr/>
+        <p:nvPr/>
+      </p:nvGrpSpPr>
+      <p:grpSpPr>
+        <a:xfrm>
+          <a:off x="0" y="0"/>
+          <a:ext cx="0" cy="0"/>
+          <a:chOff x="0" y="0"/>
+          <a:chExt cx="0" cy="0"/>
+        </a:xfrm>
+      </p:grpSpPr>
+      <p:sp>
+        <p:nvSpPr>
+          <p:cNvPr id="147" name="Google Shape;147;p26"/>
+          <p:cNvSpPr txBox="1"/>
+          <p:nvPr>
+            <p:ph type="title"/>
+          </p:nvPr>
+        </p:nvSpPr>
+        <p:spPr>
+          <a:xfrm>
+            <a:off x="311700" y="445025"/>
+            <a:ext cx="8520600" cy="572700"/>
+          </a:xfrm>
+          <a:prstGeom prst="rect">
+            <a:avLst/>
+          </a:prstGeom>
+        </p:spPr>
+        <p:txBody>
+          <a:bodyPr anchorCtr="0" anchor="t" bIns="91425" lIns="91425" spcFirstLastPara="1" rIns="91425" wrap="square" tIns="91425">
+            <a:noAutofit/>
+          </a:bodyPr>
+          <a:lstStyle/>
+          <a:p>
+            <a:pPr indent="0" lvl="0" marL="0" rtl="0" algn="l">
+              <a:spcBef>
+                <a:spcPts val="0"/>
+              </a:spcBef>
+              <a:spcAft>
+                <a:spcPts val="0"/>
+              </a:spcAft>
+              <a:buClr>
+                <a:schemeClr val="dk1"/>
+              </a:buClr>
+              <a:buSzPts val="1100"/>
+              <a:buFont typeface="Arial"/>
+              <a:buNone/>
+            </a:pPr>
+            <a:r>
+              <a:rPr lang="id"/>
+              <a:t>Passed</a:t>
+            </a:r>
+            <a:r>
+              <a:rPr lang="id"/>
+              <a:t> Component - </a:t>
+            </a:r>
+            <a:r>
+              <a:rPr i="1" lang="id"/>
+              <a:t>Profile</a:t>
+            </a:r>
+            <a:endParaRPr i="1"/>
+          </a:p>
+        </p:txBody>
+      </p:sp>
+      <p:pic>
+        <p:nvPicPr>
+          <p:cNvPr id="148" name="Google Shape;148;p26"/>
+          <p:cNvPicPr preferRelativeResize="0"/>
+          <p:nvPr/>
+        </p:nvPicPr>
+        <p:blipFill>
+          <a:blip r:embed="rId3">
+            <a:alphaModFix/>
+          </a:blip>
+          <a:stretch>
+            <a:fillRect/>
+          </a:stretch>
+        </p:blipFill>
+        <p:spPr>
+          <a:xfrm>
+            <a:off x="424225" y="1140325"/>
+            <a:ext cx="5134908" cy="3820976"/>
+          </a:xfrm>
+          <a:prstGeom prst="rect">
+            <a:avLst/>
+          </a:prstGeom>
+          <a:noFill/>
+          <a:ln>
+            <a:noFill/>
+          </a:ln>
+        </p:spPr>
+      </p:pic>
+    </p:spTree>
+  </p:cSld>
+  <p:clrMapOvr>
+    <a:masterClrMapping/>
+  </p:clrMapOvr>
+</p:sld>
+</file>
+
+<file path=ppt/slides/slide15.xml><?xml version="1.0" encoding="utf-8"?>
+<p:sld xmlns:a="http://schemas.openxmlformats.org/drawingml/2006/main" xmlns:r="http://schemas.openxmlformats.org/officeDocument/2006/relationships" xmlns:mc="http://schemas.openxmlformats.org/markup-compatibility/2006" xmlns:mv="urn:schemas-microsoft-com:mac:vml" xmlns:p="http://schemas.openxmlformats.org/presentationml/2006/main" xmlns:c="http://schemas.openxmlformats.org/drawingml/2006/chart" xmlns:dgm="http://schemas.openxmlformats.org/drawingml/2006/diagram" xmlns:o="urn:schemas-microsoft-com:office:office" xmlns:v="urn:schemas-microsoft-com:vml" xmlns:pvml="urn:schemas-microsoft-com:office:powerpoint" xmlns:com="http://schemas.openxmlformats.org/drawingml/2006/compatibility" xmlns:p14="http://schemas.microsoft.com/office/powerpoint/2010/main" xmlns:p15="http://schemas.microsoft.com/office/powerpoint/2012/main">
+  <p:cSld>
+    <p:spTree>
+      <p:nvGrpSpPr>
+        <p:cNvPr id="152" name="Shape 152"/>
+        <p:cNvGrpSpPr/>
+        <p:nvPr/>
+      </p:nvGrpSpPr>
+      <p:grpSpPr>
+        <a:xfrm>
+          <a:off x="0" y="0"/>
+          <a:ext cx="0" cy="0"/>
+          <a:chOff x="0" y="0"/>
+          <a:chExt cx="0" cy="0"/>
+        </a:xfrm>
+      </p:grpSpPr>
+      <p:sp>
+        <p:nvSpPr>
+          <p:cNvPr id="153" name="Google Shape;153;p27"/>
           <p:cNvSpPr txBox="1"/>
           <p:nvPr>
             <p:ph type="title"/>
@@ -7823,7 +8345,7 @@
       </p:sp>
       <p:sp>
         <p:nvSpPr>
-          <p:cNvPr id="132" name="Google Shape;132;p25"/>
+          <p:cNvPr id="154" name="Google Shape;154;p27"/>
           <p:cNvSpPr txBox="1"/>
           <p:nvPr>
             <p:ph idx="1" type="body"/>
@@ -7929,12 +8451,12 @@
 </p:sld>
 </file>
 
-<file path=ppt/slides/slide14.xml><?xml version="1.0" encoding="utf-8"?>
+<file path=ppt/slides/slide16.xml><?xml version="1.0" encoding="utf-8"?>
 <p:sld xmlns:a="http://schemas.openxmlformats.org/drawingml/2006/main" xmlns:r="http://schemas.openxmlformats.org/officeDocument/2006/relationships" xmlns:mc="http://schemas.openxmlformats.org/markup-compatibility/2006" xmlns:mv="urn:schemas-microsoft-com:mac:vml" xmlns:p="http://schemas.openxmlformats.org/presentationml/2006/main" xmlns:c="http://schemas.openxmlformats.org/drawingml/2006/chart" xmlns:dgm="http://schemas.openxmlformats.org/drawingml/2006/diagram" xmlns:o="urn:schemas-microsoft-com:office:office" xmlns:v="urn:schemas-microsoft-com:vml" xmlns:pvml="urn:schemas-microsoft-com:office:powerpoint" xmlns:com="http://schemas.openxmlformats.org/drawingml/2006/compatibility" xmlns:p14="http://schemas.microsoft.com/office/powerpoint/2010/main" xmlns:p15="http://schemas.microsoft.com/office/powerpoint/2012/main">
   <p:cSld>
     <p:spTree>
       <p:nvGrpSpPr>
-        <p:cNvPr id="136" name="Shape 136"/>
+        <p:cNvPr id="158" name="Shape 158"/>
         <p:cNvGrpSpPr/>
         <p:nvPr/>
       </p:nvGrpSpPr>
@@ -7948,7 +8470,7 @@
       </p:grpSpPr>
       <p:sp>
         <p:nvSpPr>
-          <p:cNvPr id="137" name="Google Shape;137;p26"/>
+          <p:cNvPr id="159" name="Google Shape;159;p28"/>
           <p:cNvSpPr txBox="1"/>
           <p:nvPr>
             <p:ph type="title"/>
@@ -7980,7 +8502,7 @@
             </a:pPr>
             <a:r>
               <a:rPr lang="id"/>
-              <a:t>Parent Component - </a:t>
+              <a:t>Custom Hooks Component - </a:t>
             </a:r>
             <a:r>
               <a:rPr i="1" lang="id">
@@ -8000,7 +8522,7 @@
       </p:sp>
       <p:pic>
         <p:nvPicPr>
-          <p:cNvPr id="138" name="Google Shape;138;p26"/>
+          <p:cNvPr id="160" name="Google Shape;160;p28"/>
           <p:cNvPicPr preferRelativeResize="0"/>
           <p:nvPr/>
         </p:nvPicPr>
@@ -8034,12 +8556,12 @@
 </p:sld>
 </file>
 
-<file path=ppt/slides/slide15.xml><?xml version="1.0" encoding="utf-8"?>
+<file path=ppt/slides/slide17.xml><?xml version="1.0" encoding="utf-8"?>
 <p:sld xmlns:a="http://schemas.openxmlformats.org/drawingml/2006/main" xmlns:r="http://schemas.openxmlformats.org/officeDocument/2006/relationships" xmlns:mc="http://schemas.openxmlformats.org/markup-compatibility/2006" xmlns:mv="urn:schemas-microsoft-com:mac:vml" xmlns:p="http://schemas.openxmlformats.org/presentationml/2006/main" xmlns:c="http://schemas.openxmlformats.org/drawingml/2006/chart" xmlns:dgm="http://schemas.openxmlformats.org/drawingml/2006/diagram" xmlns:o="urn:schemas-microsoft-com:office:office" xmlns:v="urn:schemas-microsoft-com:vml" xmlns:pvml="urn:schemas-microsoft-com:office:powerpoint" xmlns:com="http://schemas.openxmlformats.org/drawingml/2006/compatibility" xmlns:p14="http://schemas.microsoft.com/office/powerpoint/2010/main" xmlns:p15="http://schemas.microsoft.com/office/powerpoint/2012/main">
   <p:cSld>
     <p:spTree>
       <p:nvGrpSpPr>
-        <p:cNvPr id="142" name="Shape 142"/>
+        <p:cNvPr id="164" name="Shape 164"/>
         <p:cNvGrpSpPr/>
         <p:nvPr/>
       </p:nvGrpSpPr>
@@ -8053,7 +8575,7 @@
       </p:grpSpPr>
       <p:sp>
         <p:nvSpPr>
-          <p:cNvPr id="143" name="Google Shape;143;p27"/>
+          <p:cNvPr id="165" name="Google Shape;165;p29"/>
           <p:cNvSpPr txBox="1"/>
           <p:nvPr>
             <p:ph type="title"/>
@@ -8085,11 +8607,19 @@
             </a:pPr>
             <a:r>
               <a:rPr lang="id"/>
-              <a:t>Child</a:t>
+              <a:t>C</a:t>
             </a:r>
             <a:r>
               <a:rPr lang="id"/>
-              <a:t> Component - </a:t>
+              <a:t>omponent </a:t>
+            </a:r>
+            <a:r>
+              <a:rPr lang="id"/>
+              <a:t>Consumer</a:t>
+            </a:r>
+            <a:r>
+              <a:rPr lang="id"/>
+              <a:t> - </a:t>
             </a:r>
             <a:r>
               <a:rPr i="1" lang="id"/>
@@ -8105,7 +8635,7 @@
       </p:sp>
       <p:pic>
         <p:nvPicPr>
-          <p:cNvPr id="144" name="Google Shape;144;p27"/>
+          <p:cNvPr id="166" name="Google Shape;166;p29"/>
           <p:cNvPicPr preferRelativeResize="0"/>
           <p:nvPr/>
         </p:nvPicPr>
@@ -8139,12 +8669,12 @@
 </p:sld>
 </file>
 
-<file path=ppt/slides/slide16.xml><?xml version="1.0" encoding="utf-8"?>
+<file path=ppt/slides/slide18.xml><?xml version="1.0" encoding="utf-8"?>
 <p:sld xmlns:a="http://schemas.openxmlformats.org/drawingml/2006/main" xmlns:r="http://schemas.openxmlformats.org/officeDocument/2006/relationships" xmlns:mc="http://schemas.openxmlformats.org/markup-compatibility/2006" xmlns:mv="urn:schemas-microsoft-com:mac:vml" xmlns:p="http://schemas.openxmlformats.org/presentationml/2006/main" xmlns:c="http://schemas.openxmlformats.org/drawingml/2006/chart" xmlns:dgm="http://schemas.openxmlformats.org/drawingml/2006/diagram" xmlns:o="urn:schemas-microsoft-com:office:office" xmlns:v="urn:schemas-microsoft-com:vml" xmlns:pvml="urn:schemas-microsoft-com:office:powerpoint" xmlns:com="http://schemas.openxmlformats.org/drawingml/2006/compatibility" xmlns:p14="http://schemas.microsoft.com/office/powerpoint/2010/main" xmlns:p15="http://schemas.microsoft.com/office/powerpoint/2012/main">
   <p:cSld>
     <p:spTree>
       <p:nvGrpSpPr>
-        <p:cNvPr id="148" name="Shape 148"/>
+        <p:cNvPr id="170" name="Shape 170"/>
         <p:cNvGrpSpPr/>
         <p:nvPr/>
       </p:nvGrpSpPr>
@@ -8158,7 +8688,7 @@
       </p:grpSpPr>
       <p:sp>
         <p:nvSpPr>
-          <p:cNvPr id="149" name="Google Shape;149;p28"/>
+          <p:cNvPr id="171" name="Google Shape;171;p30"/>
           <p:cNvSpPr txBox="1"/>
           <p:nvPr>
             <p:ph type="title"/>
@@ -8190,7 +8720,15 @@
             </a:pPr>
             <a:r>
               <a:rPr lang="id"/>
-              <a:t>Child Component - </a:t>
+              <a:t>Component </a:t>
+            </a:r>
+            <a:r>
+              <a:rPr lang="id"/>
+              <a:t>Consumer</a:t>
+            </a:r>
+            <a:r>
+              <a:rPr lang="id"/>
+              <a:t> - </a:t>
             </a:r>
             <a:r>
               <a:rPr i="1" lang="id"/>
@@ -8206,7 +8744,7 @@
       </p:sp>
       <p:pic>
         <p:nvPicPr>
-          <p:cNvPr id="150" name="Google Shape;150;p28"/>
+          <p:cNvPr id="172" name="Google Shape;172;p30"/>
           <p:cNvPicPr preferRelativeResize="0"/>
           <p:nvPr/>
         </p:nvPicPr>
@@ -8240,12 +8778,12 @@
 </p:sld>
 </file>
 
-<file path=ppt/slides/slide17.xml><?xml version="1.0" encoding="utf-8"?>
+<file path=ppt/slides/slide19.xml><?xml version="1.0" encoding="utf-8"?>
 <p:sld xmlns:a="http://schemas.openxmlformats.org/drawingml/2006/main" xmlns:r="http://schemas.openxmlformats.org/officeDocument/2006/relationships" xmlns:mc="http://schemas.openxmlformats.org/markup-compatibility/2006" xmlns:mv="urn:schemas-microsoft-com:mac:vml" xmlns:p="http://schemas.openxmlformats.org/presentationml/2006/main" xmlns:c="http://schemas.openxmlformats.org/drawingml/2006/chart" xmlns:dgm="http://schemas.openxmlformats.org/drawingml/2006/diagram" xmlns:o="urn:schemas-microsoft-com:office:office" xmlns:v="urn:schemas-microsoft-com:vml" xmlns:pvml="urn:schemas-microsoft-com:office:powerpoint" xmlns:com="http://schemas.openxmlformats.org/drawingml/2006/compatibility" xmlns:p14="http://schemas.microsoft.com/office/powerpoint/2010/main" xmlns:p15="http://schemas.microsoft.com/office/powerpoint/2012/main">
   <p:cSld>
     <p:spTree>
       <p:nvGrpSpPr>
-        <p:cNvPr id="154" name="Shape 154"/>
+        <p:cNvPr id="176" name="Shape 176"/>
         <p:cNvGrpSpPr/>
         <p:nvPr/>
       </p:nvGrpSpPr>
@@ -8259,7 +8797,7 @@
       </p:grpSpPr>
       <p:pic>
         <p:nvPicPr>
-          <p:cNvPr id="155" name="Google Shape;155;p29"/>
+          <p:cNvPr id="177" name="Google Shape;177;p31"/>
           <p:cNvPicPr preferRelativeResize="0"/>
           <p:nvPr/>
         </p:nvPicPr>
@@ -8552,12 +9090,133 @@
               <a:buNone/>
             </a:pPr>
             <a:r>
+              <a:rPr lang="id"/>
+              <a:t>Somewhere, in a React Project </a:t>
+            </a:r>
+            <a:endParaRPr/>
+          </a:p>
+        </p:txBody>
+      </p:sp>
+      <p:pic>
+        <p:nvPicPr>
+          <p:cNvPr id="71" name="Google Shape;71;p15"/>
+          <p:cNvPicPr preferRelativeResize="0"/>
+          <p:nvPr/>
+        </p:nvPicPr>
+        <p:blipFill>
+          <a:blip r:embed="rId3">
+            <a:alphaModFix/>
+          </a:blip>
+          <a:stretch>
+            <a:fillRect/>
+          </a:stretch>
+        </p:blipFill>
+        <p:spPr>
+          <a:xfrm>
+            <a:off x="413325" y="1110500"/>
+            <a:ext cx="3598703" cy="3820976"/>
+          </a:xfrm>
+          <a:prstGeom prst="rect">
+            <a:avLst/>
+          </a:prstGeom>
+          <a:noFill/>
+          <a:ln>
+            <a:noFill/>
+          </a:ln>
+        </p:spPr>
+      </p:pic>
+      <p:pic>
+        <p:nvPicPr>
+          <p:cNvPr id="72" name="Google Shape;72;p15"/>
+          <p:cNvPicPr preferRelativeResize="0"/>
+          <p:nvPr/>
+        </p:nvPicPr>
+        <p:blipFill>
+          <a:blip r:embed="rId4">
+            <a:alphaModFix/>
+          </a:blip>
+          <a:stretch>
+            <a:fillRect/>
+          </a:stretch>
+        </p:blipFill>
+        <p:spPr>
+          <a:xfrm>
+            <a:off x="4306075" y="1110500"/>
+            <a:ext cx="3482249" cy="3820974"/>
+          </a:xfrm>
+          <a:prstGeom prst="rect">
+            <a:avLst/>
+          </a:prstGeom>
+          <a:noFill/>
+          <a:ln>
+            <a:noFill/>
+          </a:ln>
+        </p:spPr>
+      </p:pic>
+    </p:spTree>
+  </p:cSld>
+  <p:clrMapOvr>
+    <a:masterClrMapping/>
+  </p:clrMapOvr>
+</p:sld>
+</file>
+
+<file path=ppt/slides/slide4.xml><?xml version="1.0" encoding="utf-8"?>
+<p:sld xmlns:a="http://schemas.openxmlformats.org/drawingml/2006/main" xmlns:r="http://schemas.openxmlformats.org/officeDocument/2006/relationships" xmlns:mc="http://schemas.openxmlformats.org/markup-compatibility/2006" xmlns:mv="urn:schemas-microsoft-com:mac:vml" xmlns:p="http://schemas.openxmlformats.org/presentationml/2006/main" xmlns:c="http://schemas.openxmlformats.org/drawingml/2006/chart" xmlns:dgm="http://schemas.openxmlformats.org/drawingml/2006/diagram" xmlns:o="urn:schemas-microsoft-com:office:office" xmlns:v="urn:schemas-microsoft-com:vml" xmlns:pvml="urn:schemas-microsoft-com:office:powerpoint" xmlns:com="http://schemas.openxmlformats.org/drawingml/2006/compatibility" xmlns:p14="http://schemas.microsoft.com/office/powerpoint/2010/main" xmlns:p15="http://schemas.microsoft.com/office/powerpoint/2012/main">
+  <p:cSld>
+    <p:spTree>
+      <p:nvGrpSpPr>
+        <p:cNvPr id="76" name="Shape 76"/>
+        <p:cNvGrpSpPr/>
+        <p:nvPr/>
+      </p:nvGrpSpPr>
+      <p:grpSpPr>
+        <a:xfrm>
+          <a:off x="0" y="0"/>
+          <a:ext cx="0" cy="0"/>
+          <a:chOff x="0" y="0"/>
+          <a:chExt cx="0" cy="0"/>
+        </a:xfrm>
+      </p:grpSpPr>
+      <p:sp>
+        <p:nvSpPr>
+          <p:cNvPr id="77" name="Google Shape;77;p16"/>
+          <p:cNvSpPr txBox="1"/>
+          <p:nvPr>
+            <p:ph type="title"/>
+          </p:nvPr>
+        </p:nvSpPr>
+        <p:spPr>
+          <a:xfrm>
+            <a:off x="311700" y="445025"/>
+            <a:ext cx="8520600" cy="572700"/>
+          </a:xfrm>
+          <a:prstGeom prst="rect">
+            <a:avLst/>
+          </a:prstGeom>
+        </p:spPr>
+        <p:txBody>
+          <a:bodyPr anchorCtr="0" anchor="t" bIns="91425" lIns="91425" spcFirstLastPara="1" rIns="91425" wrap="square" tIns="91425">
+            <a:noAutofit/>
+          </a:bodyPr>
+          <a:lstStyle/>
+          <a:p>
+            <a:pPr indent="0" lvl="0" marL="0" rtl="0" algn="l">
+              <a:spcBef>
+                <a:spcPts val="0"/>
+              </a:spcBef>
+              <a:spcAft>
+                <a:spcPts val="0"/>
+              </a:spcAft>
+              <a:buNone/>
+            </a:pPr>
+            <a:r>
               <a:rPr b="1" lang="id"/>
-              <a:t>Three</a:t>
+              <a:t>Four</a:t>
             </a:r>
             <a:r>
               <a:rPr lang="id"/>
-              <a:t> Ways</a:t>
+              <a:t> Patterns</a:t>
             </a:r>
             <a:endParaRPr/>
           </a:p>
@@ -8565,7 +9224,7 @@
       </p:sp>
       <p:sp>
         <p:nvSpPr>
-          <p:cNvPr id="71" name="Google Shape;71;p15"/>
+          <p:cNvPr id="78" name="Google Shape;78;p16"/>
           <p:cNvSpPr txBox="1"/>
           <p:nvPr>
             <p:ph idx="1" type="body"/>
@@ -8594,6 +9253,67 @@
                 <a:spcPts val="0"/>
               </a:spcAft>
               <a:buSzPts val="1800"/>
+              <a:buAutoNum type="arabicPeriod"/>
+            </a:pPr>
+            <a:r>
+              <a:rPr lang="id">
+                <a:solidFill>
+                  <a:srgbClr val="6D6D6D"/>
+                </a:solidFill>
+                <a:latin typeface="Roboto"/>
+                <a:ea typeface="Roboto"/>
+                <a:cs typeface="Roboto"/>
+                <a:sym typeface="Roboto"/>
+              </a:rPr>
+              <a:t>Mixins (</a:t>
+            </a:r>
+            <a:r>
+              <a:rPr lang="id">
+                <a:solidFill>
+                  <a:srgbClr val="434343"/>
+                </a:solidFill>
+                <a:latin typeface="Roboto"/>
+                <a:ea typeface="Roboto"/>
+                <a:cs typeface="Roboto"/>
+                <a:sym typeface="Roboto"/>
+              </a:rPr>
+              <a:t>dead</a:t>
+            </a:r>
+            <a:r>
+              <a:rPr lang="id">
+                <a:solidFill>
+                  <a:srgbClr val="6D6D6D"/>
+                </a:solidFill>
+                <a:latin typeface="Roboto"/>
+                <a:ea typeface="Roboto"/>
+                <a:cs typeface="Roboto"/>
+                <a:sym typeface="Roboto"/>
+              </a:rPr>
+              <a:t>)</a:t>
+            </a:r>
+            <a:endParaRPr>
+              <a:solidFill>
+                <a:srgbClr val="6D6D6D"/>
+              </a:solidFill>
+              <a:latin typeface="Roboto"/>
+              <a:ea typeface="Roboto"/>
+              <a:cs typeface="Roboto"/>
+              <a:sym typeface="Roboto"/>
+            </a:endParaRPr>
+          </a:p>
+          <a:p>
+            <a:pPr indent="-342900" lvl="0" marL="457200" rtl="0" algn="l">
+              <a:spcBef>
+                <a:spcPts val="0"/>
+              </a:spcBef>
+              <a:spcAft>
+                <a:spcPts val="0"/>
+              </a:spcAft>
+              <a:buClr>
+                <a:srgbClr val="6D6D6D"/>
+              </a:buClr>
+              <a:buSzPts val="1800"/>
+              <a:buFont typeface="Roboto"/>
               <a:buAutoNum type="arabicPeriod"/>
             </a:pPr>
             <a:r>
@@ -8692,6 +9412,29 @@
               <a:sym typeface="Roboto"/>
             </a:endParaRPr>
           </a:p>
+          <a:p>
+            <a:pPr indent="0" lvl="0" marL="457200" rtl="0" algn="l">
+              <a:spcBef>
+                <a:spcPts val="1600"/>
+              </a:spcBef>
+              <a:spcAft>
+                <a:spcPts val="1600"/>
+              </a:spcAft>
+              <a:buNone/>
+            </a:pPr>
+            <a:r>
+              <a:t/>
+            </a:r>
+            <a:endParaRPr>
+              <a:solidFill>
+                <a:srgbClr val="6D6D6D"/>
+              </a:solidFill>
+              <a:latin typeface="Roboto"/>
+              <a:ea typeface="Roboto"/>
+              <a:cs typeface="Roboto"/>
+              <a:sym typeface="Roboto"/>
+            </a:endParaRPr>
+          </a:p>
         </p:txBody>
       </p:sp>
     </p:spTree>
@@ -8702,12 +9445,123 @@
 </p:sld>
 </file>
 
-<file path=ppt/slides/slide4.xml><?xml version="1.0" encoding="utf-8"?>
+<file path=ppt/slides/slide5.xml><?xml version="1.0" encoding="utf-8"?>
 <p:sld xmlns:a="http://schemas.openxmlformats.org/drawingml/2006/main" xmlns:r="http://schemas.openxmlformats.org/officeDocument/2006/relationships" xmlns:mc="http://schemas.openxmlformats.org/markup-compatibility/2006" xmlns:mv="urn:schemas-microsoft-com:mac:vml" xmlns:p="http://schemas.openxmlformats.org/presentationml/2006/main" xmlns:c="http://schemas.openxmlformats.org/drawingml/2006/chart" xmlns:dgm="http://schemas.openxmlformats.org/drawingml/2006/diagram" xmlns:o="urn:schemas-microsoft-com:office:office" xmlns:v="urn:schemas-microsoft-com:vml" xmlns:pvml="urn:schemas-microsoft-com:office:powerpoint" xmlns:com="http://schemas.openxmlformats.org/drawingml/2006/compatibility" xmlns:p14="http://schemas.microsoft.com/office/powerpoint/2010/main" xmlns:p15="http://schemas.microsoft.com/office/powerpoint/2012/main">
   <p:cSld>
     <p:spTree>
       <p:nvGrpSpPr>
-        <p:cNvPr id="75" name="Shape 75"/>
+        <p:cNvPr id="82" name="Shape 82"/>
+        <p:cNvGrpSpPr/>
+        <p:nvPr/>
+      </p:nvGrpSpPr>
+      <p:grpSpPr>
+        <a:xfrm>
+          <a:off x="0" y="0"/>
+          <a:ext cx="0" cy="0"/>
+          <a:chOff x="0" y="0"/>
+          <a:chExt cx="0" cy="0"/>
+        </a:xfrm>
+      </p:grpSpPr>
+      <p:pic>
+        <p:nvPicPr>
+          <p:cNvPr id="83" name="Google Shape;83;p17"/>
+          <p:cNvPicPr preferRelativeResize="0"/>
+          <p:nvPr/>
+        </p:nvPicPr>
+        <p:blipFill>
+          <a:blip r:embed="rId3">
+            <a:alphaModFix/>
+          </a:blip>
+          <a:stretch>
+            <a:fillRect/>
+          </a:stretch>
+        </p:blipFill>
+        <p:spPr>
+          <a:xfrm>
+            <a:off x="1085050" y="152400"/>
+            <a:ext cx="6757671" cy="4838699"/>
+          </a:xfrm>
+          <a:prstGeom prst="rect">
+            <a:avLst/>
+          </a:prstGeom>
+          <a:noFill/>
+          <a:ln>
+            <a:noFill/>
+          </a:ln>
+        </p:spPr>
+      </p:pic>
+      <p:sp>
+        <p:nvSpPr>
+          <p:cNvPr id="84" name="Google Shape;84;p17"/>
+          <p:cNvSpPr/>
+          <p:nvPr/>
+        </p:nvSpPr>
+        <p:spPr>
+          <a:xfrm rot="-1582502">
+            <a:off x="3278245" y="2485538"/>
+            <a:ext cx="1294556" cy="494263"/>
+          </a:xfrm>
+          <a:prstGeom prst="rect">
+            <a:avLst/>
+          </a:prstGeom>
+          <a:solidFill>
+            <a:schemeClr val="lt2"/>
+          </a:solidFill>
+          <a:ln cap="flat" cmpd="sng" w="28575">
+            <a:solidFill>
+              <a:schemeClr val="dk2"/>
+            </a:solidFill>
+            <a:prstDash val="solid"/>
+            <a:round/>
+            <a:headEnd len="sm" w="sm" type="none"/>
+            <a:tailEnd len="sm" w="sm" type="none"/>
+          </a:ln>
+        </p:spPr>
+        <p:txBody>
+          <a:bodyPr anchorCtr="0" anchor="ctr" bIns="91425" lIns="91425" spcFirstLastPara="1" rIns="91425" wrap="square" tIns="91425">
+            <a:noAutofit/>
+          </a:bodyPr>
+          <a:lstStyle/>
+          <a:p>
+            <a:pPr indent="0" lvl="0" marL="0" rtl="0" algn="l">
+              <a:spcBef>
+                <a:spcPts val="0"/>
+              </a:spcBef>
+              <a:spcAft>
+                <a:spcPts val="0"/>
+              </a:spcAft>
+              <a:buNone/>
+            </a:pPr>
+            <a:r>
+              <a:rPr b="1" lang="id">
+                <a:solidFill>
+                  <a:srgbClr val="FF0000"/>
+                </a:solidFill>
+              </a:rPr>
+              <a:t>CONFIRMED</a:t>
+            </a:r>
+            <a:endParaRPr b="1">
+              <a:solidFill>
+                <a:srgbClr val="FF0000"/>
+              </a:solidFill>
+            </a:endParaRPr>
+          </a:p>
+        </p:txBody>
+      </p:sp>
+    </p:spTree>
+  </p:cSld>
+  <p:clrMapOvr>
+    <a:masterClrMapping/>
+  </p:clrMapOvr>
+</p:sld>
+</file>
+
+<file path=ppt/slides/slide6.xml><?xml version="1.0" encoding="utf-8"?>
+<p:sld xmlns:a="http://schemas.openxmlformats.org/drawingml/2006/main" xmlns:r="http://schemas.openxmlformats.org/officeDocument/2006/relationships" xmlns:mc="http://schemas.openxmlformats.org/markup-compatibility/2006" xmlns:mv="urn:schemas-microsoft-com:mac:vml" xmlns:p="http://schemas.openxmlformats.org/presentationml/2006/main" xmlns:c="http://schemas.openxmlformats.org/drawingml/2006/chart" xmlns:dgm="http://schemas.openxmlformats.org/drawingml/2006/diagram" xmlns:o="urn:schemas-microsoft-com:office:office" xmlns:v="urn:schemas-microsoft-com:vml" xmlns:pvml="urn:schemas-microsoft-com:office:powerpoint" xmlns:com="http://schemas.openxmlformats.org/drawingml/2006/compatibility" xmlns:p14="http://schemas.microsoft.com/office/powerpoint/2010/main" xmlns:p15="http://schemas.microsoft.com/office/powerpoint/2012/main">
+  <p:cSld>
+    <p:spTree>
+      <p:nvGrpSpPr>
+        <p:cNvPr id="88" name="Shape 88"/>
         <p:cNvGrpSpPr/>
         <p:nvPr/>
       </p:nvGrpSpPr>
@@ -8721,7 +9575,162 @@
       </p:grpSpPr>
       <p:sp>
         <p:nvSpPr>
-          <p:cNvPr id="76" name="Google Shape;76;p16"/>
+          <p:cNvPr id="89" name="Google Shape;89;p18"/>
+          <p:cNvSpPr txBox="1"/>
+          <p:nvPr>
+            <p:ph type="title"/>
+          </p:nvPr>
+        </p:nvSpPr>
+        <p:spPr>
+          <a:xfrm>
+            <a:off x="311700" y="445025"/>
+            <a:ext cx="8520600" cy="572700"/>
+          </a:xfrm>
+          <a:prstGeom prst="rect">
+            <a:avLst/>
+          </a:prstGeom>
+        </p:spPr>
+        <p:txBody>
+          <a:bodyPr anchorCtr="0" anchor="t" bIns="91425" lIns="91425" spcFirstLastPara="1" rIns="91425" wrap="square" tIns="91425">
+            <a:noAutofit/>
+          </a:bodyPr>
+          <a:lstStyle/>
+          <a:p>
+            <a:pPr indent="0" lvl="0" marL="0" rtl="0" algn="l">
+              <a:spcBef>
+                <a:spcPts val="0"/>
+              </a:spcBef>
+              <a:spcAft>
+                <a:spcPts val="0"/>
+              </a:spcAft>
+              <a:buNone/>
+            </a:pPr>
+            <a:r>
+              <a:rPr lang="id"/>
+              <a:t>How to start ? Any </a:t>
+            </a:r>
+            <a:r>
+              <a:rPr b="1" lang="id"/>
+              <a:t>Requirement</a:t>
+            </a:r>
+            <a:r>
+              <a:rPr lang="id"/>
+              <a:t> !</a:t>
+            </a:r>
+            <a:endParaRPr/>
+          </a:p>
+        </p:txBody>
+      </p:sp>
+      <p:sp>
+        <p:nvSpPr>
+          <p:cNvPr id="90" name="Google Shape;90;p18"/>
+          <p:cNvSpPr txBox="1"/>
+          <p:nvPr>
+            <p:ph idx="1" type="body"/>
+          </p:nvPr>
+        </p:nvSpPr>
+        <p:spPr>
+          <a:xfrm>
+            <a:off x="311700" y="1152475"/>
+            <a:ext cx="8520600" cy="3416400"/>
+          </a:xfrm>
+          <a:prstGeom prst="rect">
+            <a:avLst/>
+          </a:prstGeom>
+        </p:spPr>
+        <p:txBody>
+          <a:bodyPr anchorCtr="0" anchor="t" bIns="91425" lIns="91425" spcFirstLastPara="1" rIns="91425" wrap="square" tIns="91425">
+            <a:noAutofit/>
+          </a:bodyPr>
+          <a:lstStyle/>
+          <a:p>
+            <a:pPr indent="-342900" lvl="0" marL="457200" rtl="0" algn="l">
+              <a:spcBef>
+                <a:spcPts val="0"/>
+              </a:spcBef>
+              <a:spcAft>
+                <a:spcPts val="0"/>
+              </a:spcAft>
+              <a:buSzPts val="1800"/>
+              <a:buAutoNum type="arabicPeriod"/>
+            </a:pPr>
+            <a:r>
+              <a:rPr lang="id"/>
+              <a:t>You have more than 1 component that use the same logic</a:t>
+            </a:r>
+            <a:endParaRPr/>
+          </a:p>
+          <a:p>
+            <a:pPr indent="-342900" lvl="0" marL="457200" rtl="0" algn="l">
+              <a:spcBef>
+                <a:spcPts val="0"/>
+              </a:spcBef>
+              <a:spcAft>
+                <a:spcPts val="0"/>
+              </a:spcAft>
+              <a:buSzPts val="1800"/>
+              <a:buAutoNum type="arabicPeriod"/>
+            </a:pPr>
+            <a:r>
+              <a:rPr lang="id"/>
+              <a:t>It is related to the use of React functionality like state or lifecycle. </a:t>
+            </a:r>
+            <a:br>
+              <a:rPr lang="id"/>
+            </a:br>
+            <a:r>
+              <a:rPr lang="id"/>
+              <a:t>If it is NOT, create a utility function instead.</a:t>
+            </a:r>
+            <a:endParaRPr/>
+          </a:p>
+          <a:p>
+            <a:pPr indent="-342900" lvl="0" marL="457200" rtl="0" algn="l">
+              <a:spcBef>
+                <a:spcPts val="0"/>
+              </a:spcBef>
+              <a:spcAft>
+                <a:spcPts val="0"/>
+              </a:spcAft>
+              <a:buSzPts val="1800"/>
+              <a:buAutoNum type="arabicPeriod"/>
+            </a:pPr>
+            <a:r>
+              <a:rPr lang="id"/>
+              <a:t>You want to follow DRY principle.</a:t>
+            </a:r>
+            <a:endParaRPr/>
+          </a:p>
+        </p:txBody>
+      </p:sp>
+    </p:spTree>
+  </p:cSld>
+  <p:clrMapOvr>
+    <a:masterClrMapping/>
+  </p:clrMapOvr>
+</p:sld>
+</file>
+
+<file path=ppt/slides/slide7.xml><?xml version="1.0" encoding="utf-8"?>
+<p:sld xmlns:a="http://schemas.openxmlformats.org/drawingml/2006/main" xmlns:r="http://schemas.openxmlformats.org/officeDocument/2006/relationships" xmlns:mc="http://schemas.openxmlformats.org/markup-compatibility/2006" xmlns:mv="urn:schemas-microsoft-com:mac:vml" xmlns:p="http://schemas.openxmlformats.org/presentationml/2006/main" xmlns:c="http://schemas.openxmlformats.org/drawingml/2006/chart" xmlns:dgm="http://schemas.openxmlformats.org/drawingml/2006/diagram" xmlns:o="urn:schemas-microsoft-com:office:office" xmlns:v="urn:schemas-microsoft-com:vml" xmlns:pvml="urn:schemas-microsoft-com:office:powerpoint" xmlns:com="http://schemas.openxmlformats.org/drawingml/2006/compatibility" xmlns:p14="http://schemas.microsoft.com/office/powerpoint/2010/main" xmlns:p15="http://schemas.microsoft.com/office/powerpoint/2012/main">
+  <p:cSld>
+    <p:spTree>
+      <p:nvGrpSpPr>
+        <p:cNvPr id="94" name="Shape 94"/>
+        <p:cNvGrpSpPr/>
+        <p:nvPr/>
+      </p:nvGrpSpPr>
+      <p:grpSpPr>
+        <a:xfrm>
+          <a:off x="0" y="0"/>
+          <a:ext cx="0" cy="0"/>
+          <a:chOff x="0" y="0"/>
+          <a:chExt cx="0" cy="0"/>
+        </a:xfrm>
+      </p:grpSpPr>
+      <p:sp>
+        <p:nvSpPr>
+          <p:cNvPr id="95" name="Google Shape;95;p19"/>
           <p:cNvSpPr txBox="1"/>
           <p:nvPr>
             <p:ph type="title"/>
@@ -8761,7 +9770,7 @@
       </p:sp>
       <p:sp>
         <p:nvSpPr>
-          <p:cNvPr id="77" name="Google Shape;77;p16"/>
+          <p:cNvPr id="96" name="Google Shape;96;p19"/>
           <p:cNvSpPr txBox="1"/>
           <p:nvPr>
             <p:ph idx="1" type="body"/>
@@ -8843,12 +9852,12 @@
 </p:sld>
 </file>
 
-<file path=ppt/slides/slide5.xml><?xml version="1.0" encoding="utf-8"?>
+<file path=ppt/slides/slide8.xml><?xml version="1.0" encoding="utf-8"?>
 <p:sld xmlns:a="http://schemas.openxmlformats.org/drawingml/2006/main" xmlns:r="http://schemas.openxmlformats.org/officeDocument/2006/relationships" xmlns:mc="http://schemas.openxmlformats.org/markup-compatibility/2006" xmlns:mv="urn:schemas-microsoft-com:mac:vml" xmlns:p="http://schemas.openxmlformats.org/presentationml/2006/main" xmlns:c="http://schemas.openxmlformats.org/drawingml/2006/chart" xmlns:dgm="http://schemas.openxmlformats.org/drawingml/2006/diagram" xmlns:o="urn:schemas-microsoft-com:office:office" xmlns:v="urn:schemas-microsoft-com:vml" xmlns:pvml="urn:schemas-microsoft-com:office:powerpoint" xmlns:com="http://schemas.openxmlformats.org/drawingml/2006/compatibility" xmlns:p14="http://schemas.microsoft.com/office/powerpoint/2010/main" xmlns:p15="http://schemas.microsoft.com/office/powerpoint/2012/main">
   <p:cSld>
     <p:spTree>
       <p:nvGrpSpPr>
-        <p:cNvPr id="81" name="Shape 81"/>
+        <p:cNvPr id="100" name="Shape 100"/>
         <p:cNvGrpSpPr/>
         <p:nvPr/>
       </p:nvGrpSpPr>
@@ -8862,7 +9871,7 @@
       </p:grpSpPr>
       <p:sp>
         <p:nvSpPr>
-          <p:cNvPr id="82" name="Google Shape;82;p17"/>
+          <p:cNvPr id="101" name="Google Shape;101;p20"/>
           <p:cNvSpPr txBox="1"/>
           <p:nvPr>
             <p:ph type="title"/>
@@ -8894,7 +9903,7 @@
             </a:pPr>
             <a:r>
               <a:rPr lang="id"/>
-              <a:t>Parent Component - </a:t>
+              <a:t>Render Props Component - </a:t>
             </a:r>
             <a:r>
               <a:rPr i="1" lang="id"/>
@@ -8906,7 +9915,7 @@
       </p:sp>
       <p:pic>
         <p:nvPicPr>
-          <p:cNvPr id="83" name="Google Shape;83;p17"/>
+          <p:cNvPr id="102" name="Google Shape;102;p20"/>
           <p:cNvPicPr preferRelativeResize="0"/>
           <p:nvPr/>
         </p:nvPicPr>
@@ -8920,8 +9929,8 @@
         </p:blipFill>
         <p:spPr>
           <a:xfrm>
-            <a:off x="405850" y="1199950"/>
-            <a:ext cx="4958516" cy="3820974"/>
+            <a:off x="-168375" y="1445950"/>
+            <a:ext cx="4740375" cy="3652872"/>
           </a:xfrm>
           <a:prstGeom prst="rect">
             <a:avLst/>
@@ -8932,6 +9941,166 @@
           </a:ln>
         </p:spPr>
       </p:pic>
+      <p:pic>
+        <p:nvPicPr>
+          <p:cNvPr id="103" name="Google Shape;103;p20"/>
+          <p:cNvPicPr preferRelativeResize="0"/>
+          <p:nvPr/>
+        </p:nvPicPr>
+        <p:blipFill>
+          <a:blip r:embed="rId4">
+            <a:alphaModFix/>
+          </a:blip>
+          <a:stretch>
+            <a:fillRect/>
+          </a:stretch>
+        </p:blipFill>
+        <p:spPr>
+          <a:xfrm>
+            <a:off x="4823528" y="1445955"/>
+            <a:ext cx="4740375" cy="3652875"/>
+          </a:xfrm>
+          <a:prstGeom prst="rect">
+            <a:avLst/>
+          </a:prstGeom>
+          <a:noFill/>
+          <a:ln>
+            <a:noFill/>
+          </a:ln>
+        </p:spPr>
+      </p:pic>
+      <p:sp>
+        <p:nvSpPr>
+          <p:cNvPr id="104" name="Google Shape;104;p20"/>
+          <p:cNvSpPr txBox="1"/>
+          <p:nvPr>
+            <p:ph type="title"/>
+          </p:nvPr>
+        </p:nvSpPr>
+        <p:spPr>
+          <a:xfrm>
+            <a:off x="1597150" y="1017725"/>
+            <a:ext cx="795600" cy="572700"/>
+          </a:xfrm>
+          <a:prstGeom prst="rect">
+            <a:avLst/>
+          </a:prstGeom>
+        </p:spPr>
+        <p:txBody>
+          <a:bodyPr anchorCtr="0" anchor="t" bIns="91425" lIns="91425" spcFirstLastPara="1" rIns="91425" wrap="square" tIns="91425">
+            <a:noAutofit/>
+          </a:bodyPr>
+          <a:lstStyle/>
+          <a:p>
+            <a:pPr indent="0" lvl="0" marL="0" rtl="0" algn="l">
+              <a:spcBef>
+                <a:spcPts val="0"/>
+              </a:spcBef>
+              <a:spcAft>
+                <a:spcPts val="0"/>
+              </a:spcAft>
+              <a:buNone/>
+            </a:pPr>
+            <a:r>
+              <a:rPr b="1" lang="id" sz="1400"/>
+              <a:t>render </a:t>
+            </a:r>
+            <a:endParaRPr b="1" i="1" sz="1400"/>
+          </a:p>
+        </p:txBody>
+      </p:sp>
+      <p:sp>
+        <p:nvSpPr>
+          <p:cNvPr id="105" name="Google Shape;105;p20"/>
+          <p:cNvSpPr txBox="1"/>
+          <p:nvPr>
+            <p:ph type="title"/>
+          </p:nvPr>
+        </p:nvSpPr>
+        <p:spPr>
+          <a:xfrm>
+            <a:off x="4470375" y="980450"/>
+            <a:ext cx="621000" cy="572700"/>
+          </a:xfrm>
+          <a:prstGeom prst="rect">
+            <a:avLst/>
+          </a:prstGeom>
+        </p:spPr>
+        <p:txBody>
+          <a:bodyPr anchorCtr="0" anchor="t" bIns="91425" lIns="91425" spcFirstLastPara="1" rIns="91425" wrap="square" tIns="91425">
+            <a:noAutofit/>
+          </a:bodyPr>
+          <a:lstStyle/>
+          <a:p>
+            <a:pPr indent="0" lvl="0" marL="0" rtl="0" algn="l">
+              <a:spcBef>
+                <a:spcPts val="0"/>
+              </a:spcBef>
+              <a:spcAft>
+                <a:spcPts val="0"/>
+              </a:spcAft>
+              <a:buNone/>
+            </a:pPr>
+            <a:r>
+              <a:rPr b="1" lang="id" sz="1600">
+                <a:solidFill>
+                  <a:srgbClr val="FF0000"/>
+                </a:solidFill>
+              </a:rPr>
+              <a:t>VS</a:t>
+            </a:r>
+            <a:endParaRPr b="1" i="1" sz="1600">
+              <a:solidFill>
+                <a:srgbClr val="FF0000"/>
+              </a:solidFill>
+            </a:endParaRPr>
+          </a:p>
+        </p:txBody>
+      </p:sp>
+      <p:sp>
+        <p:nvSpPr>
+          <p:cNvPr id="106" name="Google Shape;106;p20"/>
+          <p:cNvSpPr txBox="1"/>
+          <p:nvPr>
+            <p:ph type="title"/>
+          </p:nvPr>
+        </p:nvSpPr>
+        <p:spPr>
+          <a:xfrm>
+            <a:off x="6885350" y="1017725"/>
+            <a:ext cx="1202700" cy="572700"/>
+          </a:xfrm>
+          <a:prstGeom prst="rect">
+            <a:avLst/>
+          </a:prstGeom>
+        </p:spPr>
+        <p:txBody>
+          <a:bodyPr anchorCtr="0" anchor="t" bIns="91425" lIns="91425" spcFirstLastPara="1" rIns="91425" wrap="square" tIns="91425">
+            <a:noAutofit/>
+          </a:bodyPr>
+          <a:lstStyle/>
+          <a:p>
+            <a:pPr indent="0" lvl="0" marL="0" rtl="0" algn="l">
+              <a:spcBef>
+                <a:spcPts val="0"/>
+              </a:spcBef>
+              <a:spcAft>
+                <a:spcPts val="0"/>
+              </a:spcAft>
+              <a:buNone/>
+            </a:pPr>
+            <a:r>
+              <a:rPr b="1" lang="id" sz="1400"/>
+              <a:t>children</a:t>
+            </a:r>
+            <a:r>
+              <a:rPr b="1" lang="id" sz="1400"/>
+              <a:t> </a:t>
+            </a:r>
+            <a:endParaRPr b="1" i="1" sz="1400"/>
+          </a:p>
+        </p:txBody>
+      </p:sp>
     </p:spTree>
   </p:cSld>
   <p:clrMapOvr>
@@ -8940,12 +10109,12 @@
 </p:sld>
 </file>
 
-<file path=ppt/slides/slide6.xml><?xml version="1.0" encoding="utf-8"?>
+<file path=ppt/slides/slide9.xml><?xml version="1.0" encoding="utf-8"?>
 <p:sld xmlns:a="http://schemas.openxmlformats.org/drawingml/2006/main" xmlns:r="http://schemas.openxmlformats.org/officeDocument/2006/relationships" xmlns:mc="http://schemas.openxmlformats.org/markup-compatibility/2006" xmlns:mv="urn:schemas-microsoft-com:mac:vml" xmlns:p="http://schemas.openxmlformats.org/presentationml/2006/main" xmlns:c="http://schemas.openxmlformats.org/drawingml/2006/chart" xmlns:dgm="http://schemas.openxmlformats.org/drawingml/2006/diagram" xmlns:o="urn:schemas-microsoft-com:office:office" xmlns:v="urn:schemas-microsoft-com:vml" xmlns:pvml="urn:schemas-microsoft-com:office:powerpoint" xmlns:com="http://schemas.openxmlformats.org/drawingml/2006/compatibility" xmlns:p14="http://schemas.microsoft.com/office/powerpoint/2010/main" xmlns:p15="http://schemas.microsoft.com/office/powerpoint/2012/main">
   <p:cSld>
     <p:spTree>
       <p:nvGrpSpPr>
-        <p:cNvPr id="87" name="Shape 87"/>
+        <p:cNvPr id="110" name="Shape 110"/>
         <p:cNvGrpSpPr/>
         <p:nvPr/>
       </p:nvGrpSpPr>
@@ -8959,7 +10128,7 @@
       </p:grpSpPr>
       <p:sp>
         <p:nvSpPr>
-          <p:cNvPr id="88" name="Google Shape;88;p18"/>
+          <p:cNvPr id="111" name="Google Shape;111;p21"/>
           <p:cNvSpPr txBox="1"/>
           <p:nvPr>
             <p:ph type="title"/>
@@ -8967,7 +10136,7 @@
         </p:nvSpPr>
         <p:spPr>
           <a:xfrm>
-            <a:off x="311700" y="445025"/>
+            <a:off x="311700" y="236300"/>
             <a:ext cx="8520600" cy="572700"/>
           </a:xfrm>
           <a:prstGeom prst="rect">
@@ -8991,7 +10160,7 @@
             </a:pPr>
             <a:r>
               <a:rPr lang="id"/>
-              <a:t>Child Component - </a:t>
+              <a:t>Component - </a:t>
             </a:r>
             <a:r>
               <a:rPr i="1" lang="id"/>
@@ -9003,7 +10172,7 @@
       </p:sp>
       <p:pic>
         <p:nvPicPr>
-          <p:cNvPr id="89" name="Google Shape;89;p18"/>
+          <p:cNvPr id="112" name="Google Shape;112;p21"/>
           <p:cNvPicPr preferRelativeResize="0"/>
           <p:nvPr/>
         </p:nvPicPr>
@@ -9017,7 +10186,7 @@
         </p:blipFill>
         <p:spPr>
           <a:xfrm>
-            <a:off x="405850" y="1125400"/>
+            <a:off x="-436500" y="1259575"/>
             <a:ext cx="4793844" cy="3820975"/>
           </a:xfrm>
           <a:prstGeom prst="rect">
@@ -9029,199 +10198,9 @@
           </a:ln>
         </p:spPr>
       </p:pic>
-    </p:spTree>
-  </p:cSld>
-  <p:clrMapOvr>
-    <a:masterClrMapping/>
-  </p:clrMapOvr>
-</p:sld>
-</file>
-
-<file path=ppt/slides/slide7.xml><?xml version="1.0" encoding="utf-8"?>
-<p:sld xmlns:a="http://schemas.openxmlformats.org/drawingml/2006/main" xmlns:r="http://schemas.openxmlformats.org/officeDocument/2006/relationships" xmlns:mc="http://schemas.openxmlformats.org/markup-compatibility/2006" xmlns:mv="urn:schemas-microsoft-com:mac:vml" xmlns:p="http://schemas.openxmlformats.org/presentationml/2006/main" xmlns:c="http://schemas.openxmlformats.org/drawingml/2006/chart" xmlns:dgm="http://schemas.openxmlformats.org/drawingml/2006/diagram" xmlns:o="urn:schemas-microsoft-com:office:office" xmlns:v="urn:schemas-microsoft-com:vml" xmlns:pvml="urn:schemas-microsoft-com:office:powerpoint" xmlns:com="http://schemas.openxmlformats.org/drawingml/2006/compatibility" xmlns:p14="http://schemas.microsoft.com/office/powerpoint/2010/main" xmlns:p15="http://schemas.microsoft.com/office/powerpoint/2012/main">
-  <p:cSld>
-    <p:spTree>
-      <p:nvGrpSpPr>
-        <p:cNvPr id="93" name="Shape 93"/>
-        <p:cNvGrpSpPr/>
-        <p:nvPr/>
-      </p:nvGrpSpPr>
-      <p:grpSpPr>
-        <a:xfrm>
-          <a:off x="0" y="0"/>
-          <a:ext cx="0" cy="0"/>
-          <a:chOff x="0" y="0"/>
-          <a:chExt cx="0" cy="0"/>
-        </a:xfrm>
-      </p:grpSpPr>
-      <p:sp>
-        <p:nvSpPr>
-          <p:cNvPr id="94" name="Google Shape;94;p19"/>
-          <p:cNvSpPr txBox="1"/>
-          <p:nvPr>
-            <p:ph type="title"/>
-          </p:nvPr>
-        </p:nvSpPr>
-        <p:spPr>
-          <a:xfrm>
-            <a:off x="311700" y="445025"/>
-            <a:ext cx="8520600" cy="572700"/>
-          </a:xfrm>
-          <a:prstGeom prst="rect">
-            <a:avLst/>
-          </a:prstGeom>
-        </p:spPr>
-        <p:txBody>
-          <a:bodyPr anchorCtr="0" anchor="t" bIns="91425" lIns="91425" spcFirstLastPara="1" rIns="91425" wrap="square" tIns="91425">
-            <a:noAutofit/>
-          </a:bodyPr>
-          <a:lstStyle/>
-          <a:p>
-            <a:pPr indent="0" lvl="0" marL="0" rtl="0" algn="l">
-              <a:spcBef>
-                <a:spcPts val="0"/>
-              </a:spcBef>
-              <a:spcAft>
-                <a:spcPts val="0"/>
-              </a:spcAft>
-              <a:buNone/>
-            </a:pPr>
-            <a:r>
-              <a:rPr lang="id"/>
-              <a:t>Child Component - </a:t>
-            </a:r>
-            <a:r>
-              <a:rPr i="1" lang="id"/>
-              <a:t>Profile</a:t>
-            </a:r>
-            <a:endParaRPr i="1"/>
-          </a:p>
-        </p:txBody>
-      </p:sp>
       <p:pic>
         <p:nvPicPr>
-          <p:cNvPr id="95" name="Google Shape;95;p19"/>
-          <p:cNvPicPr preferRelativeResize="0"/>
-          <p:nvPr/>
-        </p:nvPicPr>
-        <p:blipFill>
-          <a:blip r:embed="rId3">
-            <a:alphaModFix/>
-          </a:blip>
-          <a:stretch>
-            <a:fillRect/>
-          </a:stretch>
-        </p:blipFill>
-        <p:spPr>
-          <a:xfrm>
-            <a:off x="420750" y="1170125"/>
-            <a:ext cx="4359504" cy="3820977"/>
-          </a:xfrm>
-          <a:prstGeom prst="rect">
-            <a:avLst/>
-          </a:prstGeom>
-          <a:noFill/>
-          <a:ln>
-            <a:noFill/>
-          </a:ln>
-        </p:spPr>
-      </p:pic>
-    </p:spTree>
-  </p:cSld>
-  <p:clrMapOvr>
-    <a:masterClrMapping/>
-  </p:clrMapOvr>
-</p:sld>
-</file>
-
-<file path=ppt/slides/slide8.xml><?xml version="1.0" encoding="utf-8"?>
-<p:sld xmlns:a="http://schemas.openxmlformats.org/drawingml/2006/main" xmlns:r="http://schemas.openxmlformats.org/officeDocument/2006/relationships" xmlns:mc="http://schemas.openxmlformats.org/markup-compatibility/2006" xmlns:mv="urn:schemas-microsoft-com:mac:vml" xmlns:p="http://schemas.openxmlformats.org/presentationml/2006/main" xmlns:c="http://schemas.openxmlformats.org/drawingml/2006/chart" xmlns:dgm="http://schemas.openxmlformats.org/drawingml/2006/diagram" xmlns:o="urn:schemas-microsoft-com:office:office" xmlns:v="urn:schemas-microsoft-com:vml" xmlns:pvml="urn:schemas-microsoft-com:office:powerpoint" xmlns:com="http://schemas.openxmlformats.org/drawingml/2006/compatibility" xmlns:p14="http://schemas.microsoft.com/office/powerpoint/2010/main" xmlns:p15="http://schemas.microsoft.com/office/powerpoint/2012/main">
-  <p:cSld>
-    <p:spTree>
-      <p:nvGrpSpPr>
-        <p:cNvPr id="99" name="Shape 99"/>
-        <p:cNvGrpSpPr/>
-        <p:nvPr/>
-      </p:nvGrpSpPr>
-      <p:grpSpPr>
-        <a:xfrm>
-          <a:off x="0" y="0"/>
-          <a:ext cx="0" cy="0"/>
-          <a:chOff x="0" y="0"/>
-          <a:chExt cx="0" cy="0"/>
-        </a:xfrm>
-      </p:grpSpPr>
-      <p:sp>
-        <p:nvSpPr>
-          <p:cNvPr id="100" name="Google Shape;100;p20"/>
-          <p:cNvSpPr txBox="1"/>
-          <p:nvPr>
-            <p:ph type="title"/>
-          </p:nvPr>
-        </p:nvSpPr>
-        <p:spPr>
-          <a:xfrm>
-            <a:off x="311700" y="445025"/>
-            <a:ext cx="8520600" cy="572700"/>
-          </a:xfrm>
-          <a:prstGeom prst="rect">
-            <a:avLst/>
-          </a:prstGeom>
-        </p:spPr>
-        <p:txBody>
-          <a:bodyPr anchorCtr="0" anchor="t" bIns="91425" lIns="91425" spcFirstLastPara="1" rIns="91425" wrap="square" tIns="91425">
-            <a:noAutofit/>
-          </a:bodyPr>
-          <a:lstStyle/>
-          <a:p>
-            <a:pPr indent="0" lvl="0" marL="0" rtl="0" algn="l">
-              <a:spcBef>
-                <a:spcPts val="0"/>
-              </a:spcBef>
-              <a:spcAft>
-                <a:spcPts val="0"/>
-              </a:spcAft>
-              <a:buNone/>
-            </a:pPr>
-            <a:r>
-              <a:rPr lang="id"/>
-              <a:t>Without Render Props </a:t>
-            </a:r>
-            <a:endParaRPr/>
-          </a:p>
-        </p:txBody>
-      </p:sp>
-      <p:pic>
-        <p:nvPicPr>
-          <p:cNvPr id="101" name="Google Shape;101;p20"/>
-          <p:cNvPicPr preferRelativeResize="0"/>
-          <p:nvPr/>
-        </p:nvPicPr>
-        <p:blipFill>
-          <a:blip r:embed="rId3">
-            <a:alphaModFix/>
-          </a:blip>
-          <a:stretch>
-            <a:fillRect/>
-          </a:stretch>
-        </p:blipFill>
-        <p:spPr>
-          <a:xfrm>
-            <a:off x="413325" y="1110500"/>
-            <a:ext cx="3598703" cy="3820976"/>
-          </a:xfrm>
-          <a:prstGeom prst="rect">
-            <a:avLst/>
-          </a:prstGeom>
-          <a:noFill/>
-          <a:ln>
-            <a:noFill/>
-          </a:ln>
-        </p:spPr>
-      </p:pic>
-      <p:pic>
-        <p:nvPicPr>
-          <p:cNvPr id="102" name="Google Shape;102;p20"/>
+          <p:cNvPr id="113" name="Google Shape;113;p21"/>
           <p:cNvPicPr preferRelativeResize="0"/>
           <p:nvPr/>
         </p:nvPicPr>
@@ -9235,8 +10214,8 @@
         </p:blipFill>
         <p:spPr>
           <a:xfrm>
-            <a:off x="4306078" y="1110500"/>
-            <a:ext cx="3272371" cy="3820974"/>
+            <a:off x="4658853" y="1259575"/>
+            <a:ext cx="5134891" cy="3820976"/>
           </a:xfrm>
           <a:prstGeom prst="rect">
             <a:avLst/>
@@ -9247,34 +10226,9 @@
           </a:ln>
         </p:spPr>
       </p:pic>
-    </p:spTree>
-  </p:cSld>
-  <p:clrMapOvr>
-    <a:masterClrMapping/>
-  </p:clrMapOvr>
-</p:sld>
-</file>
-
-<file path=ppt/slides/slide9.xml><?xml version="1.0" encoding="utf-8"?>
-<p:sld xmlns:a="http://schemas.openxmlformats.org/drawingml/2006/main" xmlns:r="http://schemas.openxmlformats.org/officeDocument/2006/relationships" xmlns:mc="http://schemas.openxmlformats.org/markup-compatibility/2006" xmlns:mv="urn:schemas-microsoft-com:mac:vml" xmlns:p="http://schemas.openxmlformats.org/presentationml/2006/main" xmlns:c="http://schemas.openxmlformats.org/drawingml/2006/chart" xmlns:dgm="http://schemas.openxmlformats.org/drawingml/2006/diagram" xmlns:o="urn:schemas-microsoft-com:office:office" xmlns:v="urn:schemas-microsoft-com:vml" xmlns:pvml="urn:schemas-microsoft-com:office:powerpoint" xmlns:com="http://schemas.openxmlformats.org/drawingml/2006/compatibility" xmlns:p14="http://schemas.microsoft.com/office/powerpoint/2010/main" xmlns:p15="http://schemas.microsoft.com/office/powerpoint/2012/main">
-  <p:cSld>
-    <p:spTree>
-      <p:nvGrpSpPr>
-        <p:cNvPr id="106" name="Shape 106"/>
-        <p:cNvGrpSpPr/>
-        <p:nvPr/>
-      </p:nvGrpSpPr>
-      <p:grpSpPr>
-        <a:xfrm>
-          <a:off x="0" y="0"/>
-          <a:ext cx="0" cy="0"/>
-          <a:chOff x="0" y="0"/>
-          <a:chExt cx="0" cy="0"/>
-        </a:xfrm>
-      </p:grpSpPr>
       <p:sp>
         <p:nvSpPr>
-          <p:cNvPr id="107" name="Google Shape;107;p21"/>
+          <p:cNvPr id="114" name="Google Shape;114;p21"/>
           <p:cNvSpPr txBox="1"/>
           <p:nvPr>
             <p:ph type="title"/>
@@ -9282,8 +10236,8 @@
         </p:nvSpPr>
         <p:spPr>
           <a:xfrm>
-            <a:off x="311700" y="445025"/>
-            <a:ext cx="8520600" cy="572700"/>
+            <a:off x="1455525" y="883550"/>
+            <a:ext cx="795600" cy="572700"/>
           </a:xfrm>
           <a:prstGeom prst="rect">
             <a:avLst/>
@@ -9305,25 +10259,25 @@
               <a:buNone/>
             </a:pPr>
             <a:r>
-              <a:rPr lang="id"/>
-              <a:t>Higher-Order Components (HOC)</a:t>
+              <a:rPr b="1" lang="id" sz="1400"/>
+              <a:t>render </a:t>
             </a:r>
-            <a:endParaRPr/>
+            <a:endParaRPr b="1" i="1" sz="1400"/>
           </a:p>
         </p:txBody>
       </p:sp>
       <p:sp>
         <p:nvSpPr>
-          <p:cNvPr id="108" name="Google Shape;108;p21"/>
+          <p:cNvPr id="115" name="Google Shape;115;p21"/>
           <p:cNvSpPr txBox="1"/>
           <p:nvPr>
-            <p:ph idx="1" type="body"/>
+            <p:ph type="title"/>
           </p:nvPr>
         </p:nvSpPr>
         <p:spPr>
           <a:xfrm>
-            <a:off x="1013800" y="1721975"/>
-            <a:ext cx="7401000" cy="2697900"/>
+            <a:off x="6743725" y="883550"/>
+            <a:ext cx="1202700" cy="572700"/>
           </a:xfrm>
           <a:prstGeom prst="rect">
             <a:avLst/>
@@ -9340,23 +10294,15 @@
                 <a:spcPts val="0"/>
               </a:spcBef>
               <a:spcAft>
-                <a:spcPts val="1600"/>
+                <a:spcPts val="0"/>
               </a:spcAft>
               <a:buNone/>
             </a:pPr>
             <a:r>
-              <a:rPr lang="id">
-                <a:solidFill>
-                  <a:srgbClr val="6D6D6D"/>
-                </a:solidFill>
-                <a:latin typeface="Roboto"/>
-                <a:ea typeface="Roboto"/>
-                <a:cs typeface="Roboto"/>
-                <a:sym typeface="Roboto"/>
-              </a:rPr>
-              <a:t>A higher-order component (HOC) is an advanced technique in React for reusing component logic.</a:t>
+              <a:rPr b="1" lang="id" sz="1400"/>
+              <a:t>children </a:t>
             </a:r>
-            <a:endParaRPr/>
+            <a:endParaRPr b="1" i="1" sz="1400"/>
           </a:p>
         </p:txBody>
       </p:sp>

</xml_diff>

<commit_message>
update docs and add children props (#2)
</commit_message>
<xml_diff>
--- a/docs/Sharing Common Logic Between Components.pptx
+++ b/docs/Sharing Common Logic Between Components.pptx
@@ -25,16 +25,18 @@
     <p:sldId id="270" r:id="rId20"/>
     <p:sldId id="271" r:id="rId21"/>
     <p:sldId id="272" r:id="rId22"/>
+    <p:sldId id="273" r:id="rId23"/>
+    <p:sldId id="274" r:id="rId24"/>
   </p:sldIdLst>
   <p:sldSz cy="5143500" cx="9144000"/>
   <p:notesSz cx="6858000" cy="9144000"/>
   <p:embeddedFontLst>
     <p:embeddedFont>
       <p:font typeface="Roboto"/>
-      <p:regular r:id="rId23"/>
-      <p:bold r:id="rId24"/>
-      <p:italic r:id="rId25"/>
-      <p:boldItalic r:id="rId26"/>
+      <p:regular r:id="rId25"/>
+      <p:bold r:id="rId26"/>
+      <p:italic r:id="rId27"/>
+      <p:boldItalic r:id="rId28"/>
     </p:embeddedFont>
   </p:embeddedFontLst>
   <p:defaultTextStyle>
@@ -815,7 +817,7 @@
   <p:cSld>
     <p:spTree>
       <p:nvGrpSpPr>
-        <p:cNvPr id="109" name="Shape 109"/>
+        <p:cNvPr id="116" name="Shape 116"/>
         <p:cNvGrpSpPr/>
         <p:nvPr/>
       </p:nvGrpSpPr>
@@ -829,7 +831,7 @@
       </p:grpSpPr>
       <p:sp>
         <p:nvSpPr>
-          <p:cNvPr id="110" name="Google Shape;110;g872a63e31e_0_16:notes"/>
+          <p:cNvPr id="117" name="Google Shape;117;g8085a3dc9c_0_6:notes"/>
           <p:cNvSpPr/>
           <p:nvPr>
             <p:ph idx="2" type="sldImg"/>
@@ -864,7 +866,7 @@
       </p:sp>
       <p:sp>
         <p:nvSpPr>
-          <p:cNvPr id="111" name="Google Shape;111;g872a63e31e_0_16:notes"/>
+          <p:cNvPr id="118" name="Google Shape;118;g8085a3dc9c_0_6:notes"/>
           <p:cNvSpPr txBox="1"/>
           <p:nvPr>
             <p:ph idx="1" type="body"/>
@@ -914,7 +916,7 @@
   <p:cSld>
     <p:spTree>
       <p:nvGrpSpPr>
-        <p:cNvPr id="115" name="Shape 115"/>
+        <p:cNvPr id="125" name="Shape 125"/>
         <p:cNvGrpSpPr/>
         <p:nvPr/>
       </p:nvGrpSpPr>
@@ -928,7 +930,7 @@
       </p:grpSpPr>
       <p:sp>
         <p:nvSpPr>
-          <p:cNvPr id="116" name="Google Shape;116;g8085a3dc9c_0_25:notes"/>
+          <p:cNvPr id="126" name="Google Shape;126;g872a63e31e_0_11:notes"/>
           <p:cNvSpPr/>
           <p:nvPr>
             <p:ph idx="2" type="sldImg"/>
@@ -963,7 +965,7 @@
       </p:sp>
       <p:sp>
         <p:nvSpPr>
-          <p:cNvPr id="117" name="Google Shape;117;g8085a3dc9c_0_25:notes"/>
+          <p:cNvPr id="127" name="Google Shape;127;g872a63e31e_0_11:notes"/>
           <p:cNvSpPr txBox="1"/>
           <p:nvPr>
             <p:ph idx="1" type="body"/>
@@ -1013,7 +1015,7 @@
   <p:cSld>
     <p:spTree>
       <p:nvGrpSpPr>
-        <p:cNvPr id="121" name="Shape 121"/>
+        <p:cNvPr id="131" name="Shape 131"/>
         <p:cNvGrpSpPr/>
         <p:nvPr/>
       </p:nvGrpSpPr>
@@ -1027,7 +1029,7 @@
       </p:grpSpPr>
       <p:sp>
         <p:nvSpPr>
-          <p:cNvPr id="122" name="Google Shape;122;g8085a3dc9c_0_29:notes"/>
+          <p:cNvPr id="132" name="Google Shape;132;g872a63e31e_0_16:notes"/>
           <p:cNvSpPr/>
           <p:nvPr>
             <p:ph idx="2" type="sldImg"/>
@@ -1062,7 +1064,7 @@
       </p:sp>
       <p:sp>
         <p:nvSpPr>
-          <p:cNvPr id="123" name="Google Shape;123;g8085a3dc9c_0_29:notes"/>
+          <p:cNvPr id="133" name="Google Shape;133;g872a63e31e_0_16:notes"/>
           <p:cNvSpPr txBox="1"/>
           <p:nvPr>
             <p:ph idx="1" type="body"/>
@@ -1112,7 +1114,7 @@
   <p:cSld>
     <p:spTree>
       <p:nvGrpSpPr>
-        <p:cNvPr id="127" name="Shape 127"/>
+        <p:cNvPr id="137" name="Shape 137"/>
         <p:cNvGrpSpPr/>
         <p:nvPr/>
       </p:nvGrpSpPr>
@@ -1126,7 +1128,7 @@
       </p:grpSpPr>
       <p:sp>
         <p:nvSpPr>
-          <p:cNvPr id="128" name="Google Shape;128;g872a63e31e_0_21:notes"/>
+          <p:cNvPr id="138" name="Google Shape;138;g8085a3dc9c_0_25:notes"/>
           <p:cNvSpPr/>
           <p:nvPr>
             <p:ph idx="2" type="sldImg"/>
@@ -1161,7 +1163,7 @@
       </p:sp>
       <p:sp>
         <p:nvSpPr>
-          <p:cNvPr id="129" name="Google Shape;129;g872a63e31e_0_21:notes"/>
+          <p:cNvPr id="139" name="Google Shape;139;g8085a3dc9c_0_25:notes"/>
           <p:cNvSpPr txBox="1"/>
           <p:nvPr>
             <p:ph idx="1" type="body"/>
@@ -1211,7 +1213,7 @@
   <p:cSld>
     <p:spTree>
       <p:nvGrpSpPr>
-        <p:cNvPr id="133" name="Shape 133"/>
+        <p:cNvPr id="143" name="Shape 143"/>
         <p:cNvGrpSpPr/>
         <p:nvPr/>
       </p:nvGrpSpPr>
@@ -1225,7 +1227,7 @@
       </p:grpSpPr>
       <p:sp>
         <p:nvSpPr>
-          <p:cNvPr id="134" name="Google Shape;134;g872a63e31e_0_26:notes"/>
+          <p:cNvPr id="144" name="Google Shape;144;g8085a3dc9c_0_29:notes"/>
           <p:cNvSpPr/>
           <p:nvPr>
             <p:ph idx="2" type="sldImg"/>
@@ -1260,7 +1262,7 @@
       </p:sp>
       <p:sp>
         <p:nvSpPr>
-          <p:cNvPr id="135" name="Google Shape;135;g872a63e31e_0_26:notes"/>
+          <p:cNvPr id="145" name="Google Shape;145;g8085a3dc9c_0_29:notes"/>
           <p:cNvSpPr txBox="1"/>
           <p:nvPr>
             <p:ph idx="1" type="body"/>
@@ -1310,7 +1312,7 @@
   <p:cSld>
     <p:spTree>
       <p:nvGrpSpPr>
-        <p:cNvPr id="139" name="Shape 139"/>
+        <p:cNvPr id="149" name="Shape 149"/>
         <p:cNvGrpSpPr/>
         <p:nvPr/>
       </p:nvGrpSpPr>
@@ -1324,7 +1326,7 @@
       </p:grpSpPr>
       <p:sp>
         <p:nvSpPr>
-          <p:cNvPr id="140" name="Google Shape;140;g8085a3dc9c_0_41:notes"/>
+          <p:cNvPr id="150" name="Google Shape;150;g872a63e31e_0_21:notes"/>
           <p:cNvSpPr/>
           <p:nvPr>
             <p:ph idx="2" type="sldImg"/>
@@ -1359,7 +1361,7 @@
       </p:sp>
       <p:sp>
         <p:nvSpPr>
-          <p:cNvPr id="141" name="Google Shape;141;g8085a3dc9c_0_41:notes"/>
+          <p:cNvPr id="151" name="Google Shape;151;g872a63e31e_0_21:notes"/>
           <p:cNvSpPr txBox="1"/>
           <p:nvPr>
             <p:ph idx="1" type="body"/>
@@ -1409,7 +1411,7 @@
   <p:cSld>
     <p:spTree>
       <p:nvGrpSpPr>
-        <p:cNvPr id="145" name="Shape 145"/>
+        <p:cNvPr id="155" name="Shape 155"/>
         <p:cNvGrpSpPr/>
         <p:nvPr/>
       </p:nvGrpSpPr>
@@ -1423,7 +1425,7 @@
       </p:grpSpPr>
       <p:sp>
         <p:nvSpPr>
-          <p:cNvPr id="146" name="Google Shape;146;g8085a3dc9c_0_45:notes"/>
+          <p:cNvPr id="156" name="Google Shape;156;g872a63e31e_0_26:notes"/>
           <p:cNvSpPr/>
           <p:nvPr>
             <p:ph idx="2" type="sldImg"/>
@@ -1458,7 +1460,7 @@
       </p:sp>
       <p:sp>
         <p:nvSpPr>
-          <p:cNvPr id="147" name="Google Shape;147;g8085a3dc9c_0_45:notes"/>
+          <p:cNvPr id="157" name="Google Shape;157;g872a63e31e_0_26:notes"/>
           <p:cNvSpPr txBox="1"/>
           <p:nvPr>
             <p:ph idx="1" type="body"/>
@@ -1508,7 +1510,7 @@
   <p:cSld>
     <p:spTree>
       <p:nvGrpSpPr>
-        <p:cNvPr id="151" name="Shape 151"/>
+        <p:cNvPr id="161" name="Shape 161"/>
         <p:cNvGrpSpPr/>
         <p:nvPr/>
       </p:nvGrpSpPr>
@@ -1522,7 +1524,7 @@
       </p:grpSpPr>
       <p:sp>
         <p:nvSpPr>
-          <p:cNvPr id="152" name="Google Shape;152;g872a63e31e_0_44:notes"/>
+          <p:cNvPr id="162" name="Google Shape;162;g8085a3dc9c_0_41:notes"/>
           <p:cNvSpPr/>
           <p:nvPr>
             <p:ph idx="2" type="sldImg"/>
@@ -1557,7 +1559,205 @@
       </p:sp>
       <p:sp>
         <p:nvSpPr>
-          <p:cNvPr id="153" name="Google Shape;153;g872a63e31e_0_44:notes"/>
+          <p:cNvPr id="163" name="Google Shape;163;g8085a3dc9c_0_41:notes"/>
+          <p:cNvSpPr txBox="1"/>
+          <p:nvPr>
+            <p:ph idx="1" type="body"/>
+          </p:nvPr>
+        </p:nvSpPr>
+        <p:spPr>
+          <a:xfrm>
+            <a:off x="685800" y="4343400"/>
+            <a:ext cx="5486400" cy="4114800"/>
+          </a:xfrm>
+          <a:prstGeom prst="rect">
+            <a:avLst/>
+          </a:prstGeom>
+        </p:spPr>
+        <p:txBody>
+          <a:bodyPr anchorCtr="0" anchor="t" bIns="91425" lIns="91425" spcFirstLastPara="1" rIns="91425" wrap="square" tIns="91425">
+            <a:noAutofit/>
+          </a:bodyPr>
+          <a:lstStyle/>
+          <a:p>
+            <a:pPr indent="0" lvl="0" marL="0" rtl="0" algn="l">
+              <a:spcBef>
+                <a:spcPts val="0"/>
+              </a:spcBef>
+              <a:spcAft>
+                <a:spcPts val="0"/>
+              </a:spcAft>
+              <a:buNone/>
+            </a:pPr>
+            <a:r>
+              <a:t/>
+            </a:r>
+            <a:endParaRPr/>
+          </a:p>
+        </p:txBody>
+      </p:sp>
+    </p:spTree>
+  </p:cSld>
+  <p:clrMapOvr>
+    <a:masterClrMapping/>
+  </p:clrMapOvr>
+</p:notes>
+</file>
+
+<file path=ppt/notesSlides/notesSlide18.xml><?xml version="1.0" encoding="utf-8"?>
+<p:notes xmlns:a="http://schemas.openxmlformats.org/drawingml/2006/main" xmlns:r="http://schemas.openxmlformats.org/officeDocument/2006/relationships" xmlns:mc="http://schemas.openxmlformats.org/markup-compatibility/2006" xmlns:mv="urn:schemas-microsoft-com:mac:vml" xmlns:p="http://schemas.openxmlformats.org/presentationml/2006/main" xmlns:c="http://schemas.openxmlformats.org/drawingml/2006/chart" xmlns:dgm="http://schemas.openxmlformats.org/drawingml/2006/diagram" xmlns:o="urn:schemas-microsoft-com:office:office" xmlns:v="urn:schemas-microsoft-com:vml" xmlns:pvml="urn:schemas-microsoft-com:office:powerpoint" xmlns:com="http://schemas.openxmlformats.org/drawingml/2006/compatibility" xmlns:p14="http://schemas.microsoft.com/office/powerpoint/2010/main" xmlns:p15="http://schemas.microsoft.com/office/powerpoint/2012/main" showMasterPhAnim="0" showMasterSp="0">
+  <p:cSld>
+    <p:spTree>
+      <p:nvGrpSpPr>
+        <p:cNvPr id="167" name="Shape 167"/>
+        <p:cNvGrpSpPr/>
+        <p:nvPr/>
+      </p:nvGrpSpPr>
+      <p:grpSpPr>
+        <a:xfrm>
+          <a:off x="0" y="0"/>
+          <a:ext cx="0" cy="0"/>
+          <a:chOff x="0" y="0"/>
+          <a:chExt cx="0" cy="0"/>
+        </a:xfrm>
+      </p:grpSpPr>
+      <p:sp>
+        <p:nvSpPr>
+          <p:cNvPr id="168" name="Google Shape;168;g8085a3dc9c_0_45:notes"/>
+          <p:cNvSpPr/>
+          <p:nvPr>
+            <p:ph idx="2" type="sldImg"/>
+          </p:nvPr>
+        </p:nvSpPr>
+        <p:spPr>
+          <a:xfrm>
+            <a:off x="381300" y="685800"/>
+            <a:ext cx="6096000" cy="3429000"/>
+          </a:xfrm>
+          <a:custGeom>
+            <a:rect b="b" l="l" r="r" t="t"/>
+            <a:pathLst>
+              <a:path extrusionOk="0" h="120000" w="120000">
+                <a:moveTo>
+                  <a:pt x="0" y="0"/>
+                </a:moveTo>
+                <a:lnTo>
+                  <a:pt x="120000" y="0"/>
+                </a:lnTo>
+                <a:lnTo>
+                  <a:pt x="120000" y="120000"/>
+                </a:lnTo>
+                <a:lnTo>
+                  <a:pt x="0" y="120000"/>
+                </a:lnTo>
+                <a:close/>
+              </a:path>
+            </a:pathLst>
+          </a:custGeom>
+        </p:spPr>
+      </p:sp>
+      <p:sp>
+        <p:nvSpPr>
+          <p:cNvPr id="169" name="Google Shape;169;g8085a3dc9c_0_45:notes"/>
+          <p:cNvSpPr txBox="1"/>
+          <p:nvPr>
+            <p:ph idx="1" type="body"/>
+          </p:nvPr>
+        </p:nvSpPr>
+        <p:spPr>
+          <a:xfrm>
+            <a:off x="685800" y="4343400"/>
+            <a:ext cx="5486400" cy="4114800"/>
+          </a:xfrm>
+          <a:prstGeom prst="rect">
+            <a:avLst/>
+          </a:prstGeom>
+        </p:spPr>
+        <p:txBody>
+          <a:bodyPr anchorCtr="0" anchor="t" bIns="91425" lIns="91425" spcFirstLastPara="1" rIns="91425" wrap="square" tIns="91425">
+            <a:noAutofit/>
+          </a:bodyPr>
+          <a:lstStyle/>
+          <a:p>
+            <a:pPr indent="0" lvl="0" marL="0" rtl="0" algn="l">
+              <a:spcBef>
+                <a:spcPts val="0"/>
+              </a:spcBef>
+              <a:spcAft>
+                <a:spcPts val="0"/>
+              </a:spcAft>
+              <a:buNone/>
+            </a:pPr>
+            <a:r>
+              <a:t/>
+            </a:r>
+            <a:endParaRPr/>
+          </a:p>
+        </p:txBody>
+      </p:sp>
+    </p:spTree>
+  </p:cSld>
+  <p:clrMapOvr>
+    <a:masterClrMapping/>
+  </p:clrMapOvr>
+</p:notes>
+</file>
+
+<file path=ppt/notesSlides/notesSlide19.xml><?xml version="1.0" encoding="utf-8"?>
+<p:notes xmlns:a="http://schemas.openxmlformats.org/drawingml/2006/main" xmlns:r="http://schemas.openxmlformats.org/officeDocument/2006/relationships" xmlns:mc="http://schemas.openxmlformats.org/markup-compatibility/2006" xmlns:mv="urn:schemas-microsoft-com:mac:vml" xmlns:p="http://schemas.openxmlformats.org/presentationml/2006/main" xmlns:c="http://schemas.openxmlformats.org/drawingml/2006/chart" xmlns:dgm="http://schemas.openxmlformats.org/drawingml/2006/diagram" xmlns:o="urn:schemas-microsoft-com:office:office" xmlns:v="urn:schemas-microsoft-com:vml" xmlns:pvml="urn:schemas-microsoft-com:office:powerpoint" xmlns:com="http://schemas.openxmlformats.org/drawingml/2006/compatibility" xmlns:p14="http://schemas.microsoft.com/office/powerpoint/2010/main" xmlns:p15="http://schemas.microsoft.com/office/powerpoint/2012/main" showMasterPhAnim="0" showMasterSp="0">
+  <p:cSld>
+    <p:spTree>
+      <p:nvGrpSpPr>
+        <p:cNvPr id="173" name="Shape 173"/>
+        <p:cNvGrpSpPr/>
+        <p:nvPr/>
+      </p:nvGrpSpPr>
+      <p:grpSpPr>
+        <a:xfrm>
+          <a:off x="0" y="0"/>
+          <a:ext cx="0" cy="0"/>
+          <a:chOff x="0" y="0"/>
+          <a:chExt cx="0" cy="0"/>
+        </a:xfrm>
+      </p:grpSpPr>
+      <p:sp>
+        <p:nvSpPr>
+          <p:cNvPr id="174" name="Google Shape;174;g872a63e31e_0_44:notes"/>
+          <p:cNvSpPr/>
+          <p:nvPr>
+            <p:ph idx="2" type="sldImg"/>
+          </p:nvPr>
+        </p:nvSpPr>
+        <p:spPr>
+          <a:xfrm>
+            <a:off x="381300" y="685800"/>
+            <a:ext cx="6096000" cy="3429000"/>
+          </a:xfrm>
+          <a:custGeom>
+            <a:rect b="b" l="l" r="r" t="t"/>
+            <a:pathLst>
+              <a:path extrusionOk="0" h="120000" w="120000">
+                <a:moveTo>
+                  <a:pt x="0" y="0"/>
+                </a:moveTo>
+                <a:lnTo>
+                  <a:pt x="120000" y="0"/>
+                </a:lnTo>
+                <a:lnTo>
+                  <a:pt x="120000" y="120000"/>
+                </a:lnTo>
+                <a:lnTo>
+                  <a:pt x="0" y="120000"/>
+                </a:lnTo>
+                <a:close/>
+              </a:path>
+            </a:pathLst>
+          </a:custGeom>
+        </p:spPr>
+      </p:sp>
+      <p:sp>
+        <p:nvSpPr>
+          <p:cNvPr id="175" name="Google Shape;175;g872a63e31e_0_44:notes"/>
           <p:cNvSpPr txBox="1"/>
           <p:nvPr>
             <p:ph idx="1" type="body"/>
@@ -1720,7 +1920,7 @@
       </p:grpSpPr>
       <p:sp>
         <p:nvSpPr>
-          <p:cNvPr id="67" name="Google Shape;67;g8085a3dc9c_0_63:notes"/>
+          <p:cNvPr id="67" name="Google Shape;67;g8085a3dc9c_0_18:notes"/>
           <p:cNvSpPr/>
           <p:nvPr>
             <p:ph idx="2" type="sldImg"/>
@@ -1755,7 +1955,7 @@
       </p:sp>
       <p:sp>
         <p:nvSpPr>
-          <p:cNvPr id="68" name="Google Shape;68;g8085a3dc9c_0_63:notes"/>
+          <p:cNvPr id="68" name="Google Shape;68;g8085a3dc9c_0_18:notes"/>
           <p:cNvSpPr txBox="1"/>
           <p:nvPr>
             <p:ph idx="1" type="body"/>
@@ -1805,7 +2005,7 @@
   <p:cSld>
     <p:spTree>
       <p:nvGrpSpPr>
-        <p:cNvPr id="72" name="Shape 72"/>
+        <p:cNvPr id="73" name="Shape 73"/>
         <p:cNvGrpSpPr/>
         <p:nvPr/>
       </p:nvGrpSpPr>
@@ -1819,7 +2019,7 @@
       </p:grpSpPr>
       <p:sp>
         <p:nvSpPr>
-          <p:cNvPr id="73" name="Google Shape;73;g8085a3dc9c_0_58:notes"/>
+          <p:cNvPr id="74" name="Google Shape;74;g8085a3dc9c_0_63:notes"/>
           <p:cNvSpPr/>
           <p:nvPr>
             <p:ph idx="2" type="sldImg"/>
@@ -1854,7 +2054,7 @@
       </p:sp>
       <p:sp>
         <p:nvSpPr>
-          <p:cNvPr id="74" name="Google Shape;74;g8085a3dc9c_0_58:notes"/>
+          <p:cNvPr id="75" name="Google Shape;75;g8085a3dc9c_0_63:notes"/>
           <p:cNvSpPr txBox="1"/>
           <p:nvPr>
             <p:ph idx="1" type="body"/>
@@ -1904,7 +2104,7 @@
   <p:cSld>
     <p:spTree>
       <p:nvGrpSpPr>
-        <p:cNvPr id="78" name="Shape 78"/>
+        <p:cNvPr id="79" name="Shape 79"/>
         <p:cNvGrpSpPr/>
         <p:nvPr/>
       </p:nvGrpSpPr>
@@ -1918,7 +2118,7 @@
       </p:grpSpPr>
       <p:sp>
         <p:nvSpPr>
-          <p:cNvPr id="79" name="Google Shape;79;g872a63e31e_0_6:notes"/>
+          <p:cNvPr id="80" name="Google Shape;80;g87a0a61c1b_0_14:notes"/>
           <p:cNvSpPr/>
           <p:nvPr>
             <p:ph idx="2" type="sldImg"/>
@@ -1953,7 +2153,7 @@
       </p:sp>
       <p:sp>
         <p:nvSpPr>
-          <p:cNvPr id="80" name="Google Shape;80;g872a63e31e_0_6:notes"/>
+          <p:cNvPr id="81" name="Google Shape;81;g87a0a61c1b_0_14:notes"/>
           <p:cNvSpPr txBox="1"/>
           <p:nvPr>
             <p:ph idx="1" type="body"/>
@@ -2003,7 +2203,7 @@
   <p:cSld>
     <p:spTree>
       <p:nvGrpSpPr>
-        <p:cNvPr id="84" name="Shape 84"/>
+        <p:cNvPr id="85" name="Shape 85"/>
         <p:cNvGrpSpPr/>
         <p:nvPr/>
       </p:nvGrpSpPr>
@@ -2017,7 +2217,7 @@
       </p:grpSpPr>
       <p:sp>
         <p:nvSpPr>
-          <p:cNvPr id="85" name="Google Shape;85;g8085a3dc9c_0_1:notes"/>
+          <p:cNvPr id="86" name="Google Shape;86;g87a0a61c1b_0_22:notes"/>
           <p:cNvSpPr/>
           <p:nvPr>
             <p:ph idx="2" type="sldImg"/>
@@ -2052,7 +2252,7 @@
       </p:sp>
       <p:sp>
         <p:nvSpPr>
-          <p:cNvPr id="86" name="Google Shape;86;g8085a3dc9c_0_1:notes"/>
+          <p:cNvPr id="87" name="Google Shape;87;g87a0a61c1b_0_22:notes"/>
           <p:cNvSpPr txBox="1"/>
           <p:nvPr>
             <p:ph idx="1" type="body"/>
@@ -2102,7 +2302,7 @@
   <p:cSld>
     <p:spTree>
       <p:nvGrpSpPr>
-        <p:cNvPr id="90" name="Shape 90"/>
+        <p:cNvPr id="91" name="Shape 91"/>
         <p:cNvGrpSpPr/>
         <p:nvPr/>
       </p:nvGrpSpPr>
@@ -2116,7 +2316,7 @@
       </p:grpSpPr>
       <p:sp>
         <p:nvSpPr>
-          <p:cNvPr id="91" name="Google Shape;91;g8085a3dc9c_0_6:notes"/>
+          <p:cNvPr id="92" name="Google Shape;92;g8085a3dc9c_0_58:notes"/>
           <p:cNvSpPr/>
           <p:nvPr>
             <p:ph idx="2" type="sldImg"/>
@@ -2151,7 +2351,7 @@
       </p:sp>
       <p:sp>
         <p:nvSpPr>
-          <p:cNvPr id="92" name="Google Shape;92;g8085a3dc9c_0_6:notes"/>
+          <p:cNvPr id="93" name="Google Shape;93;g8085a3dc9c_0_58:notes"/>
           <p:cNvSpPr txBox="1"/>
           <p:nvPr>
             <p:ph idx="1" type="body"/>
@@ -2201,7 +2401,7 @@
   <p:cSld>
     <p:spTree>
       <p:nvGrpSpPr>
-        <p:cNvPr id="96" name="Shape 96"/>
+        <p:cNvPr id="97" name="Shape 97"/>
         <p:cNvGrpSpPr/>
         <p:nvPr/>
       </p:nvGrpSpPr>
@@ -2215,7 +2415,7 @@
       </p:grpSpPr>
       <p:sp>
         <p:nvSpPr>
-          <p:cNvPr id="97" name="Google Shape;97;g8085a3dc9c_0_18:notes"/>
+          <p:cNvPr id="98" name="Google Shape;98;g872a63e31e_0_6:notes"/>
           <p:cNvSpPr/>
           <p:nvPr>
             <p:ph idx="2" type="sldImg"/>
@@ -2250,7 +2450,7 @@
       </p:sp>
       <p:sp>
         <p:nvSpPr>
-          <p:cNvPr id="98" name="Google Shape;98;g8085a3dc9c_0_18:notes"/>
+          <p:cNvPr id="99" name="Google Shape;99;g872a63e31e_0_6:notes"/>
           <p:cNvSpPr txBox="1"/>
           <p:nvPr>
             <p:ph idx="1" type="body"/>
@@ -2300,7 +2500,7 @@
   <p:cSld>
     <p:spTree>
       <p:nvGrpSpPr>
-        <p:cNvPr id="103" name="Shape 103"/>
+        <p:cNvPr id="107" name="Shape 107"/>
         <p:cNvGrpSpPr/>
         <p:nvPr/>
       </p:nvGrpSpPr>
@@ -2314,7 +2514,7 @@
       </p:grpSpPr>
       <p:sp>
         <p:nvSpPr>
-          <p:cNvPr id="104" name="Google Shape;104;g872a63e31e_0_11:notes"/>
+          <p:cNvPr id="108" name="Google Shape;108;g8085a3dc9c_0_1:notes"/>
           <p:cNvSpPr/>
           <p:nvPr>
             <p:ph idx="2" type="sldImg"/>
@@ -2349,7 +2549,7 @@
       </p:sp>
       <p:sp>
         <p:nvSpPr>
-          <p:cNvPr id="105" name="Google Shape;105;g872a63e31e_0_11:notes"/>
+          <p:cNvPr id="109" name="Google Shape;109;g8085a3dc9c_0_1:notes"/>
           <p:cNvSpPr txBox="1"/>
           <p:nvPr>
             <p:ph idx="1" type="body"/>
@@ -7465,7 +7665,7 @@
   <p:cSld>
     <p:spTree>
       <p:nvGrpSpPr>
-        <p:cNvPr id="112" name="Shape 112"/>
+        <p:cNvPr id="119" name="Shape 119"/>
         <p:cNvGrpSpPr/>
         <p:nvPr/>
       </p:nvGrpSpPr>
@@ -7479,7 +7679,7 @@
       </p:grpSpPr>
       <p:sp>
         <p:nvSpPr>
-          <p:cNvPr id="113" name="Google Shape;113;p22"/>
+          <p:cNvPr id="120" name="Google Shape;120;p22"/>
           <p:cNvSpPr txBox="1"/>
           <p:nvPr>
             <p:ph type="title"/>
@@ -7487,7 +7687,7 @@
         </p:nvSpPr>
         <p:spPr>
           <a:xfrm>
-            <a:off x="311700" y="445025"/>
+            <a:off x="311700" y="310850"/>
             <a:ext cx="8520600" cy="572700"/>
           </a:xfrm>
           <a:prstGeom prst="rect">
@@ -7511,7 +7711,325 @@
             </a:pPr>
             <a:r>
               <a:rPr lang="id"/>
-              <a:t>Parent Component - </a:t>
+              <a:t>Component - </a:t>
+            </a:r>
+            <a:r>
+              <a:rPr i="1" lang="id"/>
+              <a:t>Profile</a:t>
+            </a:r>
+            <a:endParaRPr i="1"/>
+          </a:p>
+        </p:txBody>
+      </p:sp>
+      <p:pic>
+        <p:nvPicPr>
+          <p:cNvPr id="121" name="Google Shape;121;p22"/>
+          <p:cNvPicPr preferRelativeResize="0"/>
+          <p:nvPr/>
+        </p:nvPicPr>
+        <p:blipFill>
+          <a:blip r:embed="rId3">
+            <a:alphaModFix/>
+          </a:blip>
+          <a:stretch>
+            <a:fillRect/>
+          </a:stretch>
+        </p:blipFill>
+        <p:spPr>
+          <a:xfrm>
+            <a:off x="-175600" y="1262900"/>
+            <a:ext cx="4359504" cy="3820977"/>
+          </a:xfrm>
+          <a:prstGeom prst="rect">
+            <a:avLst/>
+          </a:prstGeom>
+          <a:noFill/>
+          <a:ln>
+            <a:noFill/>
+          </a:ln>
+        </p:spPr>
+      </p:pic>
+      <p:pic>
+        <p:nvPicPr>
+          <p:cNvPr id="122" name="Google Shape;122;p22"/>
+          <p:cNvPicPr preferRelativeResize="0"/>
+          <p:nvPr/>
+        </p:nvPicPr>
+        <p:blipFill>
+          <a:blip r:embed="rId4">
+            <a:alphaModFix/>
+          </a:blip>
+          <a:stretch>
+            <a:fillRect/>
+          </a:stretch>
+        </p:blipFill>
+        <p:spPr>
+          <a:xfrm>
+            <a:off x="4572000" y="1262900"/>
+            <a:ext cx="4495276" cy="3820976"/>
+          </a:xfrm>
+          <a:prstGeom prst="rect">
+            <a:avLst/>
+          </a:prstGeom>
+          <a:noFill/>
+          <a:ln>
+            <a:noFill/>
+          </a:ln>
+        </p:spPr>
+      </p:pic>
+      <p:sp>
+        <p:nvSpPr>
+          <p:cNvPr id="123" name="Google Shape;123;p22"/>
+          <p:cNvSpPr txBox="1"/>
+          <p:nvPr>
+            <p:ph type="title"/>
+          </p:nvPr>
+        </p:nvSpPr>
+        <p:spPr>
+          <a:xfrm>
+            <a:off x="1455525" y="883550"/>
+            <a:ext cx="795600" cy="572700"/>
+          </a:xfrm>
+          <a:prstGeom prst="rect">
+            <a:avLst/>
+          </a:prstGeom>
+        </p:spPr>
+        <p:txBody>
+          <a:bodyPr anchorCtr="0" anchor="t" bIns="91425" lIns="91425" spcFirstLastPara="1" rIns="91425" wrap="square" tIns="91425">
+            <a:noAutofit/>
+          </a:bodyPr>
+          <a:lstStyle/>
+          <a:p>
+            <a:pPr indent="0" lvl="0" marL="0" rtl="0" algn="l">
+              <a:spcBef>
+                <a:spcPts val="0"/>
+              </a:spcBef>
+              <a:spcAft>
+                <a:spcPts val="0"/>
+              </a:spcAft>
+              <a:buNone/>
+            </a:pPr>
+            <a:r>
+              <a:rPr b="1" lang="id" sz="1400"/>
+              <a:t>render </a:t>
+            </a:r>
+            <a:endParaRPr b="1" i="1" sz="1400"/>
+          </a:p>
+        </p:txBody>
+      </p:sp>
+      <p:sp>
+        <p:nvSpPr>
+          <p:cNvPr id="124" name="Google Shape;124;p22"/>
+          <p:cNvSpPr txBox="1"/>
+          <p:nvPr>
+            <p:ph type="title"/>
+          </p:nvPr>
+        </p:nvSpPr>
+        <p:spPr>
+          <a:xfrm>
+            <a:off x="6743725" y="883550"/>
+            <a:ext cx="1202700" cy="572700"/>
+          </a:xfrm>
+          <a:prstGeom prst="rect">
+            <a:avLst/>
+          </a:prstGeom>
+        </p:spPr>
+        <p:txBody>
+          <a:bodyPr anchorCtr="0" anchor="t" bIns="91425" lIns="91425" spcFirstLastPara="1" rIns="91425" wrap="square" tIns="91425">
+            <a:noAutofit/>
+          </a:bodyPr>
+          <a:lstStyle/>
+          <a:p>
+            <a:pPr indent="0" lvl="0" marL="0" rtl="0" algn="l">
+              <a:spcBef>
+                <a:spcPts val="0"/>
+              </a:spcBef>
+              <a:spcAft>
+                <a:spcPts val="0"/>
+              </a:spcAft>
+              <a:buNone/>
+            </a:pPr>
+            <a:r>
+              <a:rPr b="1" lang="id" sz="1400"/>
+              <a:t>children </a:t>
+            </a:r>
+            <a:endParaRPr b="1" i="1" sz="1400"/>
+          </a:p>
+        </p:txBody>
+      </p:sp>
+    </p:spTree>
+  </p:cSld>
+  <p:clrMapOvr>
+    <a:masterClrMapping/>
+  </p:clrMapOvr>
+</p:sld>
+</file>
+
+<file path=ppt/slides/slide11.xml><?xml version="1.0" encoding="utf-8"?>
+<p:sld xmlns:a="http://schemas.openxmlformats.org/drawingml/2006/main" xmlns:r="http://schemas.openxmlformats.org/officeDocument/2006/relationships" xmlns:mc="http://schemas.openxmlformats.org/markup-compatibility/2006" xmlns:mv="urn:schemas-microsoft-com:mac:vml" xmlns:p="http://schemas.openxmlformats.org/presentationml/2006/main" xmlns:c="http://schemas.openxmlformats.org/drawingml/2006/chart" xmlns:dgm="http://schemas.openxmlformats.org/drawingml/2006/diagram" xmlns:o="urn:schemas-microsoft-com:office:office" xmlns:v="urn:schemas-microsoft-com:vml" xmlns:pvml="urn:schemas-microsoft-com:office:powerpoint" xmlns:com="http://schemas.openxmlformats.org/drawingml/2006/compatibility" xmlns:p14="http://schemas.microsoft.com/office/powerpoint/2010/main" xmlns:p15="http://schemas.microsoft.com/office/powerpoint/2012/main">
+  <p:cSld>
+    <p:spTree>
+      <p:nvGrpSpPr>
+        <p:cNvPr id="128" name="Shape 128"/>
+        <p:cNvGrpSpPr/>
+        <p:nvPr/>
+      </p:nvGrpSpPr>
+      <p:grpSpPr>
+        <a:xfrm>
+          <a:off x="0" y="0"/>
+          <a:ext cx="0" cy="0"/>
+          <a:chOff x="0" y="0"/>
+          <a:chExt cx="0" cy="0"/>
+        </a:xfrm>
+      </p:grpSpPr>
+      <p:sp>
+        <p:nvSpPr>
+          <p:cNvPr id="129" name="Google Shape;129;p23"/>
+          <p:cNvSpPr txBox="1"/>
+          <p:nvPr>
+            <p:ph type="title"/>
+          </p:nvPr>
+        </p:nvSpPr>
+        <p:spPr>
+          <a:xfrm>
+            <a:off x="311700" y="445025"/>
+            <a:ext cx="8520600" cy="572700"/>
+          </a:xfrm>
+          <a:prstGeom prst="rect">
+            <a:avLst/>
+          </a:prstGeom>
+        </p:spPr>
+        <p:txBody>
+          <a:bodyPr anchorCtr="0" anchor="t" bIns="91425" lIns="91425" spcFirstLastPara="1" rIns="91425" wrap="square" tIns="91425">
+            <a:noAutofit/>
+          </a:bodyPr>
+          <a:lstStyle/>
+          <a:p>
+            <a:pPr indent="0" lvl="0" marL="0" rtl="0" algn="l">
+              <a:spcBef>
+                <a:spcPts val="0"/>
+              </a:spcBef>
+              <a:spcAft>
+                <a:spcPts val="0"/>
+              </a:spcAft>
+              <a:buNone/>
+            </a:pPr>
+            <a:r>
+              <a:rPr lang="id"/>
+              <a:t>Higher-Order Components (HOC)</a:t>
+            </a:r>
+            <a:endParaRPr/>
+          </a:p>
+        </p:txBody>
+      </p:sp>
+      <p:sp>
+        <p:nvSpPr>
+          <p:cNvPr id="130" name="Google Shape;130;p23"/>
+          <p:cNvSpPr txBox="1"/>
+          <p:nvPr>
+            <p:ph idx="1" type="body"/>
+          </p:nvPr>
+        </p:nvSpPr>
+        <p:spPr>
+          <a:xfrm>
+            <a:off x="1013800" y="1721975"/>
+            <a:ext cx="7401000" cy="2697900"/>
+          </a:xfrm>
+          <a:prstGeom prst="rect">
+            <a:avLst/>
+          </a:prstGeom>
+        </p:spPr>
+        <p:txBody>
+          <a:bodyPr anchorCtr="0" anchor="t" bIns="91425" lIns="91425" spcFirstLastPara="1" rIns="91425" wrap="square" tIns="91425">
+            <a:noAutofit/>
+          </a:bodyPr>
+          <a:lstStyle/>
+          <a:p>
+            <a:pPr indent="0" lvl="0" marL="0" rtl="0" algn="l">
+              <a:spcBef>
+                <a:spcPts val="0"/>
+              </a:spcBef>
+              <a:spcAft>
+                <a:spcPts val="1600"/>
+              </a:spcAft>
+              <a:buNone/>
+            </a:pPr>
+            <a:r>
+              <a:rPr lang="id">
+                <a:solidFill>
+                  <a:srgbClr val="6D6D6D"/>
+                </a:solidFill>
+                <a:latin typeface="Roboto"/>
+                <a:ea typeface="Roboto"/>
+                <a:cs typeface="Roboto"/>
+                <a:sym typeface="Roboto"/>
+              </a:rPr>
+              <a:t>A higher-order component (HOC) is an advanced technique in React for reusing component logic.</a:t>
+            </a:r>
+            <a:endParaRPr/>
+          </a:p>
+        </p:txBody>
+      </p:sp>
+    </p:spTree>
+  </p:cSld>
+  <p:clrMapOvr>
+    <a:masterClrMapping/>
+  </p:clrMapOvr>
+</p:sld>
+</file>
+
+<file path=ppt/slides/slide12.xml><?xml version="1.0" encoding="utf-8"?>
+<p:sld xmlns:a="http://schemas.openxmlformats.org/drawingml/2006/main" xmlns:r="http://schemas.openxmlformats.org/officeDocument/2006/relationships" xmlns:mc="http://schemas.openxmlformats.org/markup-compatibility/2006" xmlns:mv="urn:schemas-microsoft-com:mac:vml" xmlns:p="http://schemas.openxmlformats.org/presentationml/2006/main" xmlns:c="http://schemas.openxmlformats.org/drawingml/2006/chart" xmlns:dgm="http://schemas.openxmlformats.org/drawingml/2006/diagram" xmlns:o="urn:schemas-microsoft-com:office:office" xmlns:v="urn:schemas-microsoft-com:vml" xmlns:pvml="urn:schemas-microsoft-com:office:powerpoint" xmlns:com="http://schemas.openxmlformats.org/drawingml/2006/compatibility" xmlns:p14="http://schemas.microsoft.com/office/powerpoint/2010/main" xmlns:p15="http://schemas.microsoft.com/office/powerpoint/2012/main">
+  <p:cSld>
+    <p:spTree>
+      <p:nvGrpSpPr>
+        <p:cNvPr id="134" name="Shape 134"/>
+        <p:cNvGrpSpPr/>
+        <p:nvPr/>
+      </p:nvGrpSpPr>
+      <p:grpSpPr>
+        <a:xfrm>
+          <a:off x="0" y="0"/>
+          <a:ext cx="0" cy="0"/>
+          <a:chOff x="0" y="0"/>
+          <a:chExt cx="0" cy="0"/>
+        </a:xfrm>
+      </p:grpSpPr>
+      <p:sp>
+        <p:nvSpPr>
+          <p:cNvPr id="135" name="Google Shape;135;p24"/>
+          <p:cNvSpPr txBox="1"/>
+          <p:nvPr>
+            <p:ph type="title"/>
+          </p:nvPr>
+        </p:nvSpPr>
+        <p:spPr>
+          <a:xfrm>
+            <a:off x="311700" y="445025"/>
+            <a:ext cx="8520600" cy="572700"/>
+          </a:xfrm>
+          <a:prstGeom prst="rect">
+            <a:avLst/>
+          </a:prstGeom>
+        </p:spPr>
+        <p:txBody>
+          <a:bodyPr anchorCtr="0" anchor="t" bIns="91425" lIns="91425" spcFirstLastPara="1" rIns="91425" wrap="square" tIns="91425">
+            <a:noAutofit/>
+          </a:bodyPr>
+          <a:lstStyle/>
+          <a:p>
+            <a:pPr indent="0" lvl="0" marL="0" rtl="0" algn="l">
+              <a:spcBef>
+                <a:spcPts val="0"/>
+              </a:spcBef>
+              <a:spcAft>
+                <a:spcPts val="0"/>
+              </a:spcAft>
+              <a:buNone/>
+            </a:pPr>
+            <a:r>
+              <a:rPr lang="id"/>
+              <a:t>HO-Component - </a:t>
             </a:r>
             <a:r>
               <a:rPr i="1" lang="id">
@@ -7531,7 +8049,7 @@
       </p:sp>
       <p:pic>
         <p:nvPicPr>
-          <p:cNvPr id="114" name="Google Shape;114;p22"/>
+          <p:cNvPr id="136" name="Google Shape;136;p24"/>
           <p:cNvPicPr preferRelativeResize="0"/>
           <p:nvPr/>
         </p:nvPicPr>
@@ -7547,205 +8065,6 @@
           <a:xfrm>
             <a:off x="390950" y="1185025"/>
             <a:ext cx="4639756" cy="3820975"/>
-          </a:xfrm>
-          <a:prstGeom prst="rect">
-            <a:avLst/>
-          </a:prstGeom>
-          <a:noFill/>
-          <a:ln>
-            <a:noFill/>
-          </a:ln>
-        </p:spPr>
-      </p:pic>
-    </p:spTree>
-  </p:cSld>
-  <p:clrMapOvr>
-    <a:masterClrMapping/>
-  </p:clrMapOvr>
-</p:sld>
-</file>
-
-<file path=ppt/slides/slide11.xml><?xml version="1.0" encoding="utf-8"?>
-<p:sld xmlns:a="http://schemas.openxmlformats.org/drawingml/2006/main" xmlns:r="http://schemas.openxmlformats.org/officeDocument/2006/relationships" xmlns:mc="http://schemas.openxmlformats.org/markup-compatibility/2006" xmlns:mv="urn:schemas-microsoft-com:mac:vml" xmlns:p="http://schemas.openxmlformats.org/presentationml/2006/main" xmlns:c="http://schemas.openxmlformats.org/drawingml/2006/chart" xmlns:dgm="http://schemas.openxmlformats.org/drawingml/2006/diagram" xmlns:o="urn:schemas-microsoft-com:office:office" xmlns:v="urn:schemas-microsoft-com:vml" xmlns:pvml="urn:schemas-microsoft-com:office:powerpoint" xmlns:com="http://schemas.openxmlformats.org/drawingml/2006/compatibility" xmlns:p14="http://schemas.microsoft.com/office/powerpoint/2010/main" xmlns:p15="http://schemas.microsoft.com/office/powerpoint/2012/main">
-  <p:cSld>
-    <p:spTree>
-      <p:nvGrpSpPr>
-        <p:cNvPr id="118" name="Shape 118"/>
-        <p:cNvGrpSpPr/>
-        <p:nvPr/>
-      </p:nvGrpSpPr>
-      <p:grpSpPr>
-        <a:xfrm>
-          <a:off x="0" y="0"/>
-          <a:ext cx="0" cy="0"/>
-          <a:chOff x="0" y="0"/>
-          <a:chExt cx="0" cy="0"/>
-        </a:xfrm>
-      </p:grpSpPr>
-      <p:sp>
-        <p:nvSpPr>
-          <p:cNvPr id="119" name="Google Shape;119;p23"/>
-          <p:cNvSpPr txBox="1"/>
-          <p:nvPr>
-            <p:ph type="title"/>
-          </p:nvPr>
-        </p:nvSpPr>
-        <p:spPr>
-          <a:xfrm>
-            <a:off x="311700" y="445025"/>
-            <a:ext cx="8520600" cy="572700"/>
-          </a:xfrm>
-          <a:prstGeom prst="rect">
-            <a:avLst/>
-          </a:prstGeom>
-        </p:spPr>
-        <p:txBody>
-          <a:bodyPr anchorCtr="0" anchor="t" bIns="91425" lIns="91425" spcFirstLastPara="1" rIns="91425" wrap="square" tIns="91425">
-            <a:noAutofit/>
-          </a:bodyPr>
-          <a:lstStyle/>
-          <a:p>
-            <a:pPr indent="0" lvl="0" marL="0" rtl="0" algn="l">
-              <a:spcBef>
-                <a:spcPts val="0"/>
-              </a:spcBef>
-              <a:spcAft>
-                <a:spcPts val="0"/>
-              </a:spcAft>
-              <a:buNone/>
-            </a:pPr>
-            <a:r>
-              <a:rPr lang="id"/>
-              <a:t>Child Component - </a:t>
-            </a:r>
-            <a:r>
-              <a:rPr i="1" lang="id"/>
-              <a:t>Home</a:t>
-            </a:r>
-            <a:endParaRPr i="1"/>
-          </a:p>
-        </p:txBody>
-      </p:sp>
-      <p:pic>
-        <p:nvPicPr>
-          <p:cNvPr id="120" name="Google Shape;120;p23"/>
-          <p:cNvPicPr preferRelativeResize="0"/>
-          <p:nvPr/>
-        </p:nvPicPr>
-        <p:blipFill>
-          <a:blip r:embed="rId3">
-            <a:alphaModFix/>
-          </a:blip>
-          <a:stretch>
-            <a:fillRect/>
-          </a:stretch>
-        </p:blipFill>
-        <p:spPr>
-          <a:xfrm>
-            <a:off x="435675" y="1170125"/>
-            <a:ext cx="5986781" cy="3820975"/>
-          </a:xfrm>
-          <a:prstGeom prst="rect">
-            <a:avLst/>
-          </a:prstGeom>
-          <a:noFill/>
-          <a:ln>
-            <a:noFill/>
-          </a:ln>
-        </p:spPr>
-      </p:pic>
-    </p:spTree>
-  </p:cSld>
-  <p:clrMapOvr>
-    <a:masterClrMapping/>
-  </p:clrMapOvr>
-</p:sld>
-</file>
-
-<file path=ppt/slides/slide12.xml><?xml version="1.0" encoding="utf-8"?>
-<p:sld xmlns:a="http://schemas.openxmlformats.org/drawingml/2006/main" xmlns:r="http://schemas.openxmlformats.org/officeDocument/2006/relationships" xmlns:mc="http://schemas.openxmlformats.org/markup-compatibility/2006" xmlns:mv="urn:schemas-microsoft-com:mac:vml" xmlns:p="http://schemas.openxmlformats.org/presentationml/2006/main" xmlns:c="http://schemas.openxmlformats.org/drawingml/2006/chart" xmlns:dgm="http://schemas.openxmlformats.org/drawingml/2006/diagram" xmlns:o="urn:schemas-microsoft-com:office:office" xmlns:v="urn:schemas-microsoft-com:vml" xmlns:pvml="urn:schemas-microsoft-com:office:powerpoint" xmlns:com="http://schemas.openxmlformats.org/drawingml/2006/compatibility" xmlns:p14="http://schemas.microsoft.com/office/powerpoint/2010/main" xmlns:p15="http://schemas.microsoft.com/office/powerpoint/2012/main">
-  <p:cSld>
-    <p:spTree>
-      <p:nvGrpSpPr>
-        <p:cNvPr id="124" name="Shape 124"/>
-        <p:cNvGrpSpPr/>
-        <p:nvPr/>
-      </p:nvGrpSpPr>
-      <p:grpSpPr>
-        <a:xfrm>
-          <a:off x="0" y="0"/>
-          <a:ext cx="0" cy="0"/>
-          <a:chOff x="0" y="0"/>
-          <a:chExt cx="0" cy="0"/>
-        </a:xfrm>
-      </p:grpSpPr>
-      <p:sp>
-        <p:nvSpPr>
-          <p:cNvPr id="125" name="Google Shape;125;p24"/>
-          <p:cNvSpPr txBox="1"/>
-          <p:nvPr>
-            <p:ph type="title"/>
-          </p:nvPr>
-        </p:nvSpPr>
-        <p:spPr>
-          <a:xfrm>
-            <a:off x="311700" y="445025"/>
-            <a:ext cx="8520600" cy="572700"/>
-          </a:xfrm>
-          <a:prstGeom prst="rect">
-            <a:avLst/>
-          </a:prstGeom>
-        </p:spPr>
-        <p:txBody>
-          <a:bodyPr anchorCtr="0" anchor="t" bIns="91425" lIns="91425" spcFirstLastPara="1" rIns="91425" wrap="square" tIns="91425">
-            <a:noAutofit/>
-          </a:bodyPr>
-          <a:lstStyle/>
-          <a:p>
-            <a:pPr indent="0" lvl="0" marL="0" rtl="0" algn="l">
-              <a:spcBef>
-                <a:spcPts val="0"/>
-              </a:spcBef>
-              <a:spcAft>
-                <a:spcPts val="0"/>
-              </a:spcAft>
-              <a:buClr>
-                <a:schemeClr val="dk1"/>
-              </a:buClr>
-              <a:buSzPts val="1100"/>
-              <a:buFont typeface="Arial"/>
-              <a:buNone/>
-            </a:pPr>
-            <a:r>
-              <a:rPr lang="id"/>
-              <a:t>Child Component - </a:t>
-            </a:r>
-            <a:r>
-              <a:rPr i="1" lang="id"/>
-              <a:t>Profile</a:t>
-            </a:r>
-            <a:endParaRPr i="1"/>
-          </a:p>
-        </p:txBody>
-      </p:sp>
-      <p:pic>
-        <p:nvPicPr>
-          <p:cNvPr id="126" name="Google Shape;126;p24"/>
-          <p:cNvPicPr preferRelativeResize="0"/>
-          <p:nvPr/>
-        </p:nvPicPr>
-        <p:blipFill>
-          <a:blip r:embed="rId3">
-            <a:alphaModFix/>
-          </a:blip>
-          <a:stretch>
-            <a:fillRect/>
-          </a:stretch>
-        </p:blipFill>
-        <p:spPr>
-          <a:xfrm>
-            <a:off x="424225" y="1140325"/>
-            <a:ext cx="5134908" cy="3820976"/>
           </a:xfrm>
           <a:prstGeom prst="rect">
             <a:avLst/>
@@ -7769,7 +8088,7 @@
   <p:cSld>
     <p:spTree>
       <p:nvGrpSpPr>
-        <p:cNvPr id="130" name="Shape 130"/>
+        <p:cNvPr id="140" name="Shape 140"/>
         <p:cNvGrpSpPr/>
         <p:nvPr/>
       </p:nvGrpSpPr>
@@ -7783,7 +8102,210 @@
       </p:grpSpPr>
       <p:sp>
         <p:nvSpPr>
-          <p:cNvPr id="131" name="Google Shape;131;p25"/>
+          <p:cNvPr id="141" name="Google Shape;141;p25"/>
+          <p:cNvSpPr txBox="1"/>
+          <p:nvPr>
+            <p:ph type="title"/>
+          </p:nvPr>
+        </p:nvSpPr>
+        <p:spPr>
+          <a:xfrm>
+            <a:off x="311700" y="445025"/>
+            <a:ext cx="8520600" cy="572700"/>
+          </a:xfrm>
+          <a:prstGeom prst="rect">
+            <a:avLst/>
+          </a:prstGeom>
+        </p:spPr>
+        <p:txBody>
+          <a:bodyPr anchorCtr="0" anchor="t" bIns="91425" lIns="91425" spcFirstLastPara="1" rIns="91425" wrap="square" tIns="91425">
+            <a:noAutofit/>
+          </a:bodyPr>
+          <a:lstStyle/>
+          <a:p>
+            <a:pPr indent="0" lvl="0" marL="0" rtl="0" algn="l">
+              <a:spcBef>
+                <a:spcPts val="0"/>
+              </a:spcBef>
+              <a:spcAft>
+                <a:spcPts val="0"/>
+              </a:spcAft>
+              <a:buNone/>
+            </a:pPr>
+            <a:r>
+              <a:rPr lang="id"/>
+              <a:t>Passed Component - </a:t>
+            </a:r>
+            <a:r>
+              <a:rPr i="1" lang="id"/>
+              <a:t>Home</a:t>
+            </a:r>
+            <a:endParaRPr i="1"/>
+          </a:p>
+        </p:txBody>
+      </p:sp>
+      <p:pic>
+        <p:nvPicPr>
+          <p:cNvPr id="142" name="Google Shape;142;p25"/>
+          <p:cNvPicPr preferRelativeResize="0"/>
+          <p:nvPr/>
+        </p:nvPicPr>
+        <p:blipFill>
+          <a:blip r:embed="rId3">
+            <a:alphaModFix/>
+          </a:blip>
+          <a:stretch>
+            <a:fillRect/>
+          </a:stretch>
+        </p:blipFill>
+        <p:spPr>
+          <a:xfrm>
+            <a:off x="435675" y="1170125"/>
+            <a:ext cx="5986781" cy="3820975"/>
+          </a:xfrm>
+          <a:prstGeom prst="rect">
+            <a:avLst/>
+          </a:prstGeom>
+          <a:noFill/>
+          <a:ln>
+            <a:noFill/>
+          </a:ln>
+        </p:spPr>
+      </p:pic>
+    </p:spTree>
+  </p:cSld>
+  <p:clrMapOvr>
+    <a:masterClrMapping/>
+  </p:clrMapOvr>
+</p:sld>
+</file>
+
+<file path=ppt/slides/slide14.xml><?xml version="1.0" encoding="utf-8"?>
+<p:sld xmlns:a="http://schemas.openxmlformats.org/drawingml/2006/main" xmlns:r="http://schemas.openxmlformats.org/officeDocument/2006/relationships" xmlns:mc="http://schemas.openxmlformats.org/markup-compatibility/2006" xmlns:mv="urn:schemas-microsoft-com:mac:vml" xmlns:p="http://schemas.openxmlformats.org/presentationml/2006/main" xmlns:c="http://schemas.openxmlformats.org/drawingml/2006/chart" xmlns:dgm="http://schemas.openxmlformats.org/drawingml/2006/diagram" xmlns:o="urn:schemas-microsoft-com:office:office" xmlns:v="urn:schemas-microsoft-com:vml" xmlns:pvml="urn:schemas-microsoft-com:office:powerpoint" xmlns:com="http://schemas.openxmlformats.org/drawingml/2006/compatibility" xmlns:p14="http://schemas.microsoft.com/office/powerpoint/2010/main" xmlns:p15="http://schemas.microsoft.com/office/powerpoint/2012/main">
+  <p:cSld>
+    <p:spTree>
+      <p:nvGrpSpPr>
+        <p:cNvPr id="146" name="Shape 146"/>
+        <p:cNvGrpSpPr/>
+        <p:nvPr/>
+      </p:nvGrpSpPr>
+      <p:grpSpPr>
+        <a:xfrm>
+          <a:off x="0" y="0"/>
+          <a:ext cx="0" cy="0"/>
+          <a:chOff x="0" y="0"/>
+          <a:chExt cx="0" cy="0"/>
+        </a:xfrm>
+      </p:grpSpPr>
+      <p:sp>
+        <p:nvSpPr>
+          <p:cNvPr id="147" name="Google Shape;147;p26"/>
+          <p:cNvSpPr txBox="1"/>
+          <p:nvPr>
+            <p:ph type="title"/>
+          </p:nvPr>
+        </p:nvSpPr>
+        <p:spPr>
+          <a:xfrm>
+            <a:off x="311700" y="445025"/>
+            <a:ext cx="8520600" cy="572700"/>
+          </a:xfrm>
+          <a:prstGeom prst="rect">
+            <a:avLst/>
+          </a:prstGeom>
+        </p:spPr>
+        <p:txBody>
+          <a:bodyPr anchorCtr="0" anchor="t" bIns="91425" lIns="91425" spcFirstLastPara="1" rIns="91425" wrap="square" tIns="91425">
+            <a:noAutofit/>
+          </a:bodyPr>
+          <a:lstStyle/>
+          <a:p>
+            <a:pPr indent="0" lvl="0" marL="0" rtl="0" algn="l">
+              <a:spcBef>
+                <a:spcPts val="0"/>
+              </a:spcBef>
+              <a:spcAft>
+                <a:spcPts val="0"/>
+              </a:spcAft>
+              <a:buClr>
+                <a:schemeClr val="dk1"/>
+              </a:buClr>
+              <a:buSzPts val="1100"/>
+              <a:buFont typeface="Arial"/>
+              <a:buNone/>
+            </a:pPr>
+            <a:r>
+              <a:rPr lang="id"/>
+              <a:t>Passed</a:t>
+            </a:r>
+            <a:r>
+              <a:rPr lang="id"/>
+              <a:t> Component - </a:t>
+            </a:r>
+            <a:r>
+              <a:rPr i="1" lang="id"/>
+              <a:t>Profile</a:t>
+            </a:r>
+            <a:endParaRPr i="1"/>
+          </a:p>
+        </p:txBody>
+      </p:sp>
+      <p:pic>
+        <p:nvPicPr>
+          <p:cNvPr id="148" name="Google Shape;148;p26"/>
+          <p:cNvPicPr preferRelativeResize="0"/>
+          <p:nvPr/>
+        </p:nvPicPr>
+        <p:blipFill>
+          <a:blip r:embed="rId3">
+            <a:alphaModFix/>
+          </a:blip>
+          <a:stretch>
+            <a:fillRect/>
+          </a:stretch>
+        </p:blipFill>
+        <p:spPr>
+          <a:xfrm>
+            <a:off x="424225" y="1140325"/>
+            <a:ext cx="5134908" cy="3820976"/>
+          </a:xfrm>
+          <a:prstGeom prst="rect">
+            <a:avLst/>
+          </a:prstGeom>
+          <a:noFill/>
+          <a:ln>
+            <a:noFill/>
+          </a:ln>
+        </p:spPr>
+      </p:pic>
+    </p:spTree>
+  </p:cSld>
+  <p:clrMapOvr>
+    <a:masterClrMapping/>
+  </p:clrMapOvr>
+</p:sld>
+</file>
+
+<file path=ppt/slides/slide15.xml><?xml version="1.0" encoding="utf-8"?>
+<p:sld xmlns:a="http://schemas.openxmlformats.org/drawingml/2006/main" xmlns:r="http://schemas.openxmlformats.org/officeDocument/2006/relationships" xmlns:mc="http://schemas.openxmlformats.org/markup-compatibility/2006" xmlns:mv="urn:schemas-microsoft-com:mac:vml" xmlns:p="http://schemas.openxmlformats.org/presentationml/2006/main" xmlns:c="http://schemas.openxmlformats.org/drawingml/2006/chart" xmlns:dgm="http://schemas.openxmlformats.org/drawingml/2006/diagram" xmlns:o="urn:schemas-microsoft-com:office:office" xmlns:v="urn:schemas-microsoft-com:vml" xmlns:pvml="urn:schemas-microsoft-com:office:powerpoint" xmlns:com="http://schemas.openxmlformats.org/drawingml/2006/compatibility" xmlns:p14="http://schemas.microsoft.com/office/powerpoint/2010/main" xmlns:p15="http://schemas.microsoft.com/office/powerpoint/2012/main">
+  <p:cSld>
+    <p:spTree>
+      <p:nvGrpSpPr>
+        <p:cNvPr id="152" name="Shape 152"/>
+        <p:cNvGrpSpPr/>
+        <p:nvPr/>
+      </p:nvGrpSpPr>
+      <p:grpSpPr>
+        <a:xfrm>
+          <a:off x="0" y="0"/>
+          <a:ext cx="0" cy="0"/>
+          <a:chOff x="0" y="0"/>
+          <a:chExt cx="0" cy="0"/>
+        </a:xfrm>
+      </p:grpSpPr>
+      <p:sp>
+        <p:nvSpPr>
+          <p:cNvPr id="153" name="Google Shape;153;p27"/>
           <p:cNvSpPr txBox="1"/>
           <p:nvPr>
             <p:ph type="title"/>
@@ -7823,7 +8345,7 @@
       </p:sp>
       <p:sp>
         <p:nvSpPr>
-          <p:cNvPr id="132" name="Google Shape;132;p25"/>
+          <p:cNvPr id="154" name="Google Shape;154;p27"/>
           <p:cNvSpPr txBox="1"/>
           <p:nvPr>
             <p:ph idx="1" type="body"/>
@@ -7929,12 +8451,12 @@
 </p:sld>
 </file>
 
-<file path=ppt/slides/slide14.xml><?xml version="1.0" encoding="utf-8"?>
+<file path=ppt/slides/slide16.xml><?xml version="1.0" encoding="utf-8"?>
 <p:sld xmlns:a="http://schemas.openxmlformats.org/drawingml/2006/main" xmlns:r="http://schemas.openxmlformats.org/officeDocument/2006/relationships" xmlns:mc="http://schemas.openxmlformats.org/markup-compatibility/2006" xmlns:mv="urn:schemas-microsoft-com:mac:vml" xmlns:p="http://schemas.openxmlformats.org/presentationml/2006/main" xmlns:c="http://schemas.openxmlformats.org/drawingml/2006/chart" xmlns:dgm="http://schemas.openxmlformats.org/drawingml/2006/diagram" xmlns:o="urn:schemas-microsoft-com:office:office" xmlns:v="urn:schemas-microsoft-com:vml" xmlns:pvml="urn:schemas-microsoft-com:office:powerpoint" xmlns:com="http://schemas.openxmlformats.org/drawingml/2006/compatibility" xmlns:p14="http://schemas.microsoft.com/office/powerpoint/2010/main" xmlns:p15="http://schemas.microsoft.com/office/powerpoint/2012/main">
   <p:cSld>
     <p:spTree>
       <p:nvGrpSpPr>
-        <p:cNvPr id="136" name="Shape 136"/>
+        <p:cNvPr id="158" name="Shape 158"/>
         <p:cNvGrpSpPr/>
         <p:nvPr/>
       </p:nvGrpSpPr>
@@ -7948,7 +8470,7 @@
       </p:grpSpPr>
       <p:sp>
         <p:nvSpPr>
-          <p:cNvPr id="137" name="Google Shape;137;p26"/>
+          <p:cNvPr id="159" name="Google Shape;159;p28"/>
           <p:cNvSpPr txBox="1"/>
           <p:nvPr>
             <p:ph type="title"/>
@@ -7980,7 +8502,7 @@
             </a:pPr>
             <a:r>
               <a:rPr lang="id"/>
-              <a:t>Parent Component - </a:t>
+              <a:t>Custom Hooks Component - </a:t>
             </a:r>
             <a:r>
               <a:rPr i="1" lang="id">
@@ -8000,7 +8522,7 @@
       </p:sp>
       <p:pic>
         <p:nvPicPr>
-          <p:cNvPr id="138" name="Google Shape;138;p26"/>
+          <p:cNvPr id="160" name="Google Shape;160;p28"/>
           <p:cNvPicPr preferRelativeResize="0"/>
           <p:nvPr/>
         </p:nvPicPr>
@@ -8034,12 +8556,12 @@
 </p:sld>
 </file>
 
-<file path=ppt/slides/slide15.xml><?xml version="1.0" encoding="utf-8"?>
+<file path=ppt/slides/slide17.xml><?xml version="1.0" encoding="utf-8"?>
 <p:sld xmlns:a="http://schemas.openxmlformats.org/drawingml/2006/main" xmlns:r="http://schemas.openxmlformats.org/officeDocument/2006/relationships" xmlns:mc="http://schemas.openxmlformats.org/markup-compatibility/2006" xmlns:mv="urn:schemas-microsoft-com:mac:vml" xmlns:p="http://schemas.openxmlformats.org/presentationml/2006/main" xmlns:c="http://schemas.openxmlformats.org/drawingml/2006/chart" xmlns:dgm="http://schemas.openxmlformats.org/drawingml/2006/diagram" xmlns:o="urn:schemas-microsoft-com:office:office" xmlns:v="urn:schemas-microsoft-com:vml" xmlns:pvml="urn:schemas-microsoft-com:office:powerpoint" xmlns:com="http://schemas.openxmlformats.org/drawingml/2006/compatibility" xmlns:p14="http://schemas.microsoft.com/office/powerpoint/2010/main" xmlns:p15="http://schemas.microsoft.com/office/powerpoint/2012/main">
   <p:cSld>
     <p:spTree>
       <p:nvGrpSpPr>
-        <p:cNvPr id="142" name="Shape 142"/>
+        <p:cNvPr id="164" name="Shape 164"/>
         <p:cNvGrpSpPr/>
         <p:nvPr/>
       </p:nvGrpSpPr>
@@ -8053,7 +8575,7 @@
       </p:grpSpPr>
       <p:sp>
         <p:nvSpPr>
-          <p:cNvPr id="143" name="Google Shape;143;p27"/>
+          <p:cNvPr id="165" name="Google Shape;165;p29"/>
           <p:cNvSpPr txBox="1"/>
           <p:nvPr>
             <p:ph type="title"/>
@@ -8085,11 +8607,19 @@
             </a:pPr>
             <a:r>
               <a:rPr lang="id"/>
-              <a:t>Child</a:t>
+              <a:t>C</a:t>
             </a:r>
             <a:r>
               <a:rPr lang="id"/>
-              <a:t> Component - </a:t>
+              <a:t>omponent </a:t>
+            </a:r>
+            <a:r>
+              <a:rPr lang="id"/>
+              <a:t>Consumer</a:t>
+            </a:r>
+            <a:r>
+              <a:rPr lang="id"/>
+              <a:t> - </a:t>
             </a:r>
             <a:r>
               <a:rPr i="1" lang="id"/>
@@ -8105,7 +8635,7 @@
       </p:sp>
       <p:pic>
         <p:nvPicPr>
-          <p:cNvPr id="144" name="Google Shape;144;p27"/>
+          <p:cNvPr id="166" name="Google Shape;166;p29"/>
           <p:cNvPicPr preferRelativeResize="0"/>
           <p:nvPr/>
         </p:nvPicPr>
@@ -8139,12 +8669,12 @@
 </p:sld>
 </file>
 
-<file path=ppt/slides/slide16.xml><?xml version="1.0" encoding="utf-8"?>
+<file path=ppt/slides/slide18.xml><?xml version="1.0" encoding="utf-8"?>
 <p:sld xmlns:a="http://schemas.openxmlformats.org/drawingml/2006/main" xmlns:r="http://schemas.openxmlformats.org/officeDocument/2006/relationships" xmlns:mc="http://schemas.openxmlformats.org/markup-compatibility/2006" xmlns:mv="urn:schemas-microsoft-com:mac:vml" xmlns:p="http://schemas.openxmlformats.org/presentationml/2006/main" xmlns:c="http://schemas.openxmlformats.org/drawingml/2006/chart" xmlns:dgm="http://schemas.openxmlformats.org/drawingml/2006/diagram" xmlns:o="urn:schemas-microsoft-com:office:office" xmlns:v="urn:schemas-microsoft-com:vml" xmlns:pvml="urn:schemas-microsoft-com:office:powerpoint" xmlns:com="http://schemas.openxmlformats.org/drawingml/2006/compatibility" xmlns:p14="http://schemas.microsoft.com/office/powerpoint/2010/main" xmlns:p15="http://schemas.microsoft.com/office/powerpoint/2012/main">
   <p:cSld>
     <p:spTree>
       <p:nvGrpSpPr>
-        <p:cNvPr id="148" name="Shape 148"/>
+        <p:cNvPr id="170" name="Shape 170"/>
         <p:cNvGrpSpPr/>
         <p:nvPr/>
       </p:nvGrpSpPr>
@@ -8158,7 +8688,7 @@
       </p:grpSpPr>
       <p:sp>
         <p:nvSpPr>
-          <p:cNvPr id="149" name="Google Shape;149;p28"/>
+          <p:cNvPr id="171" name="Google Shape;171;p30"/>
           <p:cNvSpPr txBox="1"/>
           <p:nvPr>
             <p:ph type="title"/>
@@ -8190,7 +8720,15 @@
             </a:pPr>
             <a:r>
               <a:rPr lang="id"/>
-              <a:t>Child Component - </a:t>
+              <a:t>Component </a:t>
+            </a:r>
+            <a:r>
+              <a:rPr lang="id"/>
+              <a:t>Consumer</a:t>
+            </a:r>
+            <a:r>
+              <a:rPr lang="id"/>
+              <a:t> - </a:t>
             </a:r>
             <a:r>
               <a:rPr i="1" lang="id"/>
@@ -8206,7 +8744,7 @@
       </p:sp>
       <p:pic>
         <p:nvPicPr>
-          <p:cNvPr id="150" name="Google Shape;150;p28"/>
+          <p:cNvPr id="172" name="Google Shape;172;p30"/>
           <p:cNvPicPr preferRelativeResize="0"/>
           <p:nvPr/>
         </p:nvPicPr>
@@ -8240,12 +8778,12 @@
 </p:sld>
 </file>
 
-<file path=ppt/slides/slide17.xml><?xml version="1.0" encoding="utf-8"?>
+<file path=ppt/slides/slide19.xml><?xml version="1.0" encoding="utf-8"?>
 <p:sld xmlns:a="http://schemas.openxmlformats.org/drawingml/2006/main" xmlns:r="http://schemas.openxmlformats.org/officeDocument/2006/relationships" xmlns:mc="http://schemas.openxmlformats.org/markup-compatibility/2006" xmlns:mv="urn:schemas-microsoft-com:mac:vml" xmlns:p="http://schemas.openxmlformats.org/presentationml/2006/main" xmlns:c="http://schemas.openxmlformats.org/drawingml/2006/chart" xmlns:dgm="http://schemas.openxmlformats.org/drawingml/2006/diagram" xmlns:o="urn:schemas-microsoft-com:office:office" xmlns:v="urn:schemas-microsoft-com:vml" xmlns:pvml="urn:schemas-microsoft-com:office:powerpoint" xmlns:com="http://schemas.openxmlformats.org/drawingml/2006/compatibility" xmlns:p14="http://schemas.microsoft.com/office/powerpoint/2010/main" xmlns:p15="http://schemas.microsoft.com/office/powerpoint/2012/main">
   <p:cSld>
     <p:spTree>
       <p:nvGrpSpPr>
-        <p:cNvPr id="154" name="Shape 154"/>
+        <p:cNvPr id="176" name="Shape 176"/>
         <p:cNvGrpSpPr/>
         <p:nvPr/>
       </p:nvGrpSpPr>
@@ -8259,7 +8797,7 @@
       </p:grpSpPr>
       <p:pic>
         <p:nvPicPr>
-          <p:cNvPr id="155" name="Google Shape;155;p29"/>
+          <p:cNvPr id="177" name="Google Shape;177;p31"/>
           <p:cNvPicPr preferRelativeResize="0"/>
           <p:nvPr/>
         </p:nvPicPr>
@@ -8552,12 +9090,133 @@
               <a:buNone/>
             </a:pPr>
             <a:r>
+              <a:rPr lang="id"/>
+              <a:t>Somewhere, in a React Project </a:t>
+            </a:r>
+            <a:endParaRPr/>
+          </a:p>
+        </p:txBody>
+      </p:sp>
+      <p:pic>
+        <p:nvPicPr>
+          <p:cNvPr id="71" name="Google Shape;71;p15"/>
+          <p:cNvPicPr preferRelativeResize="0"/>
+          <p:nvPr/>
+        </p:nvPicPr>
+        <p:blipFill>
+          <a:blip r:embed="rId3">
+            <a:alphaModFix/>
+          </a:blip>
+          <a:stretch>
+            <a:fillRect/>
+          </a:stretch>
+        </p:blipFill>
+        <p:spPr>
+          <a:xfrm>
+            <a:off x="413325" y="1110500"/>
+            <a:ext cx="3598703" cy="3820976"/>
+          </a:xfrm>
+          <a:prstGeom prst="rect">
+            <a:avLst/>
+          </a:prstGeom>
+          <a:noFill/>
+          <a:ln>
+            <a:noFill/>
+          </a:ln>
+        </p:spPr>
+      </p:pic>
+      <p:pic>
+        <p:nvPicPr>
+          <p:cNvPr id="72" name="Google Shape;72;p15"/>
+          <p:cNvPicPr preferRelativeResize="0"/>
+          <p:nvPr/>
+        </p:nvPicPr>
+        <p:blipFill>
+          <a:blip r:embed="rId4">
+            <a:alphaModFix/>
+          </a:blip>
+          <a:stretch>
+            <a:fillRect/>
+          </a:stretch>
+        </p:blipFill>
+        <p:spPr>
+          <a:xfrm>
+            <a:off x="4306075" y="1110500"/>
+            <a:ext cx="3482249" cy="3820974"/>
+          </a:xfrm>
+          <a:prstGeom prst="rect">
+            <a:avLst/>
+          </a:prstGeom>
+          <a:noFill/>
+          <a:ln>
+            <a:noFill/>
+          </a:ln>
+        </p:spPr>
+      </p:pic>
+    </p:spTree>
+  </p:cSld>
+  <p:clrMapOvr>
+    <a:masterClrMapping/>
+  </p:clrMapOvr>
+</p:sld>
+</file>
+
+<file path=ppt/slides/slide4.xml><?xml version="1.0" encoding="utf-8"?>
+<p:sld xmlns:a="http://schemas.openxmlformats.org/drawingml/2006/main" xmlns:r="http://schemas.openxmlformats.org/officeDocument/2006/relationships" xmlns:mc="http://schemas.openxmlformats.org/markup-compatibility/2006" xmlns:mv="urn:schemas-microsoft-com:mac:vml" xmlns:p="http://schemas.openxmlformats.org/presentationml/2006/main" xmlns:c="http://schemas.openxmlformats.org/drawingml/2006/chart" xmlns:dgm="http://schemas.openxmlformats.org/drawingml/2006/diagram" xmlns:o="urn:schemas-microsoft-com:office:office" xmlns:v="urn:schemas-microsoft-com:vml" xmlns:pvml="urn:schemas-microsoft-com:office:powerpoint" xmlns:com="http://schemas.openxmlformats.org/drawingml/2006/compatibility" xmlns:p14="http://schemas.microsoft.com/office/powerpoint/2010/main" xmlns:p15="http://schemas.microsoft.com/office/powerpoint/2012/main">
+  <p:cSld>
+    <p:spTree>
+      <p:nvGrpSpPr>
+        <p:cNvPr id="76" name="Shape 76"/>
+        <p:cNvGrpSpPr/>
+        <p:nvPr/>
+      </p:nvGrpSpPr>
+      <p:grpSpPr>
+        <a:xfrm>
+          <a:off x="0" y="0"/>
+          <a:ext cx="0" cy="0"/>
+          <a:chOff x="0" y="0"/>
+          <a:chExt cx="0" cy="0"/>
+        </a:xfrm>
+      </p:grpSpPr>
+      <p:sp>
+        <p:nvSpPr>
+          <p:cNvPr id="77" name="Google Shape;77;p16"/>
+          <p:cNvSpPr txBox="1"/>
+          <p:nvPr>
+            <p:ph type="title"/>
+          </p:nvPr>
+        </p:nvSpPr>
+        <p:spPr>
+          <a:xfrm>
+            <a:off x="311700" y="445025"/>
+            <a:ext cx="8520600" cy="572700"/>
+          </a:xfrm>
+          <a:prstGeom prst="rect">
+            <a:avLst/>
+          </a:prstGeom>
+        </p:spPr>
+        <p:txBody>
+          <a:bodyPr anchorCtr="0" anchor="t" bIns="91425" lIns="91425" spcFirstLastPara="1" rIns="91425" wrap="square" tIns="91425">
+            <a:noAutofit/>
+          </a:bodyPr>
+          <a:lstStyle/>
+          <a:p>
+            <a:pPr indent="0" lvl="0" marL="0" rtl="0" algn="l">
+              <a:spcBef>
+                <a:spcPts val="0"/>
+              </a:spcBef>
+              <a:spcAft>
+                <a:spcPts val="0"/>
+              </a:spcAft>
+              <a:buNone/>
+            </a:pPr>
+            <a:r>
               <a:rPr b="1" lang="id"/>
-              <a:t>Three</a:t>
+              <a:t>Four</a:t>
             </a:r>
             <a:r>
               <a:rPr lang="id"/>
-              <a:t> Ways</a:t>
+              <a:t> Patterns</a:t>
             </a:r>
             <a:endParaRPr/>
           </a:p>
@@ -8565,7 +9224,7 @@
       </p:sp>
       <p:sp>
         <p:nvSpPr>
-          <p:cNvPr id="71" name="Google Shape;71;p15"/>
+          <p:cNvPr id="78" name="Google Shape;78;p16"/>
           <p:cNvSpPr txBox="1"/>
           <p:nvPr>
             <p:ph idx="1" type="body"/>
@@ -8594,6 +9253,67 @@
                 <a:spcPts val="0"/>
               </a:spcAft>
               <a:buSzPts val="1800"/>
+              <a:buAutoNum type="arabicPeriod"/>
+            </a:pPr>
+            <a:r>
+              <a:rPr lang="id">
+                <a:solidFill>
+                  <a:srgbClr val="6D6D6D"/>
+                </a:solidFill>
+                <a:latin typeface="Roboto"/>
+                <a:ea typeface="Roboto"/>
+                <a:cs typeface="Roboto"/>
+                <a:sym typeface="Roboto"/>
+              </a:rPr>
+              <a:t>Mixins (</a:t>
+            </a:r>
+            <a:r>
+              <a:rPr lang="id">
+                <a:solidFill>
+                  <a:srgbClr val="434343"/>
+                </a:solidFill>
+                <a:latin typeface="Roboto"/>
+                <a:ea typeface="Roboto"/>
+                <a:cs typeface="Roboto"/>
+                <a:sym typeface="Roboto"/>
+              </a:rPr>
+              <a:t>dead</a:t>
+            </a:r>
+            <a:r>
+              <a:rPr lang="id">
+                <a:solidFill>
+                  <a:srgbClr val="6D6D6D"/>
+                </a:solidFill>
+                <a:latin typeface="Roboto"/>
+                <a:ea typeface="Roboto"/>
+                <a:cs typeface="Roboto"/>
+                <a:sym typeface="Roboto"/>
+              </a:rPr>
+              <a:t>)</a:t>
+            </a:r>
+            <a:endParaRPr>
+              <a:solidFill>
+                <a:srgbClr val="6D6D6D"/>
+              </a:solidFill>
+              <a:latin typeface="Roboto"/>
+              <a:ea typeface="Roboto"/>
+              <a:cs typeface="Roboto"/>
+              <a:sym typeface="Roboto"/>
+            </a:endParaRPr>
+          </a:p>
+          <a:p>
+            <a:pPr indent="-342900" lvl="0" marL="457200" rtl="0" algn="l">
+              <a:spcBef>
+                <a:spcPts val="0"/>
+              </a:spcBef>
+              <a:spcAft>
+                <a:spcPts val="0"/>
+              </a:spcAft>
+              <a:buClr>
+                <a:srgbClr val="6D6D6D"/>
+              </a:buClr>
+              <a:buSzPts val="1800"/>
+              <a:buFont typeface="Roboto"/>
               <a:buAutoNum type="arabicPeriod"/>
             </a:pPr>
             <a:r>
@@ -8692,6 +9412,29 @@
               <a:sym typeface="Roboto"/>
             </a:endParaRPr>
           </a:p>
+          <a:p>
+            <a:pPr indent="0" lvl="0" marL="457200" rtl="0" algn="l">
+              <a:spcBef>
+                <a:spcPts val="1600"/>
+              </a:spcBef>
+              <a:spcAft>
+                <a:spcPts val="1600"/>
+              </a:spcAft>
+              <a:buNone/>
+            </a:pPr>
+            <a:r>
+              <a:t/>
+            </a:r>
+            <a:endParaRPr>
+              <a:solidFill>
+                <a:srgbClr val="6D6D6D"/>
+              </a:solidFill>
+              <a:latin typeface="Roboto"/>
+              <a:ea typeface="Roboto"/>
+              <a:cs typeface="Roboto"/>
+              <a:sym typeface="Roboto"/>
+            </a:endParaRPr>
+          </a:p>
         </p:txBody>
       </p:sp>
     </p:spTree>
@@ -8702,12 +9445,123 @@
 </p:sld>
 </file>
 
-<file path=ppt/slides/slide4.xml><?xml version="1.0" encoding="utf-8"?>
+<file path=ppt/slides/slide5.xml><?xml version="1.0" encoding="utf-8"?>
 <p:sld xmlns:a="http://schemas.openxmlformats.org/drawingml/2006/main" xmlns:r="http://schemas.openxmlformats.org/officeDocument/2006/relationships" xmlns:mc="http://schemas.openxmlformats.org/markup-compatibility/2006" xmlns:mv="urn:schemas-microsoft-com:mac:vml" xmlns:p="http://schemas.openxmlformats.org/presentationml/2006/main" xmlns:c="http://schemas.openxmlformats.org/drawingml/2006/chart" xmlns:dgm="http://schemas.openxmlformats.org/drawingml/2006/diagram" xmlns:o="urn:schemas-microsoft-com:office:office" xmlns:v="urn:schemas-microsoft-com:vml" xmlns:pvml="urn:schemas-microsoft-com:office:powerpoint" xmlns:com="http://schemas.openxmlformats.org/drawingml/2006/compatibility" xmlns:p14="http://schemas.microsoft.com/office/powerpoint/2010/main" xmlns:p15="http://schemas.microsoft.com/office/powerpoint/2012/main">
   <p:cSld>
     <p:spTree>
       <p:nvGrpSpPr>
-        <p:cNvPr id="75" name="Shape 75"/>
+        <p:cNvPr id="82" name="Shape 82"/>
+        <p:cNvGrpSpPr/>
+        <p:nvPr/>
+      </p:nvGrpSpPr>
+      <p:grpSpPr>
+        <a:xfrm>
+          <a:off x="0" y="0"/>
+          <a:ext cx="0" cy="0"/>
+          <a:chOff x="0" y="0"/>
+          <a:chExt cx="0" cy="0"/>
+        </a:xfrm>
+      </p:grpSpPr>
+      <p:pic>
+        <p:nvPicPr>
+          <p:cNvPr id="83" name="Google Shape;83;p17"/>
+          <p:cNvPicPr preferRelativeResize="0"/>
+          <p:nvPr/>
+        </p:nvPicPr>
+        <p:blipFill>
+          <a:blip r:embed="rId3">
+            <a:alphaModFix/>
+          </a:blip>
+          <a:stretch>
+            <a:fillRect/>
+          </a:stretch>
+        </p:blipFill>
+        <p:spPr>
+          <a:xfrm>
+            <a:off x="1085050" y="152400"/>
+            <a:ext cx="6757671" cy="4838699"/>
+          </a:xfrm>
+          <a:prstGeom prst="rect">
+            <a:avLst/>
+          </a:prstGeom>
+          <a:noFill/>
+          <a:ln>
+            <a:noFill/>
+          </a:ln>
+        </p:spPr>
+      </p:pic>
+      <p:sp>
+        <p:nvSpPr>
+          <p:cNvPr id="84" name="Google Shape;84;p17"/>
+          <p:cNvSpPr/>
+          <p:nvPr/>
+        </p:nvSpPr>
+        <p:spPr>
+          <a:xfrm rot="-1582502">
+            <a:off x="3278245" y="2485538"/>
+            <a:ext cx="1294556" cy="494263"/>
+          </a:xfrm>
+          <a:prstGeom prst="rect">
+            <a:avLst/>
+          </a:prstGeom>
+          <a:solidFill>
+            <a:schemeClr val="lt2"/>
+          </a:solidFill>
+          <a:ln cap="flat" cmpd="sng" w="28575">
+            <a:solidFill>
+              <a:schemeClr val="dk2"/>
+            </a:solidFill>
+            <a:prstDash val="solid"/>
+            <a:round/>
+            <a:headEnd len="sm" w="sm" type="none"/>
+            <a:tailEnd len="sm" w="sm" type="none"/>
+          </a:ln>
+        </p:spPr>
+        <p:txBody>
+          <a:bodyPr anchorCtr="0" anchor="ctr" bIns="91425" lIns="91425" spcFirstLastPara="1" rIns="91425" wrap="square" tIns="91425">
+            <a:noAutofit/>
+          </a:bodyPr>
+          <a:lstStyle/>
+          <a:p>
+            <a:pPr indent="0" lvl="0" marL="0" rtl="0" algn="l">
+              <a:spcBef>
+                <a:spcPts val="0"/>
+              </a:spcBef>
+              <a:spcAft>
+                <a:spcPts val="0"/>
+              </a:spcAft>
+              <a:buNone/>
+            </a:pPr>
+            <a:r>
+              <a:rPr b="1" lang="id">
+                <a:solidFill>
+                  <a:srgbClr val="FF0000"/>
+                </a:solidFill>
+              </a:rPr>
+              <a:t>CONFIRMED</a:t>
+            </a:r>
+            <a:endParaRPr b="1">
+              <a:solidFill>
+                <a:srgbClr val="FF0000"/>
+              </a:solidFill>
+            </a:endParaRPr>
+          </a:p>
+        </p:txBody>
+      </p:sp>
+    </p:spTree>
+  </p:cSld>
+  <p:clrMapOvr>
+    <a:masterClrMapping/>
+  </p:clrMapOvr>
+</p:sld>
+</file>
+
+<file path=ppt/slides/slide6.xml><?xml version="1.0" encoding="utf-8"?>
+<p:sld xmlns:a="http://schemas.openxmlformats.org/drawingml/2006/main" xmlns:r="http://schemas.openxmlformats.org/officeDocument/2006/relationships" xmlns:mc="http://schemas.openxmlformats.org/markup-compatibility/2006" xmlns:mv="urn:schemas-microsoft-com:mac:vml" xmlns:p="http://schemas.openxmlformats.org/presentationml/2006/main" xmlns:c="http://schemas.openxmlformats.org/drawingml/2006/chart" xmlns:dgm="http://schemas.openxmlformats.org/drawingml/2006/diagram" xmlns:o="urn:schemas-microsoft-com:office:office" xmlns:v="urn:schemas-microsoft-com:vml" xmlns:pvml="urn:schemas-microsoft-com:office:powerpoint" xmlns:com="http://schemas.openxmlformats.org/drawingml/2006/compatibility" xmlns:p14="http://schemas.microsoft.com/office/powerpoint/2010/main" xmlns:p15="http://schemas.microsoft.com/office/powerpoint/2012/main">
+  <p:cSld>
+    <p:spTree>
+      <p:nvGrpSpPr>
+        <p:cNvPr id="88" name="Shape 88"/>
         <p:cNvGrpSpPr/>
         <p:nvPr/>
       </p:nvGrpSpPr>
@@ -8721,7 +9575,162 @@
       </p:grpSpPr>
       <p:sp>
         <p:nvSpPr>
-          <p:cNvPr id="76" name="Google Shape;76;p16"/>
+          <p:cNvPr id="89" name="Google Shape;89;p18"/>
+          <p:cNvSpPr txBox="1"/>
+          <p:nvPr>
+            <p:ph type="title"/>
+          </p:nvPr>
+        </p:nvSpPr>
+        <p:spPr>
+          <a:xfrm>
+            <a:off x="311700" y="445025"/>
+            <a:ext cx="8520600" cy="572700"/>
+          </a:xfrm>
+          <a:prstGeom prst="rect">
+            <a:avLst/>
+          </a:prstGeom>
+        </p:spPr>
+        <p:txBody>
+          <a:bodyPr anchorCtr="0" anchor="t" bIns="91425" lIns="91425" spcFirstLastPara="1" rIns="91425" wrap="square" tIns="91425">
+            <a:noAutofit/>
+          </a:bodyPr>
+          <a:lstStyle/>
+          <a:p>
+            <a:pPr indent="0" lvl="0" marL="0" rtl="0" algn="l">
+              <a:spcBef>
+                <a:spcPts val="0"/>
+              </a:spcBef>
+              <a:spcAft>
+                <a:spcPts val="0"/>
+              </a:spcAft>
+              <a:buNone/>
+            </a:pPr>
+            <a:r>
+              <a:rPr lang="id"/>
+              <a:t>How to start ? Any </a:t>
+            </a:r>
+            <a:r>
+              <a:rPr b="1" lang="id"/>
+              <a:t>Requirement</a:t>
+            </a:r>
+            <a:r>
+              <a:rPr lang="id"/>
+              <a:t> !</a:t>
+            </a:r>
+            <a:endParaRPr/>
+          </a:p>
+        </p:txBody>
+      </p:sp>
+      <p:sp>
+        <p:nvSpPr>
+          <p:cNvPr id="90" name="Google Shape;90;p18"/>
+          <p:cNvSpPr txBox="1"/>
+          <p:nvPr>
+            <p:ph idx="1" type="body"/>
+          </p:nvPr>
+        </p:nvSpPr>
+        <p:spPr>
+          <a:xfrm>
+            <a:off x="311700" y="1152475"/>
+            <a:ext cx="8520600" cy="3416400"/>
+          </a:xfrm>
+          <a:prstGeom prst="rect">
+            <a:avLst/>
+          </a:prstGeom>
+        </p:spPr>
+        <p:txBody>
+          <a:bodyPr anchorCtr="0" anchor="t" bIns="91425" lIns="91425" spcFirstLastPara="1" rIns="91425" wrap="square" tIns="91425">
+            <a:noAutofit/>
+          </a:bodyPr>
+          <a:lstStyle/>
+          <a:p>
+            <a:pPr indent="-342900" lvl="0" marL="457200" rtl="0" algn="l">
+              <a:spcBef>
+                <a:spcPts val="0"/>
+              </a:spcBef>
+              <a:spcAft>
+                <a:spcPts val="0"/>
+              </a:spcAft>
+              <a:buSzPts val="1800"/>
+              <a:buAutoNum type="arabicPeriod"/>
+            </a:pPr>
+            <a:r>
+              <a:rPr lang="id"/>
+              <a:t>You have more than 1 component that use the same logic</a:t>
+            </a:r>
+            <a:endParaRPr/>
+          </a:p>
+          <a:p>
+            <a:pPr indent="-342900" lvl="0" marL="457200" rtl="0" algn="l">
+              <a:spcBef>
+                <a:spcPts val="0"/>
+              </a:spcBef>
+              <a:spcAft>
+                <a:spcPts val="0"/>
+              </a:spcAft>
+              <a:buSzPts val="1800"/>
+              <a:buAutoNum type="arabicPeriod"/>
+            </a:pPr>
+            <a:r>
+              <a:rPr lang="id"/>
+              <a:t>It is related to the use of React functionality like state or lifecycle. </a:t>
+            </a:r>
+            <a:br>
+              <a:rPr lang="id"/>
+            </a:br>
+            <a:r>
+              <a:rPr lang="id"/>
+              <a:t>If it is NOT, create a utility function instead.</a:t>
+            </a:r>
+            <a:endParaRPr/>
+          </a:p>
+          <a:p>
+            <a:pPr indent="-342900" lvl="0" marL="457200" rtl="0" algn="l">
+              <a:spcBef>
+                <a:spcPts val="0"/>
+              </a:spcBef>
+              <a:spcAft>
+                <a:spcPts val="0"/>
+              </a:spcAft>
+              <a:buSzPts val="1800"/>
+              <a:buAutoNum type="arabicPeriod"/>
+            </a:pPr>
+            <a:r>
+              <a:rPr lang="id"/>
+              <a:t>You want to follow DRY principle.</a:t>
+            </a:r>
+            <a:endParaRPr/>
+          </a:p>
+        </p:txBody>
+      </p:sp>
+    </p:spTree>
+  </p:cSld>
+  <p:clrMapOvr>
+    <a:masterClrMapping/>
+  </p:clrMapOvr>
+</p:sld>
+</file>
+
+<file path=ppt/slides/slide7.xml><?xml version="1.0" encoding="utf-8"?>
+<p:sld xmlns:a="http://schemas.openxmlformats.org/drawingml/2006/main" xmlns:r="http://schemas.openxmlformats.org/officeDocument/2006/relationships" xmlns:mc="http://schemas.openxmlformats.org/markup-compatibility/2006" xmlns:mv="urn:schemas-microsoft-com:mac:vml" xmlns:p="http://schemas.openxmlformats.org/presentationml/2006/main" xmlns:c="http://schemas.openxmlformats.org/drawingml/2006/chart" xmlns:dgm="http://schemas.openxmlformats.org/drawingml/2006/diagram" xmlns:o="urn:schemas-microsoft-com:office:office" xmlns:v="urn:schemas-microsoft-com:vml" xmlns:pvml="urn:schemas-microsoft-com:office:powerpoint" xmlns:com="http://schemas.openxmlformats.org/drawingml/2006/compatibility" xmlns:p14="http://schemas.microsoft.com/office/powerpoint/2010/main" xmlns:p15="http://schemas.microsoft.com/office/powerpoint/2012/main">
+  <p:cSld>
+    <p:spTree>
+      <p:nvGrpSpPr>
+        <p:cNvPr id="94" name="Shape 94"/>
+        <p:cNvGrpSpPr/>
+        <p:nvPr/>
+      </p:nvGrpSpPr>
+      <p:grpSpPr>
+        <a:xfrm>
+          <a:off x="0" y="0"/>
+          <a:ext cx="0" cy="0"/>
+          <a:chOff x="0" y="0"/>
+          <a:chExt cx="0" cy="0"/>
+        </a:xfrm>
+      </p:grpSpPr>
+      <p:sp>
+        <p:nvSpPr>
+          <p:cNvPr id="95" name="Google Shape;95;p19"/>
           <p:cNvSpPr txBox="1"/>
           <p:nvPr>
             <p:ph type="title"/>
@@ -8761,7 +9770,7 @@
       </p:sp>
       <p:sp>
         <p:nvSpPr>
-          <p:cNvPr id="77" name="Google Shape;77;p16"/>
+          <p:cNvPr id="96" name="Google Shape;96;p19"/>
           <p:cNvSpPr txBox="1"/>
           <p:nvPr>
             <p:ph idx="1" type="body"/>
@@ -8843,12 +9852,12 @@
 </p:sld>
 </file>
 
-<file path=ppt/slides/slide5.xml><?xml version="1.0" encoding="utf-8"?>
+<file path=ppt/slides/slide8.xml><?xml version="1.0" encoding="utf-8"?>
 <p:sld xmlns:a="http://schemas.openxmlformats.org/drawingml/2006/main" xmlns:r="http://schemas.openxmlformats.org/officeDocument/2006/relationships" xmlns:mc="http://schemas.openxmlformats.org/markup-compatibility/2006" xmlns:mv="urn:schemas-microsoft-com:mac:vml" xmlns:p="http://schemas.openxmlformats.org/presentationml/2006/main" xmlns:c="http://schemas.openxmlformats.org/drawingml/2006/chart" xmlns:dgm="http://schemas.openxmlformats.org/drawingml/2006/diagram" xmlns:o="urn:schemas-microsoft-com:office:office" xmlns:v="urn:schemas-microsoft-com:vml" xmlns:pvml="urn:schemas-microsoft-com:office:powerpoint" xmlns:com="http://schemas.openxmlformats.org/drawingml/2006/compatibility" xmlns:p14="http://schemas.microsoft.com/office/powerpoint/2010/main" xmlns:p15="http://schemas.microsoft.com/office/powerpoint/2012/main">
   <p:cSld>
     <p:spTree>
       <p:nvGrpSpPr>
-        <p:cNvPr id="81" name="Shape 81"/>
+        <p:cNvPr id="100" name="Shape 100"/>
         <p:cNvGrpSpPr/>
         <p:nvPr/>
       </p:nvGrpSpPr>
@@ -8862,7 +9871,7 @@
       </p:grpSpPr>
       <p:sp>
         <p:nvSpPr>
-          <p:cNvPr id="82" name="Google Shape;82;p17"/>
+          <p:cNvPr id="101" name="Google Shape;101;p20"/>
           <p:cNvSpPr txBox="1"/>
           <p:nvPr>
             <p:ph type="title"/>
@@ -8894,7 +9903,7 @@
             </a:pPr>
             <a:r>
               <a:rPr lang="id"/>
-              <a:t>Parent Component - </a:t>
+              <a:t>Render Props Component - </a:t>
             </a:r>
             <a:r>
               <a:rPr i="1" lang="id"/>
@@ -8906,7 +9915,7 @@
       </p:sp>
       <p:pic>
         <p:nvPicPr>
-          <p:cNvPr id="83" name="Google Shape;83;p17"/>
+          <p:cNvPr id="102" name="Google Shape;102;p20"/>
           <p:cNvPicPr preferRelativeResize="0"/>
           <p:nvPr/>
         </p:nvPicPr>
@@ -8920,8 +9929,8 @@
         </p:blipFill>
         <p:spPr>
           <a:xfrm>
-            <a:off x="405850" y="1199950"/>
-            <a:ext cx="4958516" cy="3820974"/>
+            <a:off x="-168375" y="1445950"/>
+            <a:ext cx="4740375" cy="3652872"/>
           </a:xfrm>
           <a:prstGeom prst="rect">
             <a:avLst/>
@@ -8932,6 +9941,166 @@
           </a:ln>
         </p:spPr>
       </p:pic>
+      <p:pic>
+        <p:nvPicPr>
+          <p:cNvPr id="103" name="Google Shape;103;p20"/>
+          <p:cNvPicPr preferRelativeResize="0"/>
+          <p:nvPr/>
+        </p:nvPicPr>
+        <p:blipFill>
+          <a:blip r:embed="rId4">
+            <a:alphaModFix/>
+          </a:blip>
+          <a:stretch>
+            <a:fillRect/>
+          </a:stretch>
+        </p:blipFill>
+        <p:spPr>
+          <a:xfrm>
+            <a:off x="4823528" y="1445955"/>
+            <a:ext cx="4740375" cy="3652875"/>
+          </a:xfrm>
+          <a:prstGeom prst="rect">
+            <a:avLst/>
+          </a:prstGeom>
+          <a:noFill/>
+          <a:ln>
+            <a:noFill/>
+          </a:ln>
+        </p:spPr>
+      </p:pic>
+      <p:sp>
+        <p:nvSpPr>
+          <p:cNvPr id="104" name="Google Shape;104;p20"/>
+          <p:cNvSpPr txBox="1"/>
+          <p:nvPr>
+            <p:ph type="title"/>
+          </p:nvPr>
+        </p:nvSpPr>
+        <p:spPr>
+          <a:xfrm>
+            <a:off x="1597150" y="1017725"/>
+            <a:ext cx="795600" cy="572700"/>
+          </a:xfrm>
+          <a:prstGeom prst="rect">
+            <a:avLst/>
+          </a:prstGeom>
+        </p:spPr>
+        <p:txBody>
+          <a:bodyPr anchorCtr="0" anchor="t" bIns="91425" lIns="91425" spcFirstLastPara="1" rIns="91425" wrap="square" tIns="91425">
+            <a:noAutofit/>
+          </a:bodyPr>
+          <a:lstStyle/>
+          <a:p>
+            <a:pPr indent="0" lvl="0" marL="0" rtl="0" algn="l">
+              <a:spcBef>
+                <a:spcPts val="0"/>
+              </a:spcBef>
+              <a:spcAft>
+                <a:spcPts val="0"/>
+              </a:spcAft>
+              <a:buNone/>
+            </a:pPr>
+            <a:r>
+              <a:rPr b="1" lang="id" sz="1400"/>
+              <a:t>render </a:t>
+            </a:r>
+            <a:endParaRPr b="1" i="1" sz="1400"/>
+          </a:p>
+        </p:txBody>
+      </p:sp>
+      <p:sp>
+        <p:nvSpPr>
+          <p:cNvPr id="105" name="Google Shape;105;p20"/>
+          <p:cNvSpPr txBox="1"/>
+          <p:nvPr>
+            <p:ph type="title"/>
+          </p:nvPr>
+        </p:nvSpPr>
+        <p:spPr>
+          <a:xfrm>
+            <a:off x="4470375" y="980450"/>
+            <a:ext cx="621000" cy="572700"/>
+          </a:xfrm>
+          <a:prstGeom prst="rect">
+            <a:avLst/>
+          </a:prstGeom>
+        </p:spPr>
+        <p:txBody>
+          <a:bodyPr anchorCtr="0" anchor="t" bIns="91425" lIns="91425" spcFirstLastPara="1" rIns="91425" wrap="square" tIns="91425">
+            <a:noAutofit/>
+          </a:bodyPr>
+          <a:lstStyle/>
+          <a:p>
+            <a:pPr indent="0" lvl="0" marL="0" rtl="0" algn="l">
+              <a:spcBef>
+                <a:spcPts val="0"/>
+              </a:spcBef>
+              <a:spcAft>
+                <a:spcPts val="0"/>
+              </a:spcAft>
+              <a:buNone/>
+            </a:pPr>
+            <a:r>
+              <a:rPr b="1" lang="id" sz="1600">
+                <a:solidFill>
+                  <a:srgbClr val="FF0000"/>
+                </a:solidFill>
+              </a:rPr>
+              <a:t>VS</a:t>
+            </a:r>
+            <a:endParaRPr b="1" i="1" sz="1600">
+              <a:solidFill>
+                <a:srgbClr val="FF0000"/>
+              </a:solidFill>
+            </a:endParaRPr>
+          </a:p>
+        </p:txBody>
+      </p:sp>
+      <p:sp>
+        <p:nvSpPr>
+          <p:cNvPr id="106" name="Google Shape;106;p20"/>
+          <p:cNvSpPr txBox="1"/>
+          <p:nvPr>
+            <p:ph type="title"/>
+          </p:nvPr>
+        </p:nvSpPr>
+        <p:spPr>
+          <a:xfrm>
+            <a:off x="6885350" y="1017725"/>
+            <a:ext cx="1202700" cy="572700"/>
+          </a:xfrm>
+          <a:prstGeom prst="rect">
+            <a:avLst/>
+          </a:prstGeom>
+        </p:spPr>
+        <p:txBody>
+          <a:bodyPr anchorCtr="0" anchor="t" bIns="91425" lIns="91425" spcFirstLastPara="1" rIns="91425" wrap="square" tIns="91425">
+            <a:noAutofit/>
+          </a:bodyPr>
+          <a:lstStyle/>
+          <a:p>
+            <a:pPr indent="0" lvl="0" marL="0" rtl="0" algn="l">
+              <a:spcBef>
+                <a:spcPts val="0"/>
+              </a:spcBef>
+              <a:spcAft>
+                <a:spcPts val="0"/>
+              </a:spcAft>
+              <a:buNone/>
+            </a:pPr>
+            <a:r>
+              <a:rPr b="1" lang="id" sz="1400"/>
+              <a:t>children</a:t>
+            </a:r>
+            <a:r>
+              <a:rPr b="1" lang="id" sz="1400"/>
+              <a:t> </a:t>
+            </a:r>
+            <a:endParaRPr b="1" i="1" sz="1400"/>
+          </a:p>
+        </p:txBody>
+      </p:sp>
     </p:spTree>
   </p:cSld>
   <p:clrMapOvr>
@@ -8940,12 +10109,12 @@
 </p:sld>
 </file>
 
-<file path=ppt/slides/slide6.xml><?xml version="1.0" encoding="utf-8"?>
+<file path=ppt/slides/slide9.xml><?xml version="1.0" encoding="utf-8"?>
 <p:sld xmlns:a="http://schemas.openxmlformats.org/drawingml/2006/main" xmlns:r="http://schemas.openxmlformats.org/officeDocument/2006/relationships" xmlns:mc="http://schemas.openxmlformats.org/markup-compatibility/2006" xmlns:mv="urn:schemas-microsoft-com:mac:vml" xmlns:p="http://schemas.openxmlformats.org/presentationml/2006/main" xmlns:c="http://schemas.openxmlformats.org/drawingml/2006/chart" xmlns:dgm="http://schemas.openxmlformats.org/drawingml/2006/diagram" xmlns:o="urn:schemas-microsoft-com:office:office" xmlns:v="urn:schemas-microsoft-com:vml" xmlns:pvml="urn:schemas-microsoft-com:office:powerpoint" xmlns:com="http://schemas.openxmlformats.org/drawingml/2006/compatibility" xmlns:p14="http://schemas.microsoft.com/office/powerpoint/2010/main" xmlns:p15="http://schemas.microsoft.com/office/powerpoint/2012/main">
   <p:cSld>
     <p:spTree>
       <p:nvGrpSpPr>
-        <p:cNvPr id="87" name="Shape 87"/>
+        <p:cNvPr id="110" name="Shape 110"/>
         <p:cNvGrpSpPr/>
         <p:nvPr/>
       </p:nvGrpSpPr>
@@ -8959,7 +10128,7 @@
       </p:grpSpPr>
       <p:sp>
         <p:nvSpPr>
-          <p:cNvPr id="88" name="Google Shape;88;p18"/>
+          <p:cNvPr id="111" name="Google Shape;111;p21"/>
           <p:cNvSpPr txBox="1"/>
           <p:nvPr>
             <p:ph type="title"/>
@@ -8967,7 +10136,7 @@
         </p:nvSpPr>
         <p:spPr>
           <a:xfrm>
-            <a:off x="311700" y="445025"/>
+            <a:off x="311700" y="236300"/>
             <a:ext cx="8520600" cy="572700"/>
           </a:xfrm>
           <a:prstGeom prst="rect">
@@ -8991,7 +10160,7 @@
             </a:pPr>
             <a:r>
               <a:rPr lang="id"/>
-              <a:t>Child Component - </a:t>
+              <a:t>Component - </a:t>
             </a:r>
             <a:r>
               <a:rPr i="1" lang="id"/>
@@ -9003,7 +10172,7 @@
       </p:sp>
       <p:pic>
         <p:nvPicPr>
-          <p:cNvPr id="89" name="Google Shape;89;p18"/>
+          <p:cNvPr id="112" name="Google Shape;112;p21"/>
           <p:cNvPicPr preferRelativeResize="0"/>
           <p:nvPr/>
         </p:nvPicPr>
@@ -9017,7 +10186,7 @@
         </p:blipFill>
         <p:spPr>
           <a:xfrm>
-            <a:off x="405850" y="1125400"/>
+            <a:off x="-436500" y="1259575"/>
             <a:ext cx="4793844" cy="3820975"/>
           </a:xfrm>
           <a:prstGeom prst="rect">
@@ -9029,199 +10198,9 @@
           </a:ln>
         </p:spPr>
       </p:pic>
-    </p:spTree>
-  </p:cSld>
-  <p:clrMapOvr>
-    <a:masterClrMapping/>
-  </p:clrMapOvr>
-</p:sld>
-</file>
-
-<file path=ppt/slides/slide7.xml><?xml version="1.0" encoding="utf-8"?>
-<p:sld xmlns:a="http://schemas.openxmlformats.org/drawingml/2006/main" xmlns:r="http://schemas.openxmlformats.org/officeDocument/2006/relationships" xmlns:mc="http://schemas.openxmlformats.org/markup-compatibility/2006" xmlns:mv="urn:schemas-microsoft-com:mac:vml" xmlns:p="http://schemas.openxmlformats.org/presentationml/2006/main" xmlns:c="http://schemas.openxmlformats.org/drawingml/2006/chart" xmlns:dgm="http://schemas.openxmlformats.org/drawingml/2006/diagram" xmlns:o="urn:schemas-microsoft-com:office:office" xmlns:v="urn:schemas-microsoft-com:vml" xmlns:pvml="urn:schemas-microsoft-com:office:powerpoint" xmlns:com="http://schemas.openxmlformats.org/drawingml/2006/compatibility" xmlns:p14="http://schemas.microsoft.com/office/powerpoint/2010/main" xmlns:p15="http://schemas.microsoft.com/office/powerpoint/2012/main">
-  <p:cSld>
-    <p:spTree>
-      <p:nvGrpSpPr>
-        <p:cNvPr id="93" name="Shape 93"/>
-        <p:cNvGrpSpPr/>
-        <p:nvPr/>
-      </p:nvGrpSpPr>
-      <p:grpSpPr>
-        <a:xfrm>
-          <a:off x="0" y="0"/>
-          <a:ext cx="0" cy="0"/>
-          <a:chOff x="0" y="0"/>
-          <a:chExt cx="0" cy="0"/>
-        </a:xfrm>
-      </p:grpSpPr>
-      <p:sp>
-        <p:nvSpPr>
-          <p:cNvPr id="94" name="Google Shape;94;p19"/>
-          <p:cNvSpPr txBox="1"/>
-          <p:nvPr>
-            <p:ph type="title"/>
-          </p:nvPr>
-        </p:nvSpPr>
-        <p:spPr>
-          <a:xfrm>
-            <a:off x="311700" y="445025"/>
-            <a:ext cx="8520600" cy="572700"/>
-          </a:xfrm>
-          <a:prstGeom prst="rect">
-            <a:avLst/>
-          </a:prstGeom>
-        </p:spPr>
-        <p:txBody>
-          <a:bodyPr anchorCtr="0" anchor="t" bIns="91425" lIns="91425" spcFirstLastPara="1" rIns="91425" wrap="square" tIns="91425">
-            <a:noAutofit/>
-          </a:bodyPr>
-          <a:lstStyle/>
-          <a:p>
-            <a:pPr indent="0" lvl="0" marL="0" rtl="0" algn="l">
-              <a:spcBef>
-                <a:spcPts val="0"/>
-              </a:spcBef>
-              <a:spcAft>
-                <a:spcPts val="0"/>
-              </a:spcAft>
-              <a:buNone/>
-            </a:pPr>
-            <a:r>
-              <a:rPr lang="id"/>
-              <a:t>Child Component - </a:t>
-            </a:r>
-            <a:r>
-              <a:rPr i="1" lang="id"/>
-              <a:t>Profile</a:t>
-            </a:r>
-            <a:endParaRPr i="1"/>
-          </a:p>
-        </p:txBody>
-      </p:sp>
       <p:pic>
         <p:nvPicPr>
-          <p:cNvPr id="95" name="Google Shape;95;p19"/>
-          <p:cNvPicPr preferRelativeResize="0"/>
-          <p:nvPr/>
-        </p:nvPicPr>
-        <p:blipFill>
-          <a:blip r:embed="rId3">
-            <a:alphaModFix/>
-          </a:blip>
-          <a:stretch>
-            <a:fillRect/>
-          </a:stretch>
-        </p:blipFill>
-        <p:spPr>
-          <a:xfrm>
-            <a:off x="420750" y="1170125"/>
-            <a:ext cx="4359504" cy="3820977"/>
-          </a:xfrm>
-          <a:prstGeom prst="rect">
-            <a:avLst/>
-          </a:prstGeom>
-          <a:noFill/>
-          <a:ln>
-            <a:noFill/>
-          </a:ln>
-        </p:spPr>
-      </p:pic>
-    </p:spTree>
-  </p:cSld>
-  <p:clrMapOvr>
-    <a:masterClrMapping/>
-  </p:clrMapOvr>
-</p:sld>
-</file>
-
-<file path=ppt/slides/slide8.xml><?xml version="1.0" encoding="utf-8"?>
-<p:sld xmlns:a="http://schemas.openxmlformats.org/drawingml/2006/main" xmlns:r="http://schemas.openxmlformats.org/officeDocument/2006/relationships" xmlns:mc="http://schemas.openxmlformats.org/markup-compatibility/2006" xmlns:mv="urn:schemas-microsoft-com:mac:vml" xmlns:p="http://schemas.openxmlformats.org/presentationml/2006/main" xmlns:c="http://schemas.openxmlformats.org/drawingml/2006/chart" xmlns:dgm="http://schemas.openxmlformats.org/drawingml/2006/diagram" xmlns:o="urn:schemas-microsoft-com:office:office" xmlns:v="urn:schemas-microsoft-com:vml" xmlns:pvml="urn:schemas-microsoft-com:office:powerpoint" xmlns:com="http://schemas.openxmlformats.org/drawingml/2006/compatibility" xmlns:p14="http://schemas.microsoft.com/office/powerpoint/2010/main" xmlns:p15="http://schemas.microsoft.com/office/powerpoint/2012/main">
-  <p:cSld>
-    <p:spTree>
-      <p:nvGrpSpPr>
-        <p:cNvPr id="99" name="Shape 99"/>
-        <p:cNvGrpSpPr/>
-        <p:nvPr/>
-      </p:nvGrpSpPr>
-      <p:grpSpPr>
-        <a:xfrm>
-          <a:off x="0" y="0"/>
-          <a:ext cx="0" cy="0"/>
-          <a:chOff x="0" y="0"/>
-          <a:chExt cx="0" cy="0"/>
-        </a:xfrm>
-      </p:grpSpPr>
-      <p:sp>
-        <p:nvSpPr>
-          <p:cNvPr id="100" name="Google Shape;100;p20"/>
-          <p:cNvSpPr txBox="1"/>
-          <p:nvPr>
-            <p:ph type="title"/>
-          </p:nvPr>
-        </p:nvSpPr>
-        <p:spPr>
-          <a:xfrm>
-            <a:off x="311700" y="445025"/>
-            <a:ext cx="8520600" cy="572700"/>
-          </a:xfrm>
-          <a:prstGeom prst="rect">
-            <a:avLst/>
-          </a:prstGeom>
-        </p:spPr>
-        <p:txBody>
-          <a:bodyPr anchorCtr="0" anchor="t" bIns="91425" lIns="91425" spcFirstLastPara="1" rIns="91425" wrap="square" tIns="91425">
-            <a:noAutofit/>
-          </a:bodyPr>
-          <a:lstStyle/>
-          <a:p>
-            <a:pPr indent="0" lvl="0" marL="0" rtl="0" algn="l">
-              <a:spcBef>
-                <a:spcPts val="0"/>
-              </a:spcBef>
-              <a:spcAft>
-                <a:spcPts val="0"/>
-              </a:spcAft>
-              <a:buNone/>
-            </a:pPr>
-            <a:r>
-              <a:rPr lang="id"/>
-              <a:t>Without Render Props </a:t>
-            </a:r>
-            <a:endParaRPr/>
-          </a:p>
-        </p:txBody>
-      </p:sp>
-      <p:pic>
-        <p:nvPicPr>
-          <p:cNvPr id="101" name="Google Shape;101;p20"/>
-          <p:cNvPicPr preferRelativeResize="0"/>
-          <p:nvPr/>
-        </p:nvPicPr>
-        <p:blipFill>
-          <a:blip r:embed="rId3">
-            <a:alphaModFix/>
-          </a:blip>
-          <a:stretch>
-            <a:fillRect/>
-          </a:stretch>
-        </p:blipFill>
-        <p:spPr>
-          <a:xfrm>
-            <a:off x="413325" y="1110500"/>
-            <a:ext cx="3598703" cy="3820976"/>
-          </a:xfrm>
-          <a:prstGeom prst="rect">
-            <a:avLst/>
-          </a:prstGeom>
-          <a:noFill/>
-          <a:ln>
-            <a:noFill/>
-          </a:ln>
-        </p:spPr>
-      </p:pic>
-      <p:pic>
-        <p:nvPicPr>
-          <p:cNvPr id="102" name="Google Shape;102;p20"/>
+          <p:cNvPr id="113" name="Google Shape;113;p21"/>
           <p:cNvPicPr preferRelativeResize="0"/>
           <p:nvPr/>
         </p:nvPicPr>
@@ -9235,8 +10214,8 @@
         </p:blipFill>
         <p:spPr>
           <a:xfrm>
-            <a:off x="4306078" y="1110500"/>
-            <a:ext cx="3272371" cy="3820974"/>
+            <a:off x="4658853" y="1259575"/>
+            <a:ext cx="5134891" cy="3820976"/>
           </a:xfrm>
           <a:prstGeom prst="rect">
             <a:avLst/>
@@ -9247,34 +10226,9 @@
           </a:ln>
         </p:spPr>
       </p:pic>
-    </p:spTree>
-  </p:cSld>
-  <p:clrMapOvr>
-    <a:masterClrMapping/>
-  </p:clrMapOvr>
-</p:sld>
-</file>
-
-<file path=ppt/slides/slide9.xml><?xml version="1.0" encoding="utf-8"?>
-<p:sld xmlns:a="http://schemas.openxmlformats.org/drawingml/2006/main" xmlns:r="http://schemas.openxmlformats.org/officeDocument/2006/relationships" xmlns:mc="http://schemas.openxmlformats.org/markup-compatibility/2006" xmlns:mv="urn:schemas-microsoft-com:mac:vml" xmlns:p="http://schemas.openxmlformats.org/presentationml/2006/main" xmlns:c="http://schemas.openxmlformats.org/drawingml/2006/chart" xmlns:dgm="http://schemas.openxmlformats.org/drawingml/2006/diagram" xmlns:o="urn:schemas-microsoft-com:office:office" xmlns:v="urn:schemas-microsoft-com:vml" xmlns:pvml="urn:schemas-microsoft-com:office:powerpoint" xmlns:com="http://schemas.openxmlformats.org/drawingml/2006/compatibility" xmlns:p14="http://schemas.microsoft.com/office/powerpoint/2010/main" xmlns:p15="http://schemas.microsoft.com/office/powerpoint/2012/main">
-  <p:cSld>
-    <p:spTree>
-      <p:nvGrpSpPr>
-        <p:cNvPr id="106" name="Shape 106"/>
-        <p:cNvGrpSpPr/>
-        <p:nvPr/>
-      </p:nvGrpSpPr>
-      <p:grpSpPr>
-        <a:xfrm>
-          <a:off x="0" y="0"/>
-          <a:ext cx="0" cy="0"/>
-          <a:chOff x="0" y="0"/>
-          <a:chExt cx="0" cy="0"/>
-        </a:xfrm>
-      </p:grpSpPr>
       <p:sp>
         <p:nvSpPr>
-          <p:cNvPr id="107" name="Google Shape;107;p21"/>
+          <p:cNvPr id="114" name="Google Shape;114;p21"/>
           <p:cNvSpPr txBox="1"/>
           <p:nvPr>
             <p:ph type="title"/>
@@ -9282,8 +10236,8 @@
         </p:nvSpPr>
         <p:spPr>
           <a:xfrm>
-            <a:off x="311700" y="445025"/>
-            <a:ext cx="8520600" cy="572700"/>
+            <a:off x="1455525" y="883550"/>
+            <a:ext cx="795600" cy="572700"/>
           </a:xfrm>
           <a:prstGeom prst="rect">
             <a:avLst/>
@@ -9305,25 +10259,25 @@
               <a:buNone/>
             </a:pPr>
             <a:r>
-              <a:rPr lang="id"/>
-              <a:t>Higher-Order Components (HOC)</a:t>
+              <a:rPr b="1" lang="id" sz="1400"/>
+              <a:t>render </a:t>
             </a:r>
-            <a:endParaRPr/>
+            <a:endParaRPr b="1" i="1" sz="1400"/>
           </a:p>
         </p:txBody>
       </p:sp>
       <p:sp>
         <p:nvSpPr>
-          <p:cNvPr id="108" name="Google Shape;108;p21"/>
+          <p:cNvPr id="115" name="Google Shape;115;p21"/>
           <p:cNvSpPr txBox="1"/>
           <p:nvPr>
-            <p:ph idx="1" type="body"/>
+            <p:ph type="title"/>
           </p:nvPr>
         </p:nvSpPr>
         <p:spPr>
           <a:xfrm>
-            <a:off x="1013800" y="1721975"/>
-            <a:ext cx="7401000" cy="2697900"/>
+            <a:off x="6743725" y="883550"/>
+            <a:ext cx="1202700" cy="572700"/>
           </a:xfrm>
           <a:prstGeom prst="rect">
             <a:avLst/>
@@ -9340,23 +10294,15 @@
                 <a:spcPts val="0"/>
               </a:spcBef>
               <a:spcAft>
-                <a:spcPts val="1600"/>
+                <a:spcPts val="0"/>
               </a:spcAft>
               <a:buNone/>
             </a:pPr>
             <a:r>
-              <a:rPr lang="id">
-                <a:solidFill>
-                  <a:srgbClr val="6D6D6D"/>
-                </a:solidFill>
-                <a:latin typeface="Roboto"/>
-                <a:ea typeface="Roboto"/>
-                <a:cs typeface="Roboto"/>
-                <a:sym typeface="Roboto"/>
-              </a:rPr>
-              <a:t>A higher-order component (HOC) is an advanced technique in React for reusing component logic.</a:t>
+              <a:rPr b="1" lang="id" sz="1400"/>
+              <a:t>children </a:t>
             </a:r>
-            <a:endParaRPr/>
+            <a:endParaRPr b="1" i="1" sz="1400"/>
           </a:p>
         </p:txBody>
       </p:sp>

</xml_diff>